<commit_message>
kinase family can be NA now (for uka2023)
</commit_message>
<xml_diff>
--- a/ref/HowToUse.pptx
+++ b/ref/HowToUse.pptx
@@ -14,8 +14,9 @@
     <p:sldId id="265" r:id="rId8"/>
     <p:sldId id="258" r:id="rId9"/>
     <p:sldId id="266" r:id="rId10"/>
-    <p:sldId id="263" r:id="rId11"/>
-    <p:sldId id="257" r:id="rId12"/>
+    <p:sldId id="267" r:id="rId11"/>
+    <p:sldId id="263" r:id="rId12"/>
+    <p:sldId id="257" r:id="rId13"/>
   </p:sldIdLst>
   <p:sldSz cx="12192000" cy="6858000"/>
   <p:notesSz cx="6858000" cy="9144000"/>
@@ -271,7 +272,7 @@
           <a:p>
             <a:fld id="{028CE02D-A78E-4140-9ADC-F5E593AD7849}" type="datetimeFigureOut">
               <a:rPr lang="en-NL" smtClean="0"/>
-              <a:t>27/06/2023</a:t>
+              <a:t>16/11/2023</a:t>
             </a:fld>
             <a:endParaRPr lang="en-NL"/>
           </a:p>
@@ -471,7 +472,7 @@
           <a:p>
             <a:fld id="{028CE02D-A78E-4140-9ADC-F5E593AD7849}" type="datetimeFigureOut">
               <a:rPr lang="en-NL" smtClean="0"/>
-              <a:t>27/06/2023</a:t>
+              <a:t>16/11/2023</a:t>
             </a:fld>
             <a:endParaRPr lang="en-NL"/>
           </a:p>
@@ -681,7 +682,7 @@
           <a:p>
             <a:fld id="{028CE02D-A78E-4140-9ADC-F5E593AD7849}" type="datetimeFigureOut">
               <a:rPr lang="en-NL" smtClean="0"/>
-              <a:t>27/06/2023</a:t>
+              <a:t>16/11/2023</a:t>
             </a:fld>
             <a:endParaRPr lang="en-NL"/>
           </a:p>
@@ -881,7 +882,7 @@
           <a:p>
             <a:fld id="{028CE02D-A78E-4140-9ADC-F5E593AD7849}" type="datetimeFigureOut">
               <a:rPr lang="en-NL" smtClean="0"/>
-              <a:t>27/06/2023</a:t>
+              <a:t>16/11/2023</a:t>
             </a:fld>
             <a:endParaRPr lang="en-NL"/>
           </a:p>
@@ -1157,7 +1158,7 @@
           <a:p>
             <a:fld id="{028CE02D-A78E-4140-9ADC-F5E593AD7849}" type="datetimeFigureOut">
               <a:rPr lang="en-NL" smtClean="0"/>
-              <a:t>27/06/2023</a:t>
+              <a:t>16/11/2023</a:t>
             </a:fld>
             <a:endParaRPr lang="en-NL"/>
           </a:p>
@@ -1425,7 +1426,7 @@
           <a:p>
             <a:fld id="{028CE02D-A78E-4140-9ADC-F5E593AD7849}" type="datetimeFigureOut">
               <a:rPr lang="en-NL" smtClean="0"/>
-              <a:t>27/06/2023</a:t>
+              <a:t>16/11/2023</a:t>
             </a:fld>
             <a:endParaRPr lang="en-NL"/>
           </a:p>
@@ -1840,7 +1841,7 @@
           <a:p>
             <a:fld id="{028CE02D-A78E-4140-9ADC-F5E593AD7849}" type="datetimeFigureOut">
               <a:rPr lang="en-NL" smtClean="0"/>
-              <a:t>27/06/2023</a:t>
+              <a:t>16/11/2023</a:t>
             </a:fld>
             <a:endParaRPr lang="en-NL"/>
           </a:p>
@@ -1982,7 +1983,7 @@
           <a:p>
             <a:fld id="{028CE02D-A78E-4140-9ADC-F5E593AD7849}" type="datetimeFigureOut">
               <a:rPr lang="en-NL" smtClean="0"/>
-              <a:t>27/06/2023</a:t>
+              <a:t>16/11/2023</a:t>
             </a:fld>
             <a:endParaRPr lang="en-NL"/>
           </a:p>
@@ -2095,7 +2096,7 @@
           <a:p>
             <a:fld id="{028CE02D-A78E-4140-9ADC-F5E593AD7849}" type="datetimeFigureOut">
               <a:rPr lang="en-NL" smtClean="0"/>
-              <a:t>27/06/2023</a:t>
+              <a:t>16/11/2023</a:t>
             </a:fld>
             <a:endParaRPr lang="en-NL"/>
           </a:p>
@@ -2408,7 +2409,7 @@
           <a:p>
             <a:fld id="{028CE02D-A78E-4140-9ADC-F5E593AD7849}" type="datetimeFigureOut">
               <a:rPr lang="en-NL" smtClean="0"/>
-              <a:t>27/06/2023</a:t>
+              <a:t>16/11/2023</a:t>
             </a:fld>
             <a:endParaRPr lang="en-NL"/>
           </a:p>
@@ -2697,7 +2698,7 @@
           <a:p>
             <a:fld id="{028CE02D-A78E-4140-9ADC-F5E593AD7849}" type="datetimeFigureOut">
               <a:rPr lang="en-NL" smtClean="0"/>
-              <a:t>27/06/2023</a:t>
+              <a:t>16/11/2023</a:t>
             </a:fld>
             <a:endParaRPr lang="en-NL"/>
           </a:p>
@@ -2940,7 +2941,7 @@
           <a:p>
             <a:fld id="{028CE02D-A78E-4140-9ADC-F5E593AD7849}" type="datetimeFigureOut">
               <a:rPr lang="en-NL" smtClean="0"/>
-              <a:t>27/06/2023</a:t>
+              <a:t>16/11/2023</a:t>
             </a:fld>
             <a:endParaRPr lang="en-NL"/>
           </a:p>
@@ -3464,6 +3465,2858 @@
           <a:p>
             <a:r>
               <a:rPr lang="en-US" dirty="0"/>
+              <a:t>Kinase Analysis</a:t>
+            </a:r>
+            <a:r>
+              <a:rPr lang="hu-HU" dirty="0"/>
+              <a:t> (UKA 2023)</a:t>
+            </a:r>
+            <a:endParaRPr lang="en-NL" dirty="0"/>
+          </a:p>
+        </p:txBody>
+      </p:sp>
+      <p:sp>
+        <p:nvSpPr>
+          <p:cNvPr id="3" name="Content Placeholder 2">
+            <a:extLst>
+              <a:ext uri="{FF2B5EF4-FFF2-40B4-BE49-F238E27FC236}">
+                <a16:creationId xmlns:a16="http://schemas.microsoft.com/office/drawing/2014/main" id="{DD9C2BF1-44B7-43DF-990A-74BF16A9E112}"/>
+              </a:ext>
+            </a:extLst>
+          </p:cNvPr>
+          <p:cNvSpPr>
+            <a:spLocks noGrp="1"/>
+          </p:cNvSpPr>
+          <p:nvPr>
+            <p:ph idx="1"/>
+          </p:nvPr>
+        </p:nvSpPr>
+        <p:spPr>
+          <a:xfrm>
+            <a:off x="933450" y="1748666"/>
+            <a:ext cx="4670072" cy="536188"/>
+          </a:xfrm>
+        </p:spPr>
+        <p:txBody>
+          <a:bodyPr/>
+          <a:lstStyle/>
+          <a:p>
+            <a:pPr marL="0" indent="0">
+              <a:buNone/>
+            </a:pPr>
+            <a:r>
+              <a:rPr lang="hu-HU" dirty="0"/>
+              <a:t>UKA MTvC f</a:t>
+            </a:r>
+            <a:r>
+              <a:rPr lang="en-US" dirty="0" err="1"/>
+              <a:t>ilename</a:t>
+            </a:r>
+            <a:r>
+              <a:rPr lang="en-US" dirty="0"/>
+              <a:t> structure:</a:t>
+            </a:r>
+            <a:endParaRPr lang="en-NL" dirty="0"/>
+          </a:p>
+        </p:txBody>
+      </p:sp>
+      <p:sp>
+        <p:nvSpPr>
+          <p:cNvPr id="5" name="TextBox 4">
+            <a:extLst>
+              <a:ext uri="{FF2B5EF4-FFF2-40B4-BE49-F238E27FC236}">
+                <a16:creationId xmlns:a16="http://schemas.microsoft.com/office/drawing/2014/main" id="{2F1EB3F0-7C4D-4F3B-9B2F-7B762E4A212D}"/>
+              </a:ext>
+            </a:extLst>
+          </p:cNvPr>
+          <p:cNvSpPr txBox="1"/>
+          <p:nvPr/>
+        </p:nvSpPr>
+        <p:spPr>
+          <a:xfrm>
+            <a:off x="1093961" y="2419848"/>
+            <a:ext cx="4324598" cy="369332"/>
+          </a:xfrm>
+          <a:prstGeom prst="rect">
+            <a:avLst/>
+          </a:prstGeom>
+          <a:noFill/>
+        </p:spPr>
+        <p:txBody>
+          <a:bodyPr wrap="square" rtlCol="0">
+            <a:spAutoFit/>
+          </a:bodyPr>
+          <a:lstStyle/>
+          <a:p>
+            <a:r>
+              <a:rPr lang="en-US" dirty="0"/>
+              <a:t>UKA_PTK_01_</a:t>
+            </a:r>
+            <a:r>
+              <a:rPr lang="hu-HU" dirty="0"/>
+              <a:t>ukam-Sgroup1 </a:t>
+            </a:r>
+            <a:r>
+              <a:rPr lang="en-US" dirty="0"/>
+              <a:t>vs</a:t>
+            </a:r>
+            <a:r>
+              <a:rPr lang="hu-HU" dirty="0"/>
+              <a:t> C</a:t>
+            </a:r>
+            <a:r>
+              <a:rPr lang="en-US" dirty="0"/>
+              <a:t>.csv</a:t>
+            </a:r>
+            <a:endParaRPr lang="en-NL" dirty="0"/>
+          </a:p>
+        </p:txBody>
+      </p:sp>
+      <p:cxnSp>
+        <p:nvCxnSpPr>
+          <p:cNvPr id="18" name="Straight Connector 17">
+            <a:extLst>
+              <a:ext uri="{FF2B5EF4-FFF2-40B4-BE49-F238E27FC236}">
+                <a16:creationId xmlns:a16="http://schemas.microsoft.com/office/drawing/2014/main" id="{91A43A0D-837B-40CB-B668-DAADC9008E49}"/>
+              </a:ext>
+            </a:extLst>
+          </p:cNvPr>
+          <p:cNvCxnSpPr>
+            <a:cxnSpLocks/>
+          </p:cNvCxnSpPr>
+          <p:nvPr/>
+        </p:nvCxnSpPr>
+        <p:spPr>
+          <a:xfrm>
+            <a:off x="1196880" y="2707825"/>
+            <a:ext cx="380011" cy="0"/>
+          </a:xfrm>
+          <a:prstGeom prst="line">
+            <a:avLst/>
+          </a:prstGeom>
+          <a:ln w="38100"/>
+        </p:spPr>
+        <p:style>
+          <a:lnRef idx="1">
+            <a:schemeClr val="accent1"/>
+          </a:lnRef>
+          <a:fillRef idx="0">
+            <a:schemeClr val="accent1"/>
+          </a:fillRef>
+          <a:effectRef idx="0">
+            <a:schemeClr val="accent1"/>
+          </a:effectRef>
+          <a:fontRef idx="minor">
+            <a:schemeClr val="tx1"/>
+          </a:fontRef>
+        </p:style>
+      </p:cxnSp>
+      <p:cxnSp>
+        <p:nvCxnSpPr>
+          <p:cNvPr id="21" name="Straight Connector 20">
+            <a:extLst>
+              <a:ext uri="{FF2B5EF4-FFF2-40B4-BE49-F238E27FC236}">
+                <a16:creationId xmlns:a16="http://schemas.microsoft.com/office/drawing/2014/main" id="{88DE3F3C-8A6F-455D-AECB-1195CBFC1C0A}"/>
+              </a:ext>
+            </a:extLst>
+          </p:cNvPr>
+          <p:cNvCxnSpPr>
+            <a:cxnSpLocks/>
+          </p:cNvCxnSpPr>
+          <p:nvPr/>
+        </p:nvCxnSpPr>
+        <p:spPr>
+          <a:xfrm>
+            <a:off x="1723353" y="2707825"/>
+            <a:ext cx="279070" cy="0"/>
+          </a:xfrm>
+          <a:prstGeom prst="line">
+            <a:avLst/>
+          </a:prstGeom>
+          <a:ln w="38100"/>
+        </p:spPr>
+        <p:style>
+          <a:lnRef idx="1">
+            <a:schemeClr val="accent2"/>
+          </a:lnRef>
+          <a:fillRef idx="0">
+            <a:schemeClr val="accent2"/>
+          </a:fillRef>
+          <a:effectRef idx="0">
+            <a:schemeClr val="accent2"/>
+          </a:effectRef>
+          <a:fontRef idx="minor">
+            <a:schemeClr val="tx1"/>
+          </a:fontRef>
+        </p:style>
+      </p:cxnSp>
+      <p:cxnSp>
+        <p:nvCxnSpPr>
+          <p:cNvPr id="23" name="Straight Connector 22">
+            <a:extLst>
+              <a:ext uri="{FF2B5EF4-FFF2-40B4-BE49-F238E27FC236}">
+                <a16:creationId xmlns:a16="http://schemas.microsoft.com/office/drawing/2014/main" id="{E9790DB0-EA56-4A3D-AA44-5FC556B7BB9A}"/>
+              </a:ext>
+            </a:extLst>
+          </p:cNvPr>
+          <p:cNvCxnSpPr>
+            <a:cxnSpLocks/>
+          </p:cNvCxnSpPr>
+          <p:nvPr/>
+        </p:nvCxnSpPr>
+        <p:spPr>
+          <a:xfrm>
+            <a:off x="2176595" y="2707825"/>
+            <a:ext cx="178129" cy="0"/>
+          </a:xfrm>
+          <a:prstGeom prst="line">
+            <a:avLst/>
+          </a:prstGeom>
+          <a:ln w="38100"/>
+        </p:spPr>
+        <p:style>
+          <a:lnRef idx="1">
+            <a:schemeClr val="accent6"/>
+          </a:lnRef>
+          <a:fillRef idx="0">
+            <a:schemeClr val="accent6"/>
+          </a:fillRef>
+          <a:effectRef idx="0">
+            <a:schemeClr val="accent6"/>
+          </a:effectRef>
+          <a:fontRef idx="minor">
+            <a:schemeClr val="tx1"/>
+          </a:fontRef>
+        </p:style>
+      </p:cxnSp>
+      <p:cxnSp>
+        <p:nvCxnSpPr>
+          <p:cNvPr id="24" name="Straight Connector 23">
+            <a:extLst>
+              <a:ext uri="{FF2B5EF4-FFF2-40B4-BE49-F238E27FC236}">
+                <a16:creationId xmlns:a16="http://schemas.microsoft.com/office/drawing/2014/main" id="{82E82212-B246-4AB8-B5CD-24826FE634B4}"/>
+              </a:ext>
+            </a:extLst>
+          </p:cNvPr>
+          <p:cNvCxnSpPr>
+            <a:cxnSpLocks/>
+          </p:cNvCxnSpPr>
+          <p:nvPr/>
+        </p:nvCxnSpPr>
+        <p:spPr>
+          <a:xfrm>
+            <a:off x="3831372" y="2738644"/>
+            <a:ext cx="444477" cy="0"/>
+          </a:xfrm>
+          <a:prstGeom prst="line">
+            <a:avLst/>
+          </a:prstGeom>
+          <a:ln w="38100">
+            <a:solidFill>
+              <a:srgbClr val="FF0000"/>
+            </a:solidFill>
+          </a:ln>
+        </p:spPr>
+        <p:style>
+          <a:lnRef idx="1">
+            <a:schemeClr val="accent6"/>
+          </a:lnRef>
+          <a:fillRef idx="0">
+            <a:schemeClr val="accent6"/>
+          </a:fillRef>
+          <a:effectRef idx="0">
+            <a:schemeClr val="accent6"/>
+          </a:effectRef>
+          <a:fontRef idx="minor">
+            <a:schemeClr val="tx1"/>
+          </a:fontRef>
+        </p:style>
+      </p:cxnSp>
+      <p:sp>
+        <p:nvSpPr>
+          <p:cNvPr id="30" name="Rectangle 29">
+            <a:extLst>
+              <a:ext uri="{FF2B5EF4-FFF2-40B4-BE49-F238E27FC236}">
+                <a16:creationId xmlns:a16="http://schemas.microsoft.com/office/drawing/2014/main" id="{BB152CBD-3826-40B2-94F3-816B47FC697A}"/>
+              </a:ext>
+            </a:extLst>
+          </p:cNvPr>
+          <p:cNvSpPr/>
+          <p:nvPr/>
+        </p:nvSpPr>
+        <p:spPr>
+          <a:xfrm>
+            <a:off x="1632772" y="4135004"/>
+            <a:ext cx="338447" cy="326572"/>
+          </a:xfrm>
+          <a:prstGeom prst="rect">
+            <a:avLst/>
+          </a:prstGeom>
+          <a:ln>
+            <a:solidFill>
+              <a:schemeClr val="accent1"/>
+            </a:solidFill>
+          </a:ln>
+        </p:spPr>
+        <p:style>
+          <a:lnRef idx="2">
+            <a:schemeClr val="accent1">
+              <a:shade val="50000"/>
+            </a:schemeClr>
+          </a:lnRef>
+          <a:fillRef idx="1">
+            <a:schemeClr val="accent1"/>
+          </a:fillRef>
+          <a:effectRef idx="0">
+            <a:schemeClr val="accent1"/>
+          </a:effectRef>
+          <a:fontRef idx="minor">
+            <a:schemeClr val="lt1"/>
+          </a:fontRef>
+        </p:style>
+        <p:txBody>
+          <a:bodyPr rtlCol="0" anchor="ctr"/>
+          <a:lstStyle/>
+          <a:p>
+            <a:pPr algn="ctr"/>
+            <a:endParaRPr lang="en-NL"/>
+          </a:p>
+        </p:txBody>
+      </p:sp>
+      <p:sp>
+        <p:nvSpPr>
+          <p:cNvPr id="31" name="TextBox 30">
+            <a:extLst>
+              <a:ext uri="{FF2B5EF4-FFF2-40B4-BE49-F238E27FC236}">
+                <a16:creationId xmlns:a16="http://schemas.microsoft.com/office/drawing/2014/main" id="{E3BFE06C-0043-417F-8F95-1368D728335F}"/>
+              </a:ext>
+            </a:extLst>
+          </p:cNvPr>
+          <p:cNvSpPr txBox="1"/>
+          <p:nvPr/>
+        </p:nvSpPr>
+        <p:spPr>
+          <a:xfrm>
+            <a:off x="1971219" y="4135004"/>
+            <a:ext cx="1558183" cy="369332"/>
+          </a:xfrm>
+          <a:prstGeom prst="rect">
+            <a:avLst/>
+          </a:prstGeom>
+          <a:noFill/>
+        </p:spPr>
+        <p:txBody>
+          <a:bodyPr wrap="none" rtlCol="0">
+            <a:spAutoFit/>
+          </a:bodyPr>
+          <a:lstStyle/>
+          <a:p>
+            <a:r>
+              <a:rPr lang="en-US" dirty="0"/>
+              <a:t>File type</a:t>
+            </a:r>
+            <a:r>
+              <a:rPr lang="hu-HU" dirty="0"/>
+              <a:t>: UKA</a:t>
+            </a:r>
+            <a:endParaRPr lang="en-NL" dirty="0"/>
+          </a:p>
+        </p:txBody>
+      </p:sp>
+      <p:sp>
+        <p:nvSpPr>
+          <p:cNvPr id="32" name="Rectangle 31">
+            <a:extLst>
+              <a:ext uri="{FF2B5EF4-FFF2-40B4-BE49-F238E27FC236}">
+                <a16:creationId xmlns:a16="http://schemas.microsoft.com/office/drawing/2014/main" id="{E57E36FD-5BEA-40BA-849E-603DAB62A121}"/>
+              </a:ext>
+            </a:extLst>
+          </p:cNvPr>
+          <p:cNvSpPr/>
+          <p:nvPr/>
+        </p:nvSpPr>
+        <p:spPr>
+          <a:xfrm>
+            <a:off x="1629463" y="4504336"/>
+            <a:ext cx="338447" cy="326572"/>
+          </a:xfrm>
+          <a:prstGeom prst="rect">
+            <a:avLst/>
+          </a:prstGeom>
+          <a:solidFill>
+            <a:schemeClr val="accent2"/>
+          </a:solidFill>
+          <a:ln/>
+        </p:spPr>
+        <p:style>
+          <a:lnRef idx="2">
+            <a:schemeClr val="accent2"/>
+          </a:lnRef>
+          <a:fillRef idx="1">
+            <a:schemeClr val="lt1"/>
+          </a:fillRef>
+          <a:effectRef idx="0">
+            <a:schemeClr val="accent2"/>
+          </a:effectRef>
+          <a:fontRef idx="minor">
+            <a:schemeClr val="dk1"/>
+          </a:fontRef>
+        </p:style>
+        <p:txBody>
+          <a:bodyPr rtlCol="0" anchor="ctr"/>
+          <a:lstStyle/>
+          <a:p>
+            <a:pPr algn="ctr"/>
+            <a:endParaRPr lang="en-NL"/>
+          </a:p>
+        </p:txBody>
+      </p:sp>
+      <p:sp>
+        <p:nvSpPr>
+          <p:cNvPr id="33" name="TextBox 32">
+            <a:extLst>
+              <a:ext uri="{FF2B5EF4-FFF2-40B4-BE49-F238E27FC236}">
+                <a16:creationId xmlns:a16="http://schemas.microsoft.com/office/drawing/2014/main" id="{CF933DA8-7734-4D38-841F-BE4BB9CD8C02}"/>
+              </a:ext>
+            </a:extLst>
+          </p:cNvPr>
+          <p:cNvSpPr txBox="1"/>
+          <p:nvPr/>
+        </p:nvSpPr>
+        <p:spPr>
+          <a:xfrm>
+            <a:off x="1967910" y="4504336"/>
+            <a:ext cx="2367443" cy="369332"/>
+          </a:xfrm>
+          <a:prstGeom prst="rect">
+            <a:avLst/>
+          </a:prstGeom>
+          <a:noFill/>
+        </p:spPr>
+        <p:txBody>
+          <a:bodyPr wrap="none" rtlCol="0">
+            <a:spAutoFit/>
+          </a:bodyPr>
+          <a:lstStyle/>
+          <a:p>
+            <a:r>
+              <a:rPr lang="en-US" dirty="0"/>
+              <a:t>Assay type</a:t>
+            </a:r>
+            <a:r>
+              <a:rPr lang="hu-HU" dirty="0"/>
+              <a:t> (</a:t>
+            </a:r>
+            <a:r>
+              <a:rPr lang="en-US" dirty="0"/>
+              <a:t>PTK or STK</a:t>
+            </a:r>
+            <a:r>
+              <a:rPr lang="hu-HU" dirty="0"/>
+              <a:t>)</a:t>
+            </a:r>
+            <a:endParaRPr lang="en-NL" dirty="0"/>
+          </a:p>
+        </p:txBody>
+      </p:sp>
+      <p:sp>
+        <p:nvSpPr>
+          <p:cNvPr id="34" name="Rectangle 33">
+            <a:extLst>
+              <a:ext uri="{FF2B5EF4-FFF2-40B4-BE49-F238E27FC236}">
+                <a16:creationId xmlns:a16="http://schemas.microsoft.com/office/drawing/2014/main" id="{19285AE9-17E2-42C5-B37F-5A1C6A2DABE4}"/>
+              </a:ext>
+            </a:extLst>
+          </p:cNvPr>
+          <p:cNvSpPr/>
+          <p:nvPr/>
+        </p:nvSpPr>
+        <p:spPr>
+          <a:xfrm>
+            <a:off x="1629463" y="4867707"/>
+            <a:ext cx="338447" cy="326572"/>
+          </a:xfrm>
+          <a:prstGeom prst="rect">
+            <a:avLst/>
+          </a:prstGeom>
+          <a:solidFill>
+            <a:schemeClr val="accent6"/>
+          </a:solidFill>
+          <a:ln>
+            <a:solidFill>
+              <a:schemeClr val="accent6"/>
+            </a:solidFill>
+          </a:ln>
+        </p:spPr>
+        <p:style>
+          <a:lnRef idx="2">
+            <a:schemeClr val="accent1">
+              <a:shade val="50000"/>
+            </a:schemeClr>
+          </a:lnRef>
+          <a:fillRef idx="1">
+            <a:schemeClr val="accent1"/>
+          </a:fillRef>
+          <a:effectRef idx="0">
+            <a:schemeClr val="accent1"/>
+          </a:effectRef>
+          <a:fontRef idx="minor">
+            <a:schemeClr val="lt1"/>
+          </a:fontRef>
+        </p:style>
+        <p:txBody>
+          <a:bodyPr rtlCol="0" anchor="ctr"/>
+          <a:lstStyle/>
+          <a:p>
+            <a:pPr algn="ctr"/>
+            <a:endParaRPr lang="en-NL"/>
+          </a:p>
+        </p:txBody>
+      </p:sp>
+      <p:sp>
+        <p:nvSpPr>
+          <p:cNvPr id="35" name="TextBox 34">
+            <a:extLst>
+              <a:ext uri="{FF2B5EF4-FFF2-40B4-BE49-F238E27FC236}">
+                <a16:creationId xmlns:a16="http://schemas.microsoft.com/office/drawing/2014/main" id="{DDDF34B4-6185-47F7-A166-0F066D3EC698}"/>
+              </a:ext>
+            </a:extLst>
+          </p:cNvPr>
+          <p:cNvSpPr txBox="1"/>
+          <p:nvPr/>
+        </p:nvSpPr>
+        <p:spPr>
+          <a:xfrm>
+            <a:off x="1967910" y="4867707"/>
+            <a:ext cx="3194592" cy="369332"/>
+          </a:xfrm>
+          <a:prstGeom prst="rect">
+            <a:avLst/>
+          </a:prstGeom>
+          <a:noFill/>
+        </p:spPr>
+        <p:txBody>
+          <a:bodyPr wrap="none" rtlCol="0">
+            <a:spAutoFit/>
+          </a:bodyPr>
+          <a:lstStyle/>
+          <a:p>
+            <a:r>
+              <a:rPr lang="en-US" dirty="0"/>
+              <a:t>Order. Defines ordering in table.</a:t>
+            </a:r>
+            <a:endParaRPr lang="en-NL" dirty="0"/>
+          </a:p>
+        </p:txBody>
+      </p:sp>
+      <p:sp>
+        <p:nvSpPr>
+          <p:cNvPr id="36" name="Rectangle 35">
+            <a:extLst>
+              <a:ext uri="{FF2B5EF4-FFF2-40B4-BE49-F238E27FC236}">
+                <a16:creationId xmlns:a16="http://schemas.microsoft.com/office/drawing/2014/main" id="{5CEE573A-1780-406E-82DD-3BAF4DF5BD41}"/>
+              </a:ext>
+            </a:extLst>
+          </p:cNvPr>
+          <p:cNvSpPr/>
+          <p:nvPr/>
+        </p:nvSpPr>
+        <p:spPr>
+          <a:xfrm>
+            <a:off x="1629464" y="6368307"/>
+            <a:ext cx="338447" cy="326572"/>
+          </a:xfrm>
+          <a:prstGeom prst="rect">
+            <a:avLst/>
+          </a:prstGeom>
+          <a:solidFill>
+            <a:srgbClr val="FF0000"/>
+          </a:solidFill>
+          <a:ln>
+            <a:solidFill>
+              <a:srgbClr val="FF0000"/>
+            </a:solidFill>
+          </a:ln>
+        </p:spPr>
+        <p:style>
+          <a:lnRef idx="2">
+            <a:schemeClr val="accent1">
+              <a:shade val="50000"/>
+            </a:schemeClr>
+          </a:lnRef>
+          <a:fillRef idx="1">
+            <a:schemeClr val="accent1"/>
+          </a:fillRef>
+          <a:effectRef idx="0">
+            <a:schemeClr val="accent1"/>
+          </a:effectRef>
+          <a:fontRef idx="minor">
+            <a:schemeClr val="lt1"/>
+          </a:fontRef>
+        </p:style>
+        <p:txBody>
+          <a:bodyPr rtlCol="0" anchor="ctr"/>
+          <a:lstStyle/>
+          <a:p>
+            <a:pPr algn="ctr"/>
+            <a:endParaRPr lang="en-NL"/>
+          </a:p>
+        </p:txBody>
+      </p:sp>
+      <p:sp>
+        <p:nvSpPr>
+          <p:cNvPr id="37" name="TextBox 36">
+            <a:extLst>
+              <a:ext uri="{FF2B5EF4-FFF2-40B4-BE49-F238E27FC236}">
+                <a16:creationId xmlns:a16="http://schemas.microsoft.com/office/drawing/2014/main" id="{5050D63D-481F-4F77-B2C9-AD6FF9537F8C}"/>
+              </a:ext>
+            </a:extLst>
+          </p:cNvPr>
+          <p:cNvSpPr txBox="1"/>
+          <p:nvPr/>
+        </p:nvSpPr>
+        <p:spPr>
+          <a:xfrm>
+            <a:off x="1967911" y="6368307"/>
+            <a:ext cx="3635611" cy="369332"/>
+          </a:xfrm>
+          <a:prstGeom prst="rect">
+            <a:avLst/>
+          </a:prstGeom>
+          <a:noFill/>
+        </p:spPr>
+        <p:txBody>
+          <a:bodyPr wrap="none" rtlCol="0">
+            <a:spAutoFit/>
+          </a:bodyPr>
+          <a:lstStyle/>
+          <a:p>
+            <a:r>
+              <a:rPr lang="en-US" dirty="0"/>
+              <a:t>Comparison. In format </a:t>
+            </a:r>
+            <a:r>
+              <a:rPr lang="en-US" dirty="0" err="1"/>
+              <a:t>XvsY</a:t>
+            </a:r>
+            <a:r>
+              <a:rPr lang="en-US" dirty="0"/>
+              <a:t> or X vs Y.</a:t>
+            </a:r>
+            <a:endParaRPr lang="en-NL" dirty="0"/>
+          </a:p>
+        </p:txBody>
+      </p:sp>
+      <p:sp>
+        <p:nvSpPr>
+          <p:cNvPr id="19" name="TextBox 18">
+            <a:extLst>
+              <a:ext uri="{FF2B5EF4-FFF2-40B4-BE49-F238E27FC236}">
+                <a16:creationId xmlns:a16="http://schemas.microsoft.com/office/drawing/2014/main" id="{1D1A1865-A85D-47C3-BEF2-9992B8E812D0}"/>
+              </a:ext>
+            </a:extLst>
+          </p:cNvPr>
+          <p:cNvSpPr txBox="1"/>
+          <p:nvPr/>
+        </p:nvSpPr>
+        <p:spPr>
+          <a:xfrm>
+            <a:off x="0" y="0"/>
+            <a:ext cx="800219" cy="6858000"/>
+          </a:xfrm>
+          <a:prstGeom prst="rect">
+            <a:avLst/>
+          </a:prstGeom>
+          <a:solidFill>
+            <a:srgbClr val="00B050"/>
+          </a:solidFill>
+        </p:spPr>
+        <p:txBody>
+          <a:bodyPr vert="vert270" wrap="square" rtlCol="0">
+            <a:spAutoFit/>
+          </a:bodyPr>
+          <a:lstStyle/>
+          <a:p>
+            <a:pPr algn="ctr"/>
+            <a:r>
+              <a:rPr lang="en-GB" sz="4000" b="1" dirty="0" err="1">
+                <a:solidFill>
+                  <a:schemeClr val="bg1"/>
+                </a:solidFill>
+              </a:rPr>
+              <a:t>Tercen</a:t>
+            </a:r>
+            <a:endParaRPr lang="en-NL" sz="4000" b="1" dirty="0">
+              <a:solidFill>
+                <a:schemeClr val="bg1"/>
+              </a:solidFill>
+            </a:endParaRPr>
+          </a:p>
+        </p:txBody>
+      </p:sp>
+      <p:cxnSp>
+        <p:nvCxnSpPr>
+          <p:cNvPr id="13" name="Straight Connector 12">
+            <a:extLst>
+              <a:ext uri="{FF2B5EF4-FFF2-40B4-BE49-F238E27FC236}">
+                <a16:creationId xmlns:a16="http://schemas.microsoft.com/office/drawing/2014/main" id="{D95BD96F-A661-735B-8595-BD00180A6AAC}"/>
+              </a:ext>
+            </a:extLst>
+          </p:cNvPr>
+          <p:cNvCxnSpPr>
+            <a:cxnSpLocks/>
+          </p:cNvCxnSpPr>
+          <p:nvPr/>
+        </p:nvCxnSpPr>
+        <p:spPr>
+          <a:xfrm>
+            <a:off x="3076992" y="2738644"/>
+            <a:ext cx="666948" cy="0"/>
+          </a:xfrm>
+          <a:prstGeom prst="line">
+            <a:avLst/>
+          </a:prstGeom>
+          <a:ln w="38100">
+            <a:solidFill>
+              <a:srgbClr val="7030A0"/>
+            </a:solidFill>
+          </a:ln>
+        </p:spPr>
+        <p:style>
+          <a:lnRef idx="1">
+            <a:schemeClr val="accent6"/>
+          </a:lnRef>
+          <a:fillRef idx="0">
+            <a:schemeClr val="accent6"/>
+          </a:fillRef>
+          <a:effectRef idx="0">
+            <a:schemeClr val="accent6"/>
+          </a:effectRef>
+          <a:fontRef idx="minor">
+            <a:schemeClr val="tx1"/>
+          </a:fontRef>
+        </p:style>
+      </p:cxnSp>
+      <p:sp>
+        <p:nvSpPr>
+          <p:cNvPr id="16" name="Rectangle 15">
+            <a:extLst>
+              <a:ext uri="{FF2B5EF4-FFF2-40B4-BE49-F238E27FC236}">
+                <a16:creationId xmlns:a16="http://schemas.microsoft.com/office/drawing/2014/main" id="{40090164-D319-7A29-99D4-F86A47D359AB}"/>
+              </a:ext>
+            </a:extLst>
+          </p:cNvPr>
+          <p:cNvSpPr/>
+          <p:nvPr/>
+        </p:nvSpPr>
+        <p:spPr>
+          <a:xfrm>
+            <a:off x="1629462" y="5644093"/>
+            <a:ext cx="338447" cy="326572"/>
+          </a:xfrm>
+          <a:prstGeom prst="rect">
+            <a:avLst/>
+          </a:prstGeom>
+          <a:solidFill>
+            <a:srgbClr val="7030A0"/>
+          </a:solidFill>
+          <a:ln>
+            <a:solidFill>
+              <a:srgbClr val="7030A0"/>
+            </a:solidFill>
+          </a:ln>
+        </p:spPr>
+        <p:style>
+          <a:lnRef idx="2">
+            <a:schemeClr val="accent1">
+              <a:shade val="50000"/>
+            </a:schemeClr>
+          </a:lnRef>
+          <a:fillRef idx="1">
+            <a:schemeClr val="accent1"/>
+          </a:fillRef>
+          <a:effectRef idx="0">
+            <a:schemeClr val="accent1"/>
+          </a:effectRef>
+          <a:fontRef idx="minor">
+            <a:schemeClr val="lt1"/>
+          </a:fontRef>
+        </p:style>
+        <p:txBody>
+          <a:bodyPr rtlCol="0" anchor="ctr"/>
+          <a:lstStyle/>
+          <a:p>
+            <a:pPr algn="ctr"/>
+            <a:endParaRPr lang="en-NL"/>
+          </a:p>
+        </p:txBody>
+      </p:sp>
+      <p:sp>
+        <p:nvSpPr>
+          <p:cNvPr id="17" name="TextBox 16">
+            <a:extLst>
+              <a:ext uri="{FF2B5EF4-FFF2-40B4-BE49-F238E27FC236}">
+                <a16:creationId xmlns:a16="http://schemas.microsoft.com/office/drawing/2014/main" id="{C74285C0-AE65-B55A-D6D9-E0BD7E70784A}"/>
+              </a:ext>
+            </a:extLst>
+          </p:cNvPr>
+          <p:cNvSpPr txBox="1"/>
+          <p:nvPr/>
+        </p:nvSpPr>
+        <p:spPr>
+          <a:xfrm>
+            <a:off x="1967910" y="5634681"/>
+            <a:ext cx="4128090" cy="646331"/>
+          </a:xfrm>
+          <a:prstGeom prst="rect">
+            <a:avLst/>
+          </a:prstGeom>
+          <a:noFill/>
+        </p:spPr>
+        <p:txBody>
+          <a:bodyPr wrap="square" rtlCol="0">
+            <a:spAutoFit/>
+          </a:bodyPr>
+          <a:lstStyle/>
+          <a:p>
+            <a:r>
+              <a:rPr lang="hu-HU" dirty="0"/>
+              <a:t>Supergroup. If you don’t have supergroup, name it as something neutral, e.g. Test</a:t>
+            </a:r>
+            <a:endParaRPr lang="en-NL" dirty="0"/>
+          </a:p>
+        </p:txBody>
+      </p:sp>
+      <p:cxnSp>
+        <p:nvCxnSpPr>
+          <p:cNvPr id="22" name="Straight Arrow Connector 21">
+            <a:extLst>
+              <a:ext uri="{FF2B5EF4-FFF2-40B4-BE49-F238E27FC236}">
+                <a16:creationId xmlns:a16="http://schemas.microsoft.com/office/drawing/2014/main" id="{1F181CFE-45A5-5609-94FE-E34CD218F3F7}"/>
+              </a:ext>
+            </a:extLst>
+          </p:cNvPr>
+          <p:cNvCxnSpPr/>
+          <p:nvPr/>
+        </p:nvCxnSpPr>
+        <p:spPr>
+          <a:xfrm>
+            <a:off x="2505492" y="2924175"/>
+            <a:ext cx="0" cy="504825"/>
+          </a:xfrm>
+          <a:prstGeom prst="straightConnector1">
+            <a:avLst/>
+          </a:prstGeom>
+          <a:ln w="28575">
+            <a:solidFill>
+              <a:schemeClr val="tx1"/>
+            </a:solidFill>
+            <a:tailEnd type="triangle"/>
+          </a:ln>
+        </p:spPr>
+        <p:style>
+          <a:lnRef idx="1">
+            <a:schemeClr val="accent1"/>
+          </a:lnRef>
+          <a:fillRef idx="0">
+            <a:schemeClr val="accent1"/>
+          </a:fillRef>
+          <a:effectRef idx="0">
+            <a:schemeClr val="accent1"/>
+          </a:effectRef>
+          <a:fontRef idx="minor">
+            <a:schemeClr val="tx1"/>
+          </a:fontRef>
+        </p:style>
+      </p:cxnSp>
+      <p:sp>
+        <p:nvSpPr>
+          <p:cNvPr id="25" name="TextBox 24">
+            <a:extLst>
+              <a:ext uri="{FF2B5EF4-FFF2-40B4-BE49-F238E27FC236}">
+                <a16:creationId xmlns:a16="http://schemas.microsoft.com/office/drawing/2014/main" id="{1BAFB8DF-0F08-A17A-3081-8CC847EFE472}"/>
+              </a:ext>
+            </a:extLst>
+          </p:cNvPr>
+          <p:cNvSpPr txBox="1"/>
+          <p:nvPr/>
+        </p:nvSpPr>
+        <p:spPr>
+          <a:xfrm>
+            <a:off x="989332" y="3460363"/>
+            <a:ext cx="4324598" cy="646331"/>
+          </a:xfrm>
+          <a:prstGeom prst="rect">
+            <a:avLst/>
+          </a:prstGeom>
+          <a:noFill/>
+        </p:spPr>
+        <p:txBody>
+          <a:bodyPr wrap="square" rtlCol="0">
+            <a:spAutoFit/>
+          </a:bodyPr>
+          <a:lstStyle/>
+          <a:p>
+            <a:r>
+              <a:rPr lang="en-US" dirty="0"/>
+              <a:t>UKA_PTK_01_</a:t>
+            </a:r>
+            <a:r>
+              <a:rPr lang="hu-HU" dirty="0"/>
+              <a:t>Sgroup1 - T1 </a:t>
+            </a:r>
+            <a:r>
+              <a:rPr lang="en-US" dirty="0"/>
+              <a:t>vs</a:t>
+            </a:r>
+            <a:r>
+              <a:rPr lang="hu-HU" dirty="0"/>
+              <a:t> C</a:t>
+            </a:r>
+            <a:r>
+              <a:rPr lang="en-US" dirty="0"/>
+              <a:t>.csv</a:t>
+            </a:r>
+            <a:endParaRPr lang="hu-HU" dirty="0"/>
+          </a:p>
+          <a:p>
+            <a:r>
+              <a:rPr lang="en-US" dirty="0"/>
+              <a:t>UKA_PTK_0</a:t>
+            </a:r>
+            <a:r>
+              <a:rPr lang="hu-HU" dirty="0"/>
+              <a:t>2</a:t>
+            </a:r>
+            <a:r>
+              <a:rPr lang="en-US" dirty="0"/>
+              <a:t>_</a:t>
+            </a:r>
+            <a:r>
+              <a:rPr lang="hu-HU" dirty="0"/>
+              <a:t>Sgroup1 - T2 </a:t>
+            </a:r>
+            <a:r>
+              <a:rPr lang="en-US" dirty="0"/>
+              <a:t>vs</a:t>
+            </a:r>
+            <a:r>
+              <a:rPr lang="hu-HU" dirty="0"/>
+              <a:t> C</a:t>
+            </a:r>
+            <a:r>
+              <a:rPr lang="en-US" dirty="0"/>
+              <a:t>.csv</a:t>
+            </a:r>
+            <a:endParaRPr lang="en-NL" dirty="0"/>
+          </a:p>
+        </p:txBody>
+      </p:sp>
+      <p:sp>
+        <p:nvSpPr>
+          <p:cNvPr id="26" name="TextBox 25">
+            <a:extLst>
+              <a:ext uri="{FF2B5EF4-FFF2-40B4-BE49-F238E27FC236}">
+                <a16:creationId xmlns:a16="http://schemas.microsoft.com/office/drawing/2014/main" id="{CA08AB1B-AFD6-4850-5EE8-6776E97087FD}"/>
+              </a:ext>
+            </a:extLst>
+          </p:cNvPr>
+          <p:cNvSpPr txBox="1"/>
+          <p:nvPr/>
+        </p:nvSpPr>
+        <p:spPr>
+          <a:xfrm>
+            <a:off x="7418194" y="2443396"/>
+            <a:ext cx="4324598" cy="369332"/>
+          </a:xfrm>
+          <a:prstGeom prst="rect">
+            <a:avLst/>
+          </a:prstGeom>
+          <a:noFill/>
+        </p:spPr>
+        <p:txBody>
+          <a:bodyPr wrap="square" rtlCol="0">
+            <a:spAutoFit/>
+          </a:bodyPr>
+          <a:lstStyle/>
+          <a:p>
+            <a:r>
+              <a:rPr lang="en-US" dirty="0"/>
+              <a:t>UKA_PTK_01_</a:t>
+            </a:r>
+            <a:r>
+              <a:rPr lang="hu-HU" dirty="0"/>
+              <a:t>ukat-T </a:t>
+            </a:r>
+            <a:r>
+              <a:rPr lang="en-US" dirty="0"/>
+              <a:t>vs</a:t>
+            </a:r>
+            <a:r>
+              <a:rPr lang="hu-HU" dirty="0"/>
+              <a:t> C</a:t>
+            </a:r>
+            <a:r>
+              <a:rPr lang="en-US" dirty="0"/>
+              <a:t>.csv</a:t>
+            </a:r>
+            <a:endParaRPr lang="en-NL" dirty="0"/>
+          </a:p>
+        </p:txBody>
+      </p:sp>
+      <p:cxnSp>
+        <p:nvCxnSpPr>
+          <p:cNvPr id="27" name="Straight Connector 26">
+            <a:extLst>
+              <a:ext uri="{FF2B5EF4-FFF2-40B4-BE49-F238E27FC236}">
+                <a16:creationId xmlns:a16="http://schemas.microsoft.com/office/drawing/2014/main" id="{C330B02D-BC7B-2FD2-87CE-44DDFA74EB8B}"/>
+              </a:ext>
+            </a:extLst>
+          </p:cNvPr>
+          <p:cNvCxnSpPr>
+            <a:cxnSpLocks/>
+          </p:cNvCxnSpPr>
+          <p:nvPr/>
+        </p:nvCxnSpPr>
+        <p:spPr>
+          <a:xfrm>
+            <a:off x="7521113" y="2731373"/>
+            <a:ext cx="380011" cy="0"/>
+          </a:xfrm>
+          <a:prstGeom prst="line">
+            <a:avLst/>
+          </a:prstGeom>
+          <a:ln w="38100"/>
+        </p:spPr>
+        <p:style>
+          <a:lnRef idx="1">
+            <a:schemeClr val="accent1"/>
+          </a:lnRef>
+          <a:fillRef idx="0">
+            <a:schemeClr val="accent1"/>
+          </a:fillRef>
+          <a:effectRef idx="0">
+            <a:schemeClr val="accent1"/>
+          </a:effectRef>
+          <a:fontRef idx="minor">
+            <a:schemeClr val="tx1"/>
+          </a:fontRef>
+        </p:style>
+      </p:cxnSp>
+      <p:cxnSp>
+        <p:nvCxnSpPr>
+          <p:cNvPr id="28" name="Straight Connector 27">
+            <a:extLst>
+              <a:ext uri="{FF2B5EF4-FFF2-40B4-BE49-F238E27FC236}">
+                <a16:creationId xmlns:a16="http://schemas.microsoft.com/office/drawing/2014/main" id="{A60895ED-ABBC-7871-15FA-B53B1621EDDD}"/>
+              </a:ext>
+            </a:extLst>
+          </p:cNvPr>
+          <p:cNvCxnSpPr>
+            <a:cxnSpLocks/>
+          </p:cNvCxnSpPr>
+          <p:nvPr/>
+        </p:nvCxnSpPr>
+        <p:spPr>
+          <a:xfrm>
+            <a:off x="8047586" y="2731373"/>
+            <a:ext cx="279070" cy="0"/>
+          </a:xfrm>
+          <a:prstGeom prst="line">
+            <a:avLst/>
+          </a:prstGeom>
+          <a:ln w="38100"/>
+        </p:spPr>
+        <p:style>
+          <a:lnRef idx="1">
+            <a:schemeClr val="accent2"/>
+          </a:lnRef>
+          <a:fillRef idx="0">
+            <a:schemeClr val="accent2"/>
+          </a:fillRef>
+          <a:effectRef idx="0">
+            <a:schemeClr val="accent2"/>
+          </a:effectRef>
+          <a:fontRef idx="minor">
+            <a:schemeClr val="tx1"/>
+          </a:fontRef>
+        </p:style>
+      </p:cxnSp>
+      <p:cxnSp>
+        <p:nvCxnSpPr>
+          <p:cNvPr id="29" name="Straight Connector 28">
+            <a:extLst>
+              <a:ext uri="{FF2B5EF4-FFF2-40B4-BE49-F238E27FC236}">
+                <a16:creationId xmlns:a16="http://schemas.microsoft.com/office/drawing/2014/main" id="{96678F81-A502-54AF-F9B3-E011875CE0BE}"/>
+              </a:ext>
+            </a:extLst>
+          </p:cNvPr>
+          <p:cNvCxnSpPr>
+            <a:cxnSpLocks/>
+          </p:cNvCxnSpPr>
+          <p:nvPr/>
+        </p:nvCxnSpPr>
+        <p:spPr>
+          <a:xfrm>
+            <a:off x="8500828" y="2731373"/>
+            <a:ext cx="178129" cy="0"/>
+          </a:xfrm>
+          <a:prstGeom prst="line">
+            <a:avLst/>
+          </a:prstGeom>
+          <a:ln w="38100"/>
+        </p:spPr>
+        <p:style>
+          <a:lnRef idx="1">
+            <a:schemeClr val="accent6"/>
+          </a:lnRef>
+          <a:fillRef idx="0">
+            <a:schemeClr val="accent6"/>
+          </a:fillRef>
+          <a:effectRef idx="0">
+            <a:schemeClr val="accent6"/>
+          </a:effectRef>
+          <a:fontRef idx="minor">
+            <a:schemeClr val="tx1"/>
+          </a:fontRef>
+        </p:style>
+      </p:cxnSp>
+      <p:cxnSp>
+        <p:nvCxnSpPr>
+          <p:cNvPr id="38" name="Straight Connector 37">
+            <a:extLst>
+              <a:ext uri="{FF2B5EF4-FFF2-40B4-BE49-F238E27FC236}">
+                <a16:creationId xmlns:a16="http://schemas.microsoft.com/office/drawing/2014/main" id="{9533F203-742B-1EFA-3A99-BE786636D6F7}"/>
+              </a:ext>
+            </a:extLst>
+          </p:cNvPr>
+          <p:cNvCxnSpPr>
+            <a:cxnSpLocks/>
+          </p:cNvCxnSpPr>
+          <p:nvPr/>
+        </p:nvCxnSpPr>
+        <p:spPr>
+          <a:xfrm>
+            <a:off x="9315500" y="2759890"/>
+            <a:ext cx="638125" cy="0"/>
+          </a:xfrm>
+          <a:prstGeom prst="line">
+            <a:avLst/>
+          </a:prstGeom>
+          <a:ln w="38100">
+            <a:solidFill>
+              <a:srgbClr val="FF0000"/>
+            </a:solidFill>
+          </a:ln>
+        </p:spPr>
+        <p:style>
+          <a:lnRef idx="1">
+            <a:schemeClr val="accent6"/>
+          </a:lnRef>
+          <a:fillRef idx="0">
+            <a:schemeClr val="accent6"/>
+          </a:fillRef>
+          <a:effectRef idx="0">
+            <a:schemeClr val="accent6"/>
+          </a:effectRef>
+          <a:fontRef idx="minor">
+            <a:schemeClr val="tx1"/>
+          </a:fontRef>
+        </p:style>
+      </p:cxnSp>
+      <p:cxnSp>
+        <p:nvCxnSpPr>
+          <p:cNvPr id="40" name="Straight Arrow Connector 39">
+            <a:extLst>
+              <a:ext uri="{FF2B5EF4-FFF2-40B4-BE49-F238E27FC236}">
+                <a16:creationId xmlns:a16="http://schemas.microsoft.com/office/drawing/2014/main" id="{4CFBB447-B69B-6A87-99CA-3AB633292D12}"/>
+              </a:ext>
+            </a:extLst>
+          </p:cNvPr>
+          <p:cNvCxnSpPr>
+            <a:cxnSpLocks/>
+          </p:cNvCxnSpPr>
+          <p:nvPr/>
+        </p:nvCxnSpPr>
+        <p:spPr>
+          <a:xfrm>
+            <a:off x="8829725" y="2947723"/>
+            <a:ext cx="0" cy="244513"/>
+          </a:xfrm>
+          <a:prstGeom prst="straightConnector1">
+            <a:avLst/>
+          </a:prstGeom>
+          <a:ln w="28575">
+            <a:solidFill>
+              <a:schemeClr val="tx1"/>
+            </a:solidFill>
+            <a:tailEnd type="triangle"/>
+          </a:ln>
+        </p:spPr>
+        <p:style>
+          <a:lnRef idx="1">
+            <a:schemeClr val="accent1"/>
+          </a:lnRef>
+          <a:fillRef idx="0">
+            <a:schemeClr val="accent1"/>
+          </a:fillRef>
+          <a:effectRef idx="0">
+            <a:schemeClr val="accent1"/>
+          </a:effectRef>
+          <a:fontRef idx="minor">
+            <a:schemeClr val="tx1"/>
+          </a:fontRef>
+        </p:style>
+      </p:cxnSp>
+      <p:sp>
+        <p:nvSpPr>
+          <p:cNvPr id="41" name="TextBox 40">
+            <a:extLst>
+              <a:ext uri="{FF2B5EF4-FFF2-40B4-BE49-F238E27FC236}">
+                <a16:creationId xmlns:a16="http://schemas.microsoft.com/office/drawing/2014/main" id="{5F41557C-1489-5613-D522-14BE953BE228}"/>
+              </a:ext>
+            </a:extLst>
+          </p:cNvPr>
+          <p:cNvSpPr txBox="1"/>
+          <p:nvPr/>
+        </p:nvSpPr>
+        <p:spPr>
+          <a:xfrm>
+            <a:off x="7397978" y="3262514"/>
+            <a:ext cx="4324598" cy="646331"/>
+          </a:xfrm>
+          <a:prstGeom prst="rect">
+            <a:avLst/>
+          </a:prstGeom>
+          <a:noFill/>
+        </p:spPr>
+        <p:txBody>
+          <a:bodyPr wrap="square" rtlCol="0">
+            <a:spAutoFit/>
+          </a:bodyPr>
+          <a:lstStyle/>
+          <a:p>
+            <a:r>
+              <a:rPr lang="en-US" dirty="0"/>
+              <a:t>UKA_PTK_01_</a:t>
+            </a:r>
+            <a:r>
+              <a:rPr lang="hu-HU" dirty="0"/>
+              <a:t>Sgroup1 – T </a:t>
+            </a:r>
+            <a:r>
+              <a:rPr lang="en-US" dirty="0"/>
+              <a:t>vs</a:t>
+            </a:r>
+            <a:r>
+              <a:rPr lang="hu-HU" dirty="0"/>
+              <a:t> C</a:t>
+            </a:r>
+            <a:r>
+              <a:rPr lang="en-US" dirty="0"/>
+              <a:t>.csv</a:t>
+            </a:r>
+            <a:endParaRPr lang="hu-HU" dirty="0"/>
+          </a:p>
+          <a:p>
+            <a:r>
+              <a:rPr lang="en-US" dirty="0"/>
+              <a:t>UKA_PTK_0</a:t>
+            </a:r>
+            <a:r>
+              <a:rPr lang="hu-HU" dirty="0"/>
+              <a:t>2</a:t>
+            </a:r>
+            <a:r>
+              <a:rPr lang="en-US" dirty="0"/>
+              <a:t>_</a:t>
+            </a:r>
+            <a:r>
+              <a:rPr lang="hu-HU" dirty="0"/>
+              <a:t>Sgroup2 – T </a:t>
+            </a:r>
+            <a:r>
+              <a:rPr lang="en-US" dirty="0"/>
+              <a:t>vs</a:t>
+            </a:r>
+            <a:r>
+              <a:rPr lang="hu-HU" dirty="0"/>
+              <a:t> C</a:t>
+            </a:r>
+            <a:r>
+              <a:rPr lang="en-US" dirty="0"/>
+              <a:t>.csv</a:t>
+            </a:r>
+            <a:endParaRPr lang="en-NL" dirty="0"/>
+          </a:p>
+        </p:txBody>
+      </p:sp>
+      <p:sp>
+        <p:nvSpPr>
+          <p:cNvPr id="42" name="Content Placeholder 2">
+            <a:extLst>
+              <a:ext uri="{FF2B5EF4-FFF2-40B4-BE49-F238E27FC236}">
+                <a16:creationId xmlns:a16="http://schemas.microsoft.com/office/drawing/2014/main" id="{99800858-2E02-A5E7-987E-9C3B057972B1}"/>
+              </a:ext>
+            </a:extLst>
+          </p:cNvPr>
+          <p:cNvSpPr txBox="1">
+            <a:spLocks/>
+          </p:cNvSpPr>
+          <p:nvPr/>
+        </p:nvSpPr>
+        <p:spPr>
+          <a:xfrm>
+            <a:off x="7052504" y="1664078"/>
+            <a:ext cx="4670072" cy="536188"/>
+          </a:xfrm>
+          <a:prstGeom prst="rect">
+            <a:avLst/>
+          </a:prstGeom>
+        </p:spPr>
+        <p:txBody>
+          <a:bodyPr vert="horz" lIns="91440" tIns="45720" rIns="91440" bIns="45720" rtlCol="0">
+            <a:normAutofit/>
+          </a:bodyPr>
+          <a:lstStyle>
+            <a:lvl1pPr marL="228600" indent="-228600" algn="l" defTabSz="914400" rtl="0" eaLnBrk="1" latinLnBrk="0" hangingPunct="1">
+              <a:lnSpc>
+                <a:spcPct val="90000"/>
+              </a:lnSpc>
+              <a:spcBef>
+                <a:spcPts val="1000"/>
+              </a:spcBef>
+              <a:buFont typeface="Arial" panose="020B0604020202020204" pitchFamily="34" charset="0"/>
+              <a:buChar char="•"/>
+              <a:defRPr sz="2800" kern="1200">
+                <a:solidFill>
+                  <a:schemeClr val="tx1"/>
+                </a:solidFill>
+                <a:latin typeface="+mn-lt"/>
+                <a:ea typeface="+mn-ea"/>
+                <a:cs typeface="+mn-cs"/>
+              </a:defRPr>
+            </a:lvl1pPr>
+            <a:lvl2pPr marL="685800" indent="-228600" algn="l" defTabSz="914400" rtl="0" eaLnBrk="1" latinLnBrk="0" hangingPunct="1">
+              <a:lnSpc>
+                <a:spcPct val="90000"/>
+              </a:lnSpc>
+              <a:spcBef>
+                <a:spcPts val="500"/>
+              </a:spcBef>
+              <a:buFont typeface="Arial" panose="020B0604020202020204" pitchFamily="34" charset="0"/>
+              <a:buChar char="•"/>
+              <a:defRPr sz="2400" kern="1200">
+                <a:solidFill>
+                  <a:schemeClr val="tx1"/>
+                </a:solidFill>
+                <a:latin typeface="+mn-lt"/>
+                <a:ea typeface="+mn-ea"/>
+                <a:cs typeface="+mn-cs"/>
+              </a:defRPr>
+            </a:lvl2pPr>
+            <a:lvl3pPr marL="1143000" indent="-228600" algn="l" defTabSz="914400" rtl="0" eaLnBrk="1" latinLnBrk="0" hangingPunct="1">
+              <a:lnSpc>
+                <a:spcPct val="90000"/>
+              </a:lnSpc>
+              <a:spcBef>
+                <a:spcPts val="500"/>
+              </a:spcBef>
+              <a:buFont typeface="Arial" panose="020B0604020202020204" pitchFamily="34" charset="0"/>
+              <a:buChar char="•"/>
+              <a:defRPr sz="2000" kern="1200">
+                <a:solidFill>
+                  <a:schemeClr val="tx1"/>
+                </a:solidFill>
+                <a:latin typeface="+mn-lt"/>
+                <a:ea typeface="+mn-ea"/>
+                <a:cs typeface="+mn-cs"/>
+              </a:defRPr>
+            </a:lvl3pPr>
+            <a:lvl4pPr marL="1600200" indent="-228600" algn="l" defTabSz="914400" rtl="0" eaLnBrk="1" latinLnBrk="0" hangingPunct="1">
+              <a:lnSpc>
+                <a:spcPct val="90000"/>
+              </a:lnSpc>
+              <a:spcBef>
+                <a:spcPts val="500"/>
+              </a:spcBef>
+              <a:buFont typeface="Arial" panose="020B0604020202020204" pitchFamily="34" charset="0"/>
+              <a:buChar char="•"/>
+              <a:defRPr sz="1800" kern="1200">
+                <a:solidFill>
+                  <a:schemeClr val="tx1"/>
+                </a:solidFill>
+                <a:latin typeface="+mn-lt"/>
+                <a:ea typeface="+mn-ea"/>
+                <a:cs typeface="+mn-cs"/>
+              </a:defRPr>
+            </a:lvl4pPr>
+            <a:lvl5pPr marL="2057400" indent="-228600" algn="l" defTabSz="914400" rtl="0" eaLnBrk="1" latinLnBrk="0" hangingPunct="1">
+              <a:lnSpc>
+                <a:spcPct val="90000"/>
+              </a:lnSpc>
+              <a:spcBef>
+                <a:spcPts val="500"/>
+              </a:spcBef>
+              <a:buFont typeface="Arial" panose="020B0604020202020204" pitchFamily="34" charset="0"/>
+              <a:buChar char="•"/>
+              <a:defRPr sz="1800" kern="1200">
+                <a:solidFill>
+                  <a:schemeClr val="tx1"/>
+                </a:solidFill>
+                <a:latin typeface="+mn-lt"/>
+                <a:ea typeface="+mn-ea"/>
+                <a:cs typeface="+mn-cs"/>
+              </a:defRPr>
+            </a:lvl5pPr>
+            <a:lvl6pPr marL="2514600" indent="-228600" algn="l" defTabSz="914400" rtl="0" eaLnBrk="1" latinLnBrk="0" hangingPunct="1">
+              <a:lnSpc>
+                <a:spcPct val="90000"/>
+              </a:lnSpc>
+              <a:spcBef>
+                <a:spcPts val="500"/>
+              </a:spcBef>
+              <a:buFont typeface="Arial" panose="020B0604020202020204" pitchFamily="34" charset="0"/>
+              <a:buChar char="•"/>
+              <a:defRPr sz="1800" kern="1200">
+                <a:solidFill>
+                  <a:schemeClr val="tx1"/>
+                </a:solidFill>
+                <a:latin typeface="+mn-lt"/>
+                <a:ea typeface="+mn-ea"/>
+                <a:cs typeface="+mn-cs"/>
+              </a:defRPr>
+            </a:lvl6pPr>
+            <a:lvl7pPr marL="2971800" indent="-228600" algn="l" defTabSz="914400" rtl="0" eaLnBrk="1" latinLnBrk="0" hangingPunct="1">
+              <a:lnSpc>
+                <a:spcPct val="90000"/>
+              </a:lnSpc>
+              <a:spcBef>
+                <a:spcPts val="500"/>
+              </a:spcBef>
+              <a:buFont typeface="Arial" panose="020B0604020202020204" pitchFamily="34" charset="0"/>
+              <a:buChar char="•"/>
+              <a:defRPr sz="1800" kern="1200">
+                <a:solidFill>
+                  <a:schemeClr val="tx1"/>
+                </a:solidFill>
+                <a:latin typeface="+mn-lt"/>
+                <a:ea typeface="+mn-ea"/>
+                <a:cs typeface="+mn-cs"/>
+              </a:defRPr>
+            </a:lvl7pPr>
+            <a:lvl8pPr marL="3429000" indent="-228600" algn="l" defTabSz="914400" rtl="0" eaLnBrk="1" latinLnBrk="0" hangingPunct="1">
+              <a:lnSpc>
+                <a:spcPct val="90000"/>
+              </a:lnSpc>
+              <a:spcBef>
+                <a:spcPts val="500"/>
+              </a:spcBef>
+              <a:buFont typeface="Arial" panose="020B0604020202020204" pitchFamily="34" charset="0"/>
+              <a:buChar char="•"/>
+              <a:defRPr sz="1800" kern="1200">
+                <a:solidFill>
+                  <a:schemeClr val="tx1"/>
+                </a:solidFill>
+                <a:latin typeface="+mn-lt"/>
+                <a:ea typeface="+mn-ea"/>
+                <a:cs typeface="+mn-cs"/>
+              </a:defRPr>
+            </a:lvl8pPr>
+            <a:lvl9pPr marL="3886200" indent="-228600" algn="l" defTabSz="914400" rtl="0" eaLnBrk="1" latinLnBrk="0" hangingPunct="1">
+              <a:lnSpc>
+                <a:spcPct val="90000"/>
+              </a:lnSpc>
+              <a:spcBef>
+                <a:spcPts val="500"/>
+              </a:spcBef>
+              <a:buFont typeface="Arial" panose="020B0604020202020204" pitchFamily="34" charset="0"/>
+              <a:buChar char="•"/>
+              <a:defRPr sz="1800" kern="1200">
+                <a:solidFill>
+                  <a:schemeClr val="tx1"/>
+                </a:solidFill>
+                <a:latin typeface="+mn-lt"/>
+                <a:ea typeface="+mn-ea"/>
+                <a:cs typeface="+mn-cs"/>
+              </a:defRPr>
+            </a:lvl9pPr>
+          </a:lstStyle>
+          <a:p>
+            <a:pPr marL="0" indent="0">
+              <a:buFont typeface="Arial" panose="020B0604020202020204" pitchFamily="34" charset="0"/>
+              <a:buNone/>
+            </a:pPr>
+            <a:r>
+              <a:rPr lang="hu-HU" dirty="0"/>
+              <a:t>UKA TGC f</a:t>
+            </a:r>
+            <a:r>
+              <a:rPr lang="en-US" dirty="0" err="1"/>
+              <a:t>ilename</a:t>
+            </a:r>
+            <a:r>
+              <a:rPr lang="en-US" dirty="0"/>
+              <a:t> structure:</a:t>
+            </a:r>
+            <a:endParaRPr lang="en-NL" dirty="0"/>
+          </a:p>
+        </p:txBody>
+      </p:sp>
+      <p:sp>
+        <p:nvSpPr>
+          <p:cNvPr id="44" name="TextBox 43">
+            <a:extLst>
+              <a:ext uri="{FF2B5EF4-FFF2-40B4-BE49-F238E27FC236}">
+                <a16:creationId xmlns:a16="http://schemas.microsoft.com/office/drawing/2014/main" id="{AF5CDD23-1C1A-916B-E7A5-4B4AED08F4AC}"/>
+              </a:ext>
+            </a:extLst>
+          </p:cNvPr>
+          <p:cNvSpPr txBox="1"/>
+          <p:nvPr/>
+        </p:nvSpPr>
+        <p:spPr>
+          <a:xfrm>
+            <a:off x="7397978" y="4577650"/>
+            <a:ext cx="4324598" cy="369332"/>
+          </a:xfrm>
+          <a:prstGeom prst="rect">
+            <a:avLst/>
+          </a:prstGeom>
+          <a:noFill/>
+        </p:spPr>
+        <p:txBody>
+          <a:bodyPr wrap="square" rtlCol="0">
+            <a:spAutoFit/>
+          </a:bodyPr>
+          <a:lstStyle/>
+          <a:p>
+            <a:r>
+              <a:rPr lang="en-US" dirty="0"/>
+              <a:t>UKA_PTK_01_</a:t>
+            </a:r>
+            <a:r>
+              <a:rPr lang="hu-HU" dirty="0"/>
+              <a:t>ukat-Sgroup2 </a:t>
+            </a:r>
+            <a:r>
+              <a:rPr lang="en-US" dirty="0"/>
+              <a:t>vs</a:t>
+            </a:r>
+            <a:r>
+              <a:rPr lang="hu-HU" dirty="0"/>
+              <a:t> Sgroup1</a:t>
+            </a:r>
+            <a:r>
+              <a:rPr lang="en-US" dirty="0"/>
+              <a:t>.csv</a:t>
+            </a:r>
+            <a:endParaRPr lang="en-NL" dirty="0"/>
+          </a:p>
+        </p:txBody>
+      </p:sp>
+      <p:cxnSp>
+        <p:nvCxnSpPr>
+          <p:cNvPr id="45" name="Straight Connector 44">
+            <a:extLst>
+              <a:ext uri="{FF2B5EF4-FFF2-40B4-BE49-F238E27FC236}">
+                <a16:creationId xmlns:a16="http://schemas.microsoft.com/office/drawing/2014/main" id="{6B3BF156-F340-878D-AA61-B7D48FFADE36}"/>
+              </a:ext>
+            </a:extLst>
+          </p:cNvPr>
+          <p:cNvCxnSpPr>
+            <a:cxnSpLocks/>
+          </p:cNvCxnSpPr>
+          <p:nvPr/>
+        </p:nvCxnSpPr>
+        <p:spPr>
+          <a:xfrm>
+            <a:off x="7500897" y="4865627"/>
+            <a:ext cx="380011" cy="0"/>
+          </a:xfrm>
+          <a:prstGeom prst="line">
+            <a:avLst/>
+          </a:prstGeom>
+          <a:ln w="38100"/>
+        </p:spPr>
+        <p:style>
+          <a:lnRef idx="1">
+            <a:schemeClr val="accent1"/>
+          </a:lnRef>
+          <a:fillRef idx="0">
+            <a:schemeClr val="accent1"/>
+          </a:fillRef>
+          <a:effectRef idx="0">
+            <a:schemeClr val="accent1"/>
+          </a:effectRef>
+          <a:fontRef idx="minor">
+            <a:schemeClr val="tx1"/>
+          </a:fontRef>
+        </p:style>
+      </p:cxnSp>
+      <p:cxnSp>
+        <p:nvCxnSpPr>
+          <p:cNvPr id="46" name="Straight Connector 45">
+            <a:extLst>
+              <a:ext uri="{FF2B5EF4-FFF2-40B4-BE49-F238E27FC236}">
+                <a16:creationId xmlns:a16="http://schemas.microsoft.com/office/drawing/2014/main" id="{D1F4E8A7-C0C2-2F98-52BF-447F26CAE809}"/>
+              </a:ext>
+            </a:extLst>
+          </p:cNvPr>
+          <p:cNvCxnSpPr>
+            <a:cxnSpLocks/>
+          </p:cNvCxnSpPr>
+          <p:nvPr/>
+        </p:nvCxnSpPr>
+        <p:spPr>
+          <a:xfrm>
+            <a:off x="8027370" y="4865627"/>
+            <a:ext cx="279070" cy="0"/>
+          </a:xfrm>
+          <a:prstGeom prst="line">
+            <a:avLst/>
+          </a:prstGeom>
+          <a:ln w="38100"/>
+        </p:spPr>
+        <p:style>
+          <a:lnRef idx="1">
+            <a:schemeClr val="accent2"/>
+          </a:lnRef>
+          <a:fillRef idx="0">
+            <a:schemeClr val="accent2"/>
+          </a:fillRef>
+          <a:effectRef idx="0">
+            <a:schemeClr val="accent2"/>
+          </a:effectRef>
+          <a:fontRef idx="minor">
+            <a:schemeClr val="tx1"/>
+          </a:fontRef>
+        </p:style>
+      </p:cxnSp>
+      <p:cxnSp>
+        <p:nvCxnSpPr>
+          <p:cNvPr id="47" name="Straight Connector 46">
+            <a:extLst>
+              <a:ext uri="{FF2B5EF4-FFF2-40B4-BE49-F238E27FC236}">
+                <a16:creationId xmlns:a16="http://schemas.microsoft.com/office/drawing/2014/main" id="{B8D7E191-42B3-55D4-6C10-2DA03A5213CA}"/>
+              </a:ext>
+            </a:extLst>
+          </p:cNvPr>
+          <p:cNvCxnSpPr>
+            <a:cxnSpLocks/>
+          </p:cNvCxnSpPr>
+          <p:nvPr/>
+        </p:nvCxnSpPr>
+        <p:spPr>
+          <a:xfrm>
+            <a:off x="8480612" y="4865627"/>
+            <a:ext cx="178129" cy="0"/>
+          </a:xfrm>
+          <a:prstGeom prst="line">
+            <a:avLst/>
+          </a:prstGeom>
+          <a:ln w="38100"/>
+        </p:spPr>
+        <p:style>
+          <a:lnRef idx="1">
+            <a:schemeClr val="accent6"/>
+          </a:lnRef>
+          <a:fillRef idx="0">
+            <a:schemeClr val="accent6"/>
+          </a:fillRef>
+          <a:effectRef idx="0">
+            <a:schemeClr val="accent6"/>
+          </a:effectRef>
+          <a:fontRef idx="minor">
+            <a:schemeClr val="tx1"/>
+          </a:fontRef>
+        </p:style>
+      </p:cxnSp>
+      <p:cxnSp>
+        <p:nvCxnSpPr>
+          <p:cNvPr id="48" name="Straight Connector 47">
+            <a:extLst>
+              <a:ext uri="{FF2B5EF4-FFF2-40B4-BE49-F238E27FC236}">
+                <a16:creationId xmlns:a16="http://schemas.microsoft.com/office/drawing/2014/main" id="{C09B6319-5199-10D8-8702-B7436F95B5D5}"/>
+              </a:ext>
+            </a:extLst>
+          </p:cNvPr>
+          <p:cNvCxnSpPr>
+            <a:cxnSpLocks/>
+          </p:cNvCxnSpPr>
+          <p:nvPr/>
+        </p:nvCxnSpPr>
+        <p:spPr>
+          <a:xfrm>
+            <a:off x="9313208" y="4865627"/>
+            <a:ext cx="1806756" cy="0"/>
+          </a:xfrm>
+          <a:prstGeom prst="line">
+            <a:avLst/>
+          </a:prstGeom>
+          <a:ln w="38100">
+            <a:solidFill>
+              <a:srgbClr val="FF0000"/>
+            </a:solidFill>
+          </a:ln>
+        </p:spPr>
+        <p:style>
+          <a:lnRef idx="1">
+            <a:schemeClr val="accent6"/>
+          </a:lnRef>
+          <a:fillRef idx="0">
+            <a:schemeClr val="accent6"/>
+          </a:fillRef>
+          <a:effectRef idx="0">
+            <a:schemeClr val="accent6"/>
+          </a:effectRef>
+          <a:fontRef idx="minor">
+            <a:schemeClr val="tx1"/>
+          </a:fontRef>
+        </p:style>
+      </p:cxnSp>
+      <p:sp>
+        <p:nvSpPr>
+          <p:cNvPr id="50" name="TextBox 49">
+            <a:extLst>
+              <a:ext uri="{FF2B5EF4-FFF2-40B4-BE49-F238E27FC236}">
+                <a16:creationId xmlns:a16="http://schemas.microsoft.com/office/drawing/2014/main" id="{43297699-B910-187B-F458-D4EEE1163DCA}"/>
+              </a:ext>
+            </a:extLst>
+          </p:cNvPr>
+          <p:cNvSpPr txBox="1"/>
+          <p:nvPr/>
+        </p:nvSpPr>
+        <p:spPr>
+          <a:xfrm>
+            <a:off x="7245949" y="5439835"/>
+            <a:ext cx="4670072" cy="646331"/>
+          </a:xfrm>
+          <a:prstGeom prst="rect">
+            <a:avLst/>
+          </a:prstGeom>
+          <a:noFill/>
+        </p:spPr>
+        <p:txBody>
+          <a:bodyPr wrap="square" rtlCol="0">
+            <a:spAutoFit/>
+          </a:bodyPr>
+          <a:lstStyle/>
+          <a:p>
+            <a:r>
+              <a:rPr lang="en-US" dirty="0"/>
+              <a:t>UKA_PTK_01_</a:t>
+            </a:r>
+            <a:r>
+              <a:rPr lang="hu-HU" dirty="0"/>
+              <a:t>Control - Sgroup2 </a:t>
+            </a:r>
+            <a:r>
+              <a:rPr lang="en-US" dirty="0"/>
+              <a:t>vs</a:t>
+            </a:r>
+            <a:r>
+              <a:rPr lang="hu-HU" dirty="0"/>
+              <a:t> Sgroup1</a:t>
+            </a:r>
+            <a:r>
+              <a:rPr lang="en-US" dirty="0"/>
+              <a:t>.csv</a:t>
+            </a:r>
+            <a:endParaRPr lang="hu-HU" dirty="0"/>
+          </a:p>
+          <a:p>
+            <a:r>
+              <a:rPr lang="en-US" dirty="0"/>
+              <a:t>UKA_PTK_0</a:t>
+            </a:r>
+            <a:r>
+              <a:rPr lang="hu-HU" dirty="0"/>
+              <a:t>2</a:t>
+            </a:r>
+            <a:r>
+              <a:rPr lang="en-US" dirty="0"/>
+              <a:t>_</a:t>
+            </a:r>
+            <a:r>
+              <a:rPr lang="hu-HU" dirty="0"/>
+              <a:t>Test       - Sgroup2 </a:t>
+            </a:r>
+            <a:r>
+              <a:rPr lang="en-US" dirty="0"/>
+              <a:t>vs</a:t>
+            </a:r>
+            <a:r>
+              <a:rPr lang="hu-HU" dirty="0"/>
+              <a:t> Sgroup1</a:t>
+            </a:r>
+            <a:r>
+              <a:rPr lang="en-US" dirty="0"/>
+              <a:t>.csv</a:t>
+            </a:r>
+            <a:endParaRPr lang="en-NL" dirty="0"/>
+          </a:p>
+        </p:txBody>
+      </p:sp>
+      <p:sp>
+        <p:nvSpPr>
+          <p:cNvPr id="54" name="Rectangle 53">
+            <a:extLst>
+              <a:ext uri="{FF2B5EF4-FFF2-40B4-BE49-F238E27FC236}">
+                <a16:creationId xmlns:a16="http://schemas.microsoft.com/office/drawing/2014/main" id="{850884DD-C4A5-9587-3559-B9DD0DC2A8E8}"/>
+              </a:ext>
+            </a:extLst>
+          </p:cNvPr>
+          <p:cNvSpPr/>
+          <p:nvPr/>
+        </p:nvSpPr>
+        <p:spPr>
+          <a:xfrm>
+            <a:off x="3299976" y="3499219"/>
+            <a:ext cx="300474" cy="607475"/>
+          </a:xfrm>
+          <a:prstGeom prst="rect">
+            <a:avLst/>
+          </a:prstGeom>
+          <a:noFill/>
+          <a:ln w="38100">
+            <a:solidFill>
+              <a:srgbClr val="00B0F0"/>
+            </a:solidFill>
+          </a:ln>
+        </p:spPr>
+        <p:style>
+          <a:lnRef idx="2">
+            <a:schemeClr val="accent1">
+              <a:shade val="15000"/>
+            </a:schemeClr>
+          </a:lnRef>
+          <a:fillRef idx="1">
+            <a:schemeClr val="accent1"/>
+          </a:fillRef>
+          <a:effectRef idx="0">
+            <a:schemeClr val="accent1"/>
+          </a:effectRef>
+          <a:fontRef idx="minor">
+            <a:schemeClr val="lt1"/>
+          </a:fontRef>
+        </p:style>
+        <p:txBody>
+          <a:bodyPr rtlCol="0" anchor="ctr"/>
+          <a:lstStyle/>
+          <a:p>
+            <a:pPr algn="ctr"/>
+            <a:endParaRPr lang="en-NL"/>
+          </a:p>
+        </p:txBody>
+      </p:sp>
+      <p:sp>
+        <p:nvSpPr>
+          <p:cNvPr id="56" name="Rectangle 55">
+            <a:extLst>
+              <a:ext uri="{FF2B5EF4-FFF2-40B4-BE49-F238E27FC236}">
+                <a16:creationId xmlns:a16="http://schemas.microsoft.com/office/drawing/2014/main" id="{749DE097-FC5A-14BD-52B7-BA124356CA88}"/>
+              </a:ext>
+            </a:extLst>
+          </p:cNvPr>
+          <p:cNvSpPr/>
+          <p:nvPr/>
+        </p:nvSpPr>
+        <p:spPr>
+          <a:xfrm>
+            <a:off x="8793053" y="3307894"/>
+            <a:ext cx="787932" cy="607475"/>
+          </a:xfrm>
+          <a:prstGeom prst="rect">
+            <a:avLst/>
+          </a:prstGeom>
+          <a:noFill/>
+          <a:ln w="38100">
+            <a:solidFill>
+              <a:srgbClr val="00B0F0"/>
+            </a:solidFill>
+          </a:ln>
+        </p:spPr>
+        <p:style>
+          <a:lnRef idx="2">
+            <a:schemeClr val="accent1">
+              <a:shade val="15000"/>
+            </a:schemeClr>
+          </a:lnRef>
+          <a:fillRef idx="1">
+            <a:schemeClr val="accent1"/>
+          </a:fillRef>
+          <a:effectRef idx="0">
+            <a:schemeClr val="accent1"/>
+          </a:effectRef>
+          <a:fontRef idx="minor">
+            <a:schemeClr val="lt1"/>
+          </a:fontRef>
+        </p:style>
+        <p:txBody>
+          <a:bodyPr rtlCol="0" anchor="ctr"/>
+          <a:lstStyle/>
+          <a:p>
+            <a:pPr algn="ctr"/>
+            <a:endParaRPr lang="en-NL"/>
+          </a:p>
+        </p:txBody>
+      </p:sp>
+      <p:cxnSp>
+        <p:nvCxnSpPr>
+          <p:cNvPr id="57" name="Straight Connector 56">
+            <a:extLst>
+              <a:ext uri="{FF2B5EF4-FFF2-40B4-BE49-F238E27FC236}">
+                <a16:creationId xmlns:a16="http://schemas.microsoft.com/office/drawing/2014/main" id="{4969D5F9-7D7B-BBD3-A648-547A7843242A}"/>
+              </a:ext>
+            </a:extLst>
+          </p:cNvPr>
+          <p:cNvCxnSpPr>
+            <a:cxnSpLocks/>
+          </p:cNvCxnSpPr>
+          <p:nvPr/>
+        </p:nvCxnSpPr>
+        <p:spPr>
+          <a:xfrm>
+            <a:off x="2505492" y="2707825"/>
+            <a:ext cx="444477" cy="0"/>
+          </a:xfrm>
+          <a:prstGeom prst="line">
+            <a:avLst/>
+          </a:prstGeom>
+          <a:ln w="38100">
+            <a:solidFill>
+              <a:schemeClr val="accent4">
+                <a:lumMod val="60000"/>
+                <a:lumOff val="40000"/>
+              </a:schemeClr>
+            </a:solidFill>
+          </a:ln>
+        </p:spPr>
+        <p:style>
+          <a:lnRef idx="1">
+            <a:schemeClr val="accent6"/>
+          </a:lnRef>
+          <a:fillRef idx="0">
+            <a:schemeClr val="accent6"/>
+          </a:fillRef>
+          <a:effectRef idx="0">
+            <a:schemeClr val="accent6"/>
+          </a:effectRef>
+          <a:fontRef idx="minor">
+            <a:schemeClr val="tx1"/>
+          </a:fontRef>
+        </p:style>
+      </p:cxnSp>
+      <p:sp>
+        <p:nvSpPr>
+          <p:cNvPr id="58" name="Rectangle 57">
+            <a:extLst>
+              <a:ext uri="{FF2B5EF4-FFF2-40B4-BE49-F238E27FC236}">
+                <a16:creationId xmlns:a16="http://schemas.microsoft.com/office/drawing/2014/main" id="{475ED092-A1DE-5822-9288-194F872AAAB9}"/>
+              </a:ext>
+            </a:extLst>
+          </p:cNvPr>
+          <p:cNvSpPr/>
+          <p:nvPr/>
+        </p:nvSpPr>
+        <p:spPr>
+          <a:xfrm>
+            <a:off x="1629463" y="5242908"/>
+            <a:ext cx="338447" cy="326572"/>
+          </a:xfrm>
+          <a:prstGeom prst="rect">
+            <a:avLst/>
+          </a:prstGeom>
+          <a:solidFill>
+            <a:schemeClr val="accent4">
+              <a:lumMod val="60000"/>
+              <a:lumOff val="40000"/>
+            </a:schemeClr>
+          </a:solidFill>
+          <a:ln>
+            <a:solidFill>
+              <a:schemeClr val="accent4">
+                <a:lumMod val="60000"/>
+                <a:lumOff val="40000"/>
+              </a:schemeClr>
+            </a:solidFill>
+          </a:ln>
+        </p:spPr>
+        <p:style>
+          <a:lnRef idx="2">
+            <a:schemeClr val="accent1">
+              <a:shade val="50000"/>
+            </a:schemeClr>
+          </a:lnRef>
+          <a:fillRef idx="1">
+            <a:schemeClr val="accent1"/>
+          </a:fillRef>
+          <a:effectRef idx="0">
+            <a:schemeClr val="accent1"/>
+          </a:effectRef>
+          <a:fontRef idx="minor">
+            <a:schemeClr val="lt1"/>
+          </a:fontRef>
+        </p:style>
+        <p:txBody>
+          <a:bodyPr rtlCol="0" anchor="ctr"/>
+          <a:lstStyle/>
+          <a:p>
+            <a:pPr algn="ctr"/>
+            <a:endParaRPr lang="en-NL"/>
+          </a:p>
+        </p:txBody>
+      </p:sp>
+      <p:sp>
+        <p:nvSpPr>
+          <p:cNvPr id="59" name="TextBox 58">
+            <a:extLst>
+              <a:ext uri="{FF2B5EF4-FFF2-40B4-BE49-F238E27FC236}">
+                <a16:creationId xmlns:a16="http://schemas.microsoft.com/office/drawing/2014/main" id="{907505AA-0940-F447-E7CA-B42EDDCA34B1}"/>
+              </a:ext>
+            </a:extLst>
+          </p:cNvPr>
+          <p:cNvSpPr txBox="1"/>
+          <p:nvPr/>
+        </p:nvSpPr>
+        <p:spPr>
+          <a:xfrm>
+            <a:off x="1974239" y="5220126"/>
+            <a:ext cx="2530244" cy="369332"/>
+          </a:xfrm>
+          <a:prstGeom prst="rect">
+            <a:avLst/>
+          </a:prstGeom>
+          <a:noFill/>
+        </p:spPr>
+        <p:txBody>
+          <a:bodyPr wrap="none" rtlCol="0">
+            <a:spAutoFit/>
+          </a:bodyPr>
+          <a:lstStyle/>
+          <a:p>
+            <a:r>
+              <a:rPr lang="hu-HU" dirty="0"/>
+              <a:t>Uka types (ukam or ukat)</a:t>
+            </a:r>
+            <a:endParaRPr lang="en-NL" dirty="0"/>
+          </a:p>
+        </p:txBody>
+      </p:sp>
+      <p:cxnSp>
+        <p:nvCxnSpPr>
+          <p:cNvPr id="60" name="Straight Connector 59">
+            <a:extLst>
+              <a:ext uri="{FF2B5EF4-FFF2-40B4-BE49-F238E27FC236}">
+                <a16:creationId xmlns:a16="http://schemas.microsoft.com/office/drawing/2014/main" id="{C2977AFC-D0A2-0E21-F01D-727589F9FB97}"/>
+              </a:ext>
+            </a:extLst>
+          </p:cNvPr>
+          <p:cNvCxnSpPr>
+            <a:cxnSpLocks/>
+          </p:cNvCxnSpPr>
+          <p:nvPr/>
+        </p:nvCxnSpPr>
+        <p:spPr>
+          <a:xfrm>
+            <a:off x="8841272" y="2772140"/>
+            <a:ext cx="444477" cy="0"/>
+          </a:xfrm>
+          <a:prstGeom prst="line">
+            <a:avLst/>
+          </a:prstGeom>
+          <a:ln w="38100">
+            <a:solidFill>
+              <a:schemeClr val="accent4">
+                <a:lumMod val="60000"/>
+                <a:lumOff val="40000"/>
+              </a:schemeClr>
+            </a:solidFill>
+          </a:ln>
+        </p:spPr>
+        <p:style>
+          <a:lnRef idx="1">
+            <a:schemeClr val="accent6"/>
+          </a:lnRef>
+          <a:fillRef idx="0">
+            <a:schemeClr val="accent6"/>
+          </a:fillRef>
+          <a:effectRef idx="0">
+            <a:schemeClr val="accent6"/>
+          </a:effectRef>
+          <a:fontRef idx="minor">
+            <a:schemeClr val="tx1"/>
+          </a:fontRef>
+        </p:style>
+      </p:cxnSp>
+      <p:cxnSp>
+        <p:nvCxnSpPr>
+          <p:cNvPr id="62" name="Straight Connector 61">
+            <a:extLst>
+              <a:ext uri="{FF2B5EF4-FFF2-40B4-BE49-F238E27FC236}">
+                <a16:creationId xmlns:a16="http://schemas.microsoft.com/office/drawing/2014/main" id="{58E8BE2B-928B-3F5E-1634-E56B02125C46}"/>
+              </a:ext>
+            </a:extLst>
+          </p:cNvPr>
+          <p:cNvCxnSpPr>
+            <a:cxnSpLocks/>
+          </p:cNvCxnSpPr>
+          <p:nvPr/>
+        </p:nvCxnSpPr>
+        <p:spPr>
+          <a:xfrm>
+            <a:off x="8790713" y="4894567"/>
+            <a:ext cx="444477" cy="0"/>
+          </a:xfrm>
+          <a:prstGeom prst="line">
+            <a:avLst/>
+          </a:prstGeom>
+          <a:ln w="38100">
+            <a:solidFill>
+              <a:schemeClr val="accent4">
+                <a:lumMod val="60000"/>
+                <a:lumOff val="40000"/>
+              </a:schemeClr>
+            </a:solidFill>
+          </a:ln>
+        </p:spPr>
+        <p:style>
+          <a:lnRef idx="1">
+            <a:schemeClr val="accent6"/>
+          </a:lnRef>
+          <a:fillRef idx="0">
+            <a:schemeClr val="accent6"/>
+          </a:fillRef>
+          <a:effectRef idx="0">
+            <a:schemeClr val="accent6"/>
+          </a:effectRef>
+          <a:fontRef idx="minor">
+            <a:schemeClr val="tx1"/>
+          </a:fontRef>
+        </p:style>
+      </p:cxnSp>
+      <p:sp>
+        <p:nvSpPr>
+          <p:cNvPr id="63" name="Rectangle 62">
+            <a:extLst>
+              <a:ext uri="{FF2B5EF4-FFF2-40B4-BE49-F238E27FC236}">
+                <a16:creationId xmlns:a16="http://schemas.microsoft.com/office/drawing/2014/main" id="{118D881D-158C-E2F6-CC8A-06905459B90E}"/>
+              </a:ext>
+            </a:extLst>
+          </p:cNvPr>
+          <p:cNvSpPr/>
+          <p:nvPr/>
+        </p:nvSpPr>
+        <p:spPr>
+          <a:xfrm>
+            <a:off x="8645689" y="5478691"/>
+            <a:ext cx="740907" cy="607475"/>
+          </a:xfrm>
+          <a:prstGeom prst="rect">
+            <a:avLst/>
+          </a:prstGeom>
+          <a:noFill/>
+          <a:ln w="38100">
+            <a:solidFill>
+              <a:srgbClr val="00B0F0"/>
+            </a:solidFill>
+          </a:ln>
+        </p:spPr>
+        <p:style>
+          <a:lnRef idx="2">
+            <a:schemeClr val="accent1">
+              <a:shade val="15000"/>
+            </a:schemeClr>
+          </a:lnRef>
+          <a:fillRef idx="1">
+            <a:schemeClr val="accent1"/>
+          </a:fillRef>
+          <a:effectRef idx="0">
+            <a:schemeClr val="accent1"/>
+          </a:effectRef>
+          <a:fontRef idx="minor">
+            <a:schemeClr val="lt1"/>
+          </a:fontRef>
+        </p:style>
+        <p:txBody>
+          <a:bodyPr rtlCol="0" anchor="ctr"/>
+          <a:lstStyle/>
+          <a:p>
+            <a:pPr algn="ctr"/>
+            <a:endParaRPr lang="en-NL"/>
+          </a:p>
+        </p:txBody>
+      </p:sp>
+      <p:cxnSp>
+        <p:nvCxnSpPr>
+          <p:cNvPr id="4" name="Straight Connector 3">
+            <a:extLst>
+              <a:ext uri="{FF2B5EF4-FFF2-40B4-BE49-F238E27FC236}">
+                <a16:creationId xmlns:a16="http://schemas.microsoft.com/office/drawing/2014/main" id="{E12E5BDB-EFF3-E842-79D5-5A4739588E71}"/>
+              </a:ext>
+            </a:extLst>
+          </p:cNvPr>
+          <p:cNvCxnSpPr>
+            <a:cxnSpLocks/>
+          </p:cNvCxnSpPr>
+          <p:nvPr/>
+        </p:nvCxnSpPr>
+        <p:spPr>
+          <a:xfrm>
+            <a:off x="3609133" y="3780951"/>
+            <a:ext cx="444477" cy="0"/>
+          </a:xfrm>
+          <a:prstGeom prst="line">
+            <a:avLst/>
+          </a:prstGeom>
+          <a:ln w="38100">
+            <a:solidFill>
+              <a:srgbClr val="FF0000"/>
+            </a:solidFill>
+          </a:ln>
+        </p:spPr>
+        <p:style>
+          <a:lnRef idx="1">
+            <a:schemeClr val="accent6"/>
+          </a:lnRef>
+          <a:fillRef idx="0">
+            <a:schemeClr val="accent6"/>
+          </a:fillRef>
+          <a:effectRef idx="0">
+            <a:schemeClr val="accent6"/>
+          </a:effectRef>
+          <a:fontRef idx="minor">
+            <a:schemeClr val="tx1"/>
+          </a:fontRef>
+        </p:style>
+      </p:cxnSp>
+      <p:cxnSp>
+        <p:nvCxnSpPr>
+          <p:cNvPr id="6" name="Straight Connector 5">
+            <a:extLst>
+              <a:ext uri="{FF2B5EF4-FFF2-40B4-BE49-F238E27FC236}">
+                <a16:creationId xmlns:a16="http://schemas.microsoft.com/office/drawing/2014/main" id="{EF8113F8-1E2C-5DE0-CF7F-8239DF384ED4}"/>
+              </a:ext>
+            </a:extLst>
+          </p:cNvPr>
+          <p:cNvCxnSpPr>
+            <a:cxnSpLocks/>
+          </p:cNvCxnSpPr>
+          <p:nvPr/>
+        </p:nvCxnSpPr>
+        <p:spPr>
+          <a:xfrm>
+            <a:off x="2410044" y="3780951"/>
+            <a:ext cx="666948" cy="0"/>
+          </a:xfrm>
+          <a:prstGeom prst="line">
+            <a:avLst/>
+          </a:prstGeom>
+          <a:ln w="38100">
+            <a:solidFill>
+              <a:srgbClr val="7030A0"/>
+            </a:solidFill>
+          </a:ln>
+        </p:spPr>
+        <p:style>
+          <a:lnRef idx="1">
+            <a:schemeClr val="accent6"/>
+          </a:lnRef>
+          <a:fillRef idx="0">
+            <a:schemeClr val="accent6"/>
+          </a:fillRef>
+          <a:effectRef idx="0">
+            <a:schemeClr val="accent6"/>
+          </a:effectRef>
+          <a:fontRef idx="minor">
+            <a:schemeClr val="tx1"/>
+          </a:fontRef>
+        </p:style>
+      </p:cxnSp>
+      <p:cxnSp>
+        <p:nvCxnSpPr>
+          <p:cNvPr id="7" name="Straight Connector 6">
+            <a:extLst>
+              <a:ext uri="{FF2B5EF4-FFF2-40B4-BE49-F238E27FC236}">
+                <a16:creationId xmlns:a16="http://schemas.microsoft.com/office/drawing/2014/main" id="{B60240C6-529D-BA6A-358D-6601DCC4CD9B}"/>
+              </a:ext>
+            </a:extLst>
+          </p:cNvPr>
+          <p:cNvCxnSpPr>
+            <a:cxnSpLocks/>
+          </p:cNvCxnSpPr>
+          <p:nvPr/>
+        </p:nvCxnSpPr>
+        <p:spPr>
+          <a:xfrm>
+            <a:off x="2483463" y="4014994"/>
+            <a:ext cx="666948" cy="0"/>
+          </a:xfrm>
+          <a:prstGeom prst="line">
+            <a:avLst/>
+          </a:prstGeom>
+          <a:ln w="38100">
+            <a:solidFill>
+              <a:srgbClr val="7030A0"/>
+            </a:solidFill>
+          </a:ln>
+        </p:spPr>
+        <p:style>
+          <a:lnRef idx="1">
+            <a:schemeClr val="accent6"/>
+          </a:lnRef>
+          <a:fillRef idx="0">
+            <a:schemeClr val="accent6"/>
+          </a:fillRef>
+          <a:effectRef idx="0">
+            <a:schemeClr val="accent6"/>
+          </a:effectRef>
+          <a:fontRef idx="minor">
+            <a:schemeClr val="tx1"/>
+          </a:fontRef>
+        </p:style>
+      </p:cxnSp>
+      <p:cxnSp>
+        <p:nvCxnSpPr>
+          <p:cNvPr id="8" name="Straight Connector 7">
+            <a:extLst>
+              <a:ext uri="{FF2B5EF4-FFF2-40B4-BE49-F238E27FC236}">
+                <a16:creationId xmlns:a16="http://schemas.microsoft.com/office/drawing/2014/main" id="{2A27901C-37A3-D78C-5B9E-A5CA6F5CFF3A}"/>
+              </a:ext>
+            </a:extLst>
+          </p:cNvPr>
+          <p:cNvCxnSpPr>
+            <a:cxnSpLocks/>
+          </p:cNvCxnSpPr>
+          <p:nvPr/>
+        </p:nvCxnSpPr>
+        <p:spPr>
+          <a:xfrm>
+            <a:off x="3679890" y="4106694"/>
+            <a:ext cx="444477" cy="0"/>
+          </a:xfrm>
+          <a:prstGeom prst="line">
+            <a:avLst/>
+          </a:prstGeom>
+          <a:ln w="38100">
+            <a:solidFill>
+              <a:srgbClr val="FF0000"/>
+            </a:solidFill>
+          </a:ln>
+        </p:spPr>
+        <p:style>
+          <a:lnRef idx="1">
+            <a:schemeClr val="accent6"/>
+          </a:lnRef>
+          <a:fillRef idx="0">
+            <a:schemeClr val="accent6"/>
+          </a:fillRef>
+          <a:effectRef idx="0">
+            <a:schemeClr val="accent6"/>
+          </a:effectRef>
+          <a:fontRef idx="minor">
+            <a:schemeClr val="tx1"/>
+          </a:fontRef>
+        </p:style>
+      </p:cxnSp>
+      <p:sp>
+        <p:nvSpPr>
+          <p:cNvPr id="9" name="TextBox 8">
+            <a:extLst>
+              <a:ext uri="{FF2B5EF4-FFF2-40B4-BE49-F238E27FC236}">
+                <a16:creationId xmlns:a16="http://schemas.microsoft.com/office/drawing/2014/main" id="{B7473454-0EA8-476E-D26B-F70157C8CFBF}"/>
+              </a:ext>
+            </a:extLst>
+          </p:cNvPr>
+          <p:cNvSpPr txBox="1"/>
+          <p:nvPr/>
+        </p:nvSpPr>
+        <p:spPr>
+          <a:xfrm>
+            <a:off x="2505492" y="2809240"/>
+            <a:ext cx="3686374" cy="646331"/>
+          </a:xfrm>
+          <a:prstGeom prst="rect">
+            <a:avLst/>
+          </a:prstGeom>
+          <a:noFill/>
+        </p:spPr>
+        <p:txBody>
+          <a:bodyPr wrap="square" rtlCol="0">
+            <a:spAutoFit/>
+          </a:bodyPr>
+          <a:lstStyle/>
+          <a:p>
+            <a:r>
+              <a:rPr lang="hu-HU" dirty="0"/>
+              <a:t>Autoreport generates „old” data format with these names:</a:t>
+            </a:r>
+            <a:endParaRPr lang="en-NL" dirty="0"/>
+          </a:p>
+        </p:txBody>
+      </p:sp>
+      <p:sp>
+        <p:nvSpPr>
+          <p:cNvPr id="11" name="Rectangle 10">
+            <a:extLst>
+              <a:ext uri="{FF2B5EF4-FFF2-40B4-BE49-F238E27FC236}">
+                <a16:creationId xmlns:a16="http://schemas.microsoft.com/office/drawing/2014/main" id="{F853255A-C97F-ABBF-49BF-2B4CFFA5A658}"/>
+              </a:ext>
+            </a:extLst>
+          </p:cNvPr>
+          <p:cNvSpPr/>
+          <p:nvPr/>
+        </p:nvSpPr>
+        <p:spPr>
+          <a:xfrm>
+            <a:off x="6229575" y="6411448"/>
+            <a:ext cx="300474" cy="307048"/>
+          </a:xfrm>
+          <a:prstGeom prst="rect">
+            <a:avLst/>
+          </a:prstGeom>
+          <a:noFill/>
+          <a:ln w="38100">
+            <a:solidFill>
+              <a:srgbClr val="00B0F0"/>
+            </a:solidFill>
+          </a:ln>
+        </p:spPr>
+        <p:style>
+          <a:lnRef idx="2">
+            <a:schemeClr val="accent1">
+              <a:shade val="15000"/>
+            </a:schemeClr>
+          </a:lnRef>
+          <a:fillRef idx="1">
+            <a:schemeClr val="accent1"/>
+          </a:fillRef>
+          <a:effectRef idx="0">
+            <a:schemeClr val="accent1"/>
+          </a:effectRef>
+          <a:fontRef idx="minor">
+            <a:schemeClr val="lt1"/>
+          </a:fontRef>
+        </p:style>
+        <p:txBody>
+          <a:bodyPr rtlCol="0" anchor="ctr"/>
+          <a:lstStyle/>
+          <a:p>
+            <a:pPr algn="ctr"/>
+            <a:endParaRPr lang="en-NL"/>
+          </a:p>
+        </p:txBody>
+      </p:sp>
+      <p:sp>
+        <p:nvSpPr>
+          <p:cNvPr id="12" name="TextBox 11">
+            <a:extLst>
+              <a:ext uri="{FF2B5EF4-FFF2-40B4-BE49-F238E27FC236}">
+                <a16:creationId xmlns:a16="http://schemas.microsoft.com/office/drawing/2014/main" id="{389D234F-A7D8-3EED-FE1C-DBC96B924C48}"/>
+              </a:ext>
+            </a:extLst>
+          </p:cNvPr>
+          <p:cNvSpPr txBox="1"/>
+          <p:nvPr/>
+        </p:nvSpPr>
+        <p:spPr>
+          <a:xfrm>
+            <a:off x="6486656" y="6388712"/>
+            <a:ext cx="5705344" cy="369332"/>
+          </a:xfrm>
+          <a:prstGeom prst="rect">
+            <a:avLst/>
+          </a:prstGeom>
+          <a:noFill/>
+        </p:spPr>
+        <p:txBody>
+          <a:bodyPr wrap="none" rtlCol="0">
+            <a:spAutoFit/>
+          </a:bodyPr>
+          <a:lstStyle/>
+          <a:p>
+            <a:r>
+              <a:rPr lang="hu-HU" dirty="0"/>
+              <a:t>Comes from the file/Test Condition, not from the filename.</a:t>
+            </a:r>
+            <a:endParaRPr lang="en-NL" dirty="0"/>
+          </a:p>
+        </p:txBody>
+      </p:sp>
+      <p:cxnSp>
+        <p:nvCxnSpPr>
+          <p:cNvPr id="14" name="Straight Connector 13">
+            <a:extLst>
+              <a:ext uri="{FF2B5EF4-FFF2-40B4-BE49-F238E27FC236}">
+                <a16:creationId xmlns:a16="http://schemas.microsoft.com/office/drawing/2014/main" id="{9288F992-4FC3-057E-2493-29811296745B}"/>
+              </a:ext>
+            </a:extLst>
+          </p:cNvPr>
+          <p:cNvCxnSpPr>
+            <a:cxnSpLocks/>
+          </p:cNvCxnSpPr>
+          <p:nvPr/>
+        </p:nvCxnSpPr>
+        <p:spPr>
+          <a:xfrm>
+            <a:off x="9957617" y="3585679"/>
+            <a:ext cx="638125" cy="0"/>
+          </a:xfrm>
+          <a:prstGeom prst="line">
+            <a:avLst/>
+          </a:prstGeom>
+          <a:ln w="38100">
+            <a:solidFill>
+              <a:srgbClr val="FF0000"/>
+            </a:solidFill>
+          </a:ln>
+        </p:spPr>
+        <p:style>
+          <a:lnRef idx="1">
+            <a:schemeClr val="accent6"/>
+          </a:lnRef>
+          <a:fillRef idx="0">
+            <a:schemeClr val="accent6"/>
+          </a:fillRef>
+          <a:effectRef idx="0">
+            <a:schemeClr val="accent6"/>
+          </a:effectRef>
+          <a:fontRef idx="minor">
+            <a:schemeClr val="tx1"/>
+          </a:fontRef>
+        </p:style>
+      </p:cxnSp>
+      <p:sp>
+        <p:nvSpPr>
+          <p:cNvPr id="20" name="Rectangle 19">
+            <a:extLst>
+              <a:ext uri="{FF2B5EF4-FFF2-40B4-BE49-F238E27FC236}">
+                <a16:creationId xmlns:a16="http://schemas.microsoft.com/office/drawing/2014/main" id="{0D8567FB-F63D-BF4C-583A-D9C088D713A8}"/>
+              </a:ext>
+            </a:extLst>
+          </p:cNvPr>
+          <p:cNvSpPr/>
+          <p:nvPr/>
+        </p:nvSpPr>
+        <p:spPr>
+          <a:xfrm>
+            <a:off x="7052504" y="2342092"/>
+            <a:ext cx="4834696" cy="1840900"/>
+          </a:xfrm>
+          <a:prstGeom prst="rect">
+            <a:avLst/>
+          </a:prstGeom>
+          <a:noFill/>
+          <a:ln>
+            <a:solidFill>
+              <a:schemeClr val="tx1"/>
+            </a:solidFill>
+          </a:ln>
+        </p:spPr>
+        <p:style>
+          <a:lnRef idx="2">
+            <a:schemeClr val="accent1">
+              <a:shade val="15000"/>
+            </a:schemeClr>
+          </a:lnRef>
+          <a:fillRef idx="1">
+            <a:schemeClr val="accent1"/>
+          </a:fillRef>
+          <a:effectRef idx="0">
+            <a:schemeClr val="accent1"/>
+          </a:effectRef>
+          <a:fontRef idx="minor">
+            <a:schemeClr val="lt1"/>
+          </a:fontRef>
+        </p:style>
+        <p:txBody>
+          <a:bodyPr rtlCol="0" anchor="ctr"/>
+          <a:lstStyle/>
+          <a:p>
+            <a:pPr algn="ctr"/>
+            <a:endParaRPr lang="en-NL"/>
+          </a:p>
+        </p:txBody>
+      </p:sp>
+      <p:sp>
+        <p:nvSpPr>
+          <p:cNvPr id="39" name="Rectangle 38">
+            <a:extLst>
+              <a:ext uri="{FF2B5EF4-FFF2-40B4-BE49-F238E27FC236}">
+                <a16:creationId xmlns:a16="http://schemas.microsoft.com/office/drawing/2014/main" id="{12580CBE-D153-6750-AB17-0B3A4D4353F9}"/>
+              </a:ext>
+            </a:extLst>
+          </p:cNvPr>
+          <p:cNvSpPr/>
+          <p:nvPr/>
+        </p:nvSpPr>
+        <p:spPr>
+          <a:xfrm>
+            <a:off x="7054173" y="4335392"/>
+            <a:ext cx="4834696" cy="1840900"/>
+          </a:xfrm>
+          <a:prstGeom prst="rect">
+            <a:avLst/>
+          </a:prstGeom>
+          <a:noFill/>
+          <a:ln>
+            <a:solidFill>
+              <a:schemeClr val="tx1"/>
+            </a:solidFill>
+          </a:ln>
+        </p:spPr>
+        <p:style>
+          <a:lnRef idx="2">
+            <a:schemeClr val="accent1">
+              <a:shade val="15000"/>
+            </a:schemeClr>
+          </a:lnRef>
+          <a:fillRef idx="1">
+            <a:schemeClr val="accent1"/>
+          </a:fillRef>
+          <a:effectRef idx="0">
+            <a:schemeClr val="accent1"/>
+          </a:effectRef>
+          <a:fontRef idx="minor">
+            <a:schemeClr val="lt1"/>
+          </a:fontRef>
+        </p:style>
+        <p:txBody>
+          <a:bodyPr rtlCol="0" anchor="ctr"/>
+          <a:lstStyle/>
+          <a:p>
+            <a:pPr algn="ctr"/>
+            <a:endParaRPr lang="en-NL"/>
+          </a:p>
+        </p:txBody>
+      </p:sp>
+      <p:cxnSp>
+        <p:nvCxnSpPr>
+          <p:cNvPr id="43" name="Straight Arrow Connector 42">
+            <a:extLst>
+              <a:ext uri="{FF2B5EF4-FFF2-40B4-BE49-F238E27FC236}">
+                <a16:creationId xmlns:a16="http://schemas.microsoft.com/office/drawing/2014/main" id="{E0186BA7-8072-1CA6-8114-096BD471811A}"/>
+              </a:ext>
+            </a:extLst>
+          </p:cNvPr>
+          <p:cNvCxnSpPr>
+            <a:cxnSpLocks/>
+          </p:cNvCxnSpPr>
+          <p:nvPr/>
+        </p:nvCxnSpPr>
+        <p:spPr>
+          <a:xfrm>
+            <a:off x="8935472" y="5072022"/>
+            <a:ext cx="0" cy="244513"/>
+          </a:xfrm>
+          <a:prstGeom prst="straightConnector1">
+            <a:avLst/>
+          </a:prstGeom>
+          <a:ln w="28575">
+            <a:solidFill>
+              <a:schemeClr val="tx1"/>
+            </a:solidFill>
+            <a:tailEnd type="triangle"/>
+          </a:ln>
+        </p:spPr>
+        <p:style>
+          <a:lnRef idx="1">
+            <a:schemeClr val="accent1"/>
+          </a:lnRef>
+          <a:fillRef idx="0">
+            <a:schemeClr val="accent1"/>
+          </a:fillRef>
+          <a:effectRef idx="0">
+            <a:schemeClr val="accent1"/>
+          </a:effectRef>
+          <a:fontRef idx="minor">
+            <a:schemeClr val="tx1"/>
+          </a:fontRef>
+        </p:style>
+      </p:cxnSp>
+      <p:cxnSp>
+        <p:nvCxnSpPr>
+          <p:cNvPr id="49" name="Straight Connector 48">
+            <a:extLst>
+              <a:ext uri="{FF2B5EF4-FFF2-40B4-BE49-F238E27FC236}">
+                <a16:creationId xmlns:a16="http://schemas.microsoft.com/office/drawing/2014/main" id="{AB3CF358-8496-27A1-4A55-6EFC31CFCF22}"/>
+              </a:ext>
+            </a:extLst>
+          </p:cNvPr>
+          <p:cNvCxnSpPr>
+            <a:cxnSpLocks/>
+          </p:cNvCxnSpPr>
+          <p:nvPr/>
+        </p:nvCxnSpPr>
+        <p:spPr>
+          <a:xfrm>
+            <a:off x="9580985" y="5764476"/>
+            <a:ext cx="1806756" cy="0"/>
+          </a:xfrm>
+          <a:prstGeom prst="line">
+            <a:avLst/>
+          </a:prstGeom>
+          <a:ln w="38100">
+            <a:solidFill>
+              <a:srgbClr val="FF0000"/>
+            </a:solidFill>
+          </a:ln>
+        </p:spPr>
+        <p:style>
+          <a:lnRef idx="1">
+            <a:schemeClr val="accent6"/>
+          </a:lnRef>
+          <a:fillRef idx="0">
+            <a:schemeClr val="accent6"/>
+          </a:fillRef>
+          <a:effectRef idx="0">
+            <a:schemeClr val="accent6"/>
+          </a:effectRef>
+          <a:fontRef idx="minor">
+            <a:schemeClr val="tx1"/>
+          </a:fontRef>
+        </p:style>
+      </p:cxnSp>
+      <p:cxnSp>
+        <p:nvCxnSpPr>
+          <p:cNvPr id="51" name="Straight Connector 50">
+            <a:extLst>
+              <a:ext uri="{FF2B5EF4-FFF2-40B4-BE49-F238E27FC236}">
+                <a16:creationId xmlns:a16="http://schemas.microsoft.com/office/drawing/2014/main" id="{218C1223-2269-F6B7-12A0-1841AD0323EA}"/>
+              </a:ext>
+            </a:extLst>
+          </p:cNvPr>
+          <p:cNvCxnSpPr>
+            <a:cxnSpLocks/>
+          </p:cNvCxnSpPr>
+          <p:nvPr/>
+        </p:nvCxnSpPr>
+        <p:spPr>
+          <a:xfrm>
+            <a:off x="9580985" y="6086166"/>
+            <a:ext cx="1806756" cy="0"/>
+          </a:xfrm>
+          <a:prstGeom prst="line">
+            <a:avLst/>
+          </a:prstGeom>
+          <a:ln w="38100">
+            <a:solidFill>
+              <a:srgbClr val="FF0000"/>
+            </a:solidFill>
+          </a:ln>
+        </p:spPr>
+        <p:style>
+          <a:lnRef idx="1">
+            <a:schemeClr val="accent6"/>
+          </a:lnRef>
+          <a:fillRef idx="0">
+            <a:schemeClr val="accent6"/>
+          </a:fillRef>
+          <a:effectRef idx="0">
+            <a:schemeClr val="accent6"/>
+          </a:effectRef>
+          <a:fontRef idx="minor">
+            <a:schemeClr val="tx1"/>
+          </a:fontRef>
+        </p:style>
+      </p:cxnSp>
+      <p:cxnSp>
+        <p:nvCxnSpPr>
+          <p:cNvPr id="52" name="Straight Connector 51">
+            <a:extLst>
+              <a:ext uri="{FF2B5EF4-FFF2-40B4-BE49-F238E27FC236}">
+                <a16:creationId xmlns:a16="http://schemas.microsoft.com/office/drawing/2014/main" id="{E09FD1A9-04DD-01D5-C287-EF8DC3021CA7}"/>
+              </a:ext>
+            </a:extLst>
+          </p:cNvPr>
+          <p:cNvCxnSpPr>
+            <a:cxnSpLocks/>
+          </p:cNvCxnSpPr>
+          <p:nvPr/>
+        </p:nvCxnSpPr>
+        <p:spPr>
+          <a:xfrm>
+            <a:off x="9953625" y="3908845"/>
+            <a:ext cx="638125" cy="0"/>
+          </a:xfrm>
+          <a:prstGeom prst="line">
+            <a:avLst/>
+          </a:prstGeom>
+          <a:ln w="38100">
+            <a:solidFill>
+              <a:srgbClr val="FF0000"/>
+            </a:solidFill>
+          </a:ln>
+        </p:spPr>
+        <p:style>
+          <a:lnRef idx="1">
+            <a:schemeClr val="accent6"/>
+          </a:lnRef>
+          <a:fillRef idx="0">
+            <a:schemeClr val="accent6"/>
+          </a:fillRef>
+          <a:effectRef idx="0">
+            <a:schemeClr val="accent6"/>
+          </a:effectRef>
+          <a:fontRef idx="minor">
+            <a:schemeClr val="tx1"/>
+          </a:fontRef>
+        </p:style>
+      </p:cxnSp>
+    </p:spTree>
+    <p:extLst>
+      <p:ext uri="{BB962C8B-B14F-4D97-AF65-F5344CB8AC3E}">
+        <p14:creationId xmlns:p14="http://schemas.microsoft.com/office/powerpoint/2010/main" val="3859596613"/>
+      </p:ext>
+    </p:extLst>
+  </p:cSld>
+  <p:clrMapOvr>
+    <a:masterClrMapping/>
+  </p:clrMapOvr>
+</p:sld>
+</file>
+
+<file path=ppt/slides/slide11.xml><?xml version="1.0" encoding="utf-8"?>
+<p:sld xmlns:a="http://schemas.openxmlformats.org/drawingml/2006/main" xmlns:r="http://schemas.openxmlformats.org/officeDocument/2006/relationships" xmlns:p="http://schemas.openxmlformats.org/presentationml/2006/main">
+  <p:cSld>
+    <p:spTree>
+      <p:nvGrpSpPr>
+        <p:cNvPr id="1" name=""/>
+        <p:cNvGrpSpPr/>
+        <p:nvPr/>
+      </p:nvGrpSpPr>
+      <p:grpSpPr>
+        <a:xfrm>
+          <a:off x="0" y="0"/>
+          <a:ext cx="0" cy="0"/>
+          <a:chOff x="0" y="0"/>
+          <a:chExt cx="0" cy="0"/>
+        </a:xfrm>
+      </p:grpSpPr>
+      <p:sp>
+        <p:nvSpPr>
+          <p:cNvPr id="2" name="Title 1">
+            <a:extLst>
+              <a:ext uri="{FF2B5EF4-FFF2-40B4-BE49-F238E27FC236}">
+                <a16:creationId xmlns:a16="http://schemas.microsoft.com/office/drawing/2014/main" id="{44F11F48-5FE9-46D6-8B09-3E631B3D42F8}"/>
+              </a:ext>
+            </a:extLst>
+          </p:cNvPr>
+          <p:cNvSpPr>
+            <a:spLocks noGrp="1"/>
+          </p:cNvSpPr>
+          <p:nvPr>
+            <p:ph type="title"/>
+          </p:nvPr>
+        </p:nvSpPr>
+        <p:spPr/>
+        <p:txBody>
+          <a:bodyPr/>
+          <a:lstStyle/>
+          <a:p>
+            <a:r>
+              <a:rPr lang="en-US" dirty="0"/>
               <a:t>Phosphosite Analysis (</a:t>
             </a:r>
             <a:r>
@@ -4585,7 +7438,7 @@
 </p:sld>
 </file>
 
-<file path=ppt/slides/slide11.xml><?xml version="1.0" encoding="utf-8"?>
+<file path=ppt/slides/slide12.xml><?xml version="1.0" encoding="utf-8"?>
 <p:sld xmlns:a="http://schemas.openxmlformats.org/drawingml/2006/main" xmlns:r="http://schemas.openxmlformats.org/officeDocument/2006/relationships" xmlns:p="http://schemas.openxmlformats.org/presentationml/2006/main">
   <p:cSld>
     <p:spTree>
@@ -10191,7 +13044,7 @@
         <p:spPr>
           <a:xfrm>
             <a:off x="2437410" y="4346369"/>
-            <a:ext cx="6575454" cy="369332"/>
+            <a:ext cx="1558183" cy="369332"/>
           </a:xfrm>
           <a:prstGeom prst="rect">
             <a:avLst/>
@@ -10206,7 +13059,11 @@
           <a:p>
             <a:r>
               <a:rPr lang="en-US" dirty="0"/>
-              <a:t>File type. Should refer to UKA in this case but isn’t used in reporting.</a:t>
+              <a:t>File type</a:t>
+            </a:r>
+            <a:r>
+              <a:rPr lang="hu-HU" dirty="0"/>
+              <a:t>: UKA</a:t>
             </a:r>
             <a:endParaRPr lang="en-NL" dirty="0"/>
           </a:p>
@@ -10586,6 +13443,10 @@
               <a:rPr lang="en-US" dirty="0"/>
               <a:t>Kinase Analysis</a:t>
             </a:r>
+            <a:r>
+              <a:rPr lang="hu-HU" dirty="0"/>
+              <a:t> (UKA 2022)</a:t>
+            </a:r>
             <a:endParaRPr lang="en-NL" dirty="0"/>
           </a:p>
         </p:txBody>
@@ -10892,7 +13753,7 @@
         <p:spPr>
           <a:xfrm>
             <a:off x="2437410" y="4346369"/>
-            <a:ext cx="6575454" cy="369332"/>
+            <a:ext cx="1499128" cy="369332"/>
           </a:xfrm>
           <a:prstGeom prst="rect">
             <a:avLst/>
@@ -10907,7 +13768,11 @@
           <a:p>
             <a:r>
               <a:rPr lang="en-US" dirty="0"/>
-              <a:t>File type. Should refer to UKA in this case but isn’t used in reporting.</a:t>
+              <a:t>File type</a:t>
+            </a:r>
+            <a:r>
+              <a:rPr lang="hu-HU" dirty="0"/>
+              <a:t>: UKA</a:t>
             </a:r>
             <a:endParaRPr lang="en-NL" dirty="0"/>
           </a:p>

</xml_diff>

<commit_message>
uka all vs all
</commit_message>
<xml_diff>
--- a/ref/HowToUse.pptx
+++ b/ref/HowToUse.pptx
@@ -11,13 +11,14 @@
     <p:sldId id="264" r:id="rId5"/>
     <p:sldId id="265" r:id="rId6"/>
     <p:sldId id="267" r:id="rId7"/>
-    <p:sldId id="266" r:id="rId8"/>
-    <p:sldId id="263" r:id="rId9"/>
-    <p:sldId id="259" r:id="rId10"/>
-    <p:sldId id="261" r:id="rId11"/>
-    <p:sldId id="260" r:id="rId12"/>
-    <p:sldId id="258" r:id="rId13"/>
-    <p:sldId id="257" r:id="rId14"/>
+    <p:sldId id="269" r:id="rId8"/>
+    <p:sldId id="266" r:id="rId9"/>
+    <p:sldId id="263" r:id="rId10"/>
+    <p:sldId id="259" r:id="rId11"/>
+    <p:sldId id="261" r:id="rId12"/>
+    <p:sldId id="260" r:id="rId13"/>
+    <p:sldId id="258" r:id="rId14"/>
+    <p:sldId id="257" r:id="rId15"/>
   </p:sldIdLst>
   <p:sldSz cx="12192000" cy="6858000"/>
   <p:notesSz cx="6858000" cy="9144000"/>
@@ -273,7 +274,7 @@
           <a:p>
             <a:fld id="{028CE02D-A78E-4140-9ADC-F5E593AD7849}" type="datetimeFigureOut">
               <a:rPr lang="en-NL" smtClean="0"/>
-              <a:t>18/02/2025</a:t>
+              <a:t>26/02/2025</a:t>
             </a:fld>
             <a:endParaRPr lang="en-NL"/>
           </a:p>
@@ -473,7 +474,7 @@
           <a:p>
             <a:fld id="{028CE02D-A78E-4140-9ADC-F5E593AD7849}" type="datetimeFigureOut">
               <a:rPr lang="en-NL" smtClean="0"/>
-              <a:t>18/02/2025</a:t>
+              <a:t>26/02/2025</a:t>
             </a:fld>
             <a:endParaRPr lang="en-NL"/>
           </a:p>
@@ -683,7 +684,7 @@
           <a:p>
             <a:fld id="{028CE02D-A78E-4140-9ADC-F5E593AD7849}" type="datetimeFigureOut">
               <a:rPr lang="en-NL" smtClean="0"/>
-              <a:t>18/02/2025</a:t>
+              <a:t>26/02/2025</a:t>
             </a:fld>
             <a:endParaRPr lang="en-NL"/>
           </a:p>
@@ -883,7 +884,7 @@
           <a:p>
             <a:fld id="{028CE02D-A78E-4140-9ADC-F5E593AD7849}" type="datetimeFigureOut">
               <a:rPr lang="en-NL" smtClean="0"/>
-              <a:t>18/02/2025</a:t>
+              <a:t>26/02/2025</a:t>
             </a:fld>
             <a:endParaRPr lang="en-NL"/>
           </a:p>
@@ -1159,7 +1160,7 @@
           <a:p>
             <a:fld id="{028CE02D-A78E-4140-9ADC-F5E593AD7849}" type="datetimeFigureOut">
               <a:rPr lang="en-NL" smtClean="0"/>
-              <a:t>18/02/2025</a:t>
+              <a:t>26/02/2025</a:t>
             </a:fld>
             <a:endParaRPr lang="en-NL"/>
           </a:p>
@@ -1427,7 +1428,7 @@
           <a:p>
             <a:fld id="{028CE02D-A78E-4140-9ADC-F5E593AD7849}" type="datetimeFigureOut">
               <a:rPr lang="en-NL" smtClean="0"/>
-              <a:t>18/02/2025</a:t>
+              <a:t>26/02/2025</a:t>
             </a:fld>
             <a:endParaRPr lang="en-NL"/>
           </a:p>
@@ -1842,7 +1843,7 @@
           <a:p>
             <a:fld id="{028CE02D-A78E-4140-9ADC-F5E593AD7849}" type="datetimeFigureOut">
               <a:rPr lang="en-NL" smtClean="0"/>
-              <a:t>18/02/2025</a:t>
+              <a:t>26/02/2025</a:t>
             </a:fld>
             <a:endParaRPr lang="en-NL"/>
           </a:p>
@@ -1984,7 +1985,7 @@
           <a:p>
             <a:fld id="{028CE02D-A78E-4140-9ADC-F5E593AD7849}" type="datetimeFigureOut">
               <a:rPr lang="en-NL" smtClean="0"/>
-              <a:t>18/02/2025</a:t>
+              <a:t>26/02/2025</a:t>
             </a:fld>
             <a:endParaRPr lang="en-NL"/>
           </a:p>
@@ -2097,7 +2098,7 @@
           <a:p>
             <a:fld id="{028CE02D-A78E-4140-9ADC-F5E593AD7849}" type="datetimeFigureOut">
               <a:rPr lang="en-NL" smtClean="0"/>
-              <a:t>18/02/2025</a:t>
+              <a:t>26/02/2025</a:t>
             </a:fld>
             <a:endParaRPr lang="en-NL"/>
           </a:p>
@@ -2410,7 +2411,7 @@
           <a:p>
             <a:fld id="{028CE02D-A78E-4140-9ADC-F5E593AD7849}" type="datetimeFigureOut">
               <a:rPr lang="en-NL" smtClean="0"/>
-              <a:t>18/02/2025</a:t>
+              <a:t>26/02/2025</a:t>
             </a:fld>
             <a:endParaRPr lang="en-NL"/>
           </a:p>
@@ -2699,7 +2700,7 @@
           <a:p>
             <a:fld id="{028CE02D-A78E-4140-9ADC-F5E593AD7849}" type="datetimeFigureOut">
               <a:rPr lang="en-NL" smtClean="0"/>
-              <a:t>18/02/2025</a:t>
+              <a:t>26/02/2025</a:t>
             </a:fld>
             <a:endParaRPr lang="en-NL"/>
           </a:p>
@@ -2942,7 +2943,7 @@
           <a:p>
             <a:fld id="{028CE02D-A78E-4140-9ADC-F5E593AD7849}" type="datetimeFigureOut">
               <a:rPr lang="en-NL" smtClean="0"/>
-              <a:t>18/02/2025</a:t>
+              <a:t>26/02/2025</a:t>
             </a:fld>
             <a:endParaRPr lang="en-NL"/>
           </a:p>
@@ -3448,7 +3449,7 @@
           <p:cNvPr id="2" name="Title 1">
             <a:extLst>
               <a:ext uri="{FF2B5EF4-FFF2-40B4-BE49-F238E27FC236}">
-                <a16:creationId xmlns:a16="http://schemas.microsoft.com/office/drawing/2014/main" id="{44F11F48-5FE9-46D6-8B09-3E631B3D42F8}"/>
+                <a16:creationId xmlns:a16="http://schemas.microsoft.com/office/drawing/2014/main" id="{7F548463-7A81-4569-8B14-B1962306B7A6}"/>
               </a:ext>
             </a:extLst>
           </p:cNvPr>
@@ -3465,12 +3466,8 @@
           <a:lstStyle/>
           <a:p>
             <a:r>
-              <a:rPr lang="en-US" dirty="0" err="1"/>
-              <a:t>Phosphosite</a:t>
-            </a:r>
-            <a:r>
-              <a:rPr lang="en-US" dirty="0"/>
-              <a:t> Analysis (T-Test supergroup)</a:t>
+              <a:rPr lang="en-US" dirty="0"/>
+              <a:t>QC</a:t>
             </a:r>
             <a:endParaRPr lang="en-NL" dirty="0"/>
           </a:p>
@@ -3481,7 +3478,7 @@
           <p:cNvPr id="3" name="Content Placeholder 2">
             <a:extLst>
               <a:ext uri="{FF2B5EF4-FFF2-40B4-BE49-F238E27FC236}">
-                <a16:creationId xmlns:a16="http://schemas.microsoft.com/office/drawing/2014/main" id="{DD9C2BF1-44B7-43DF-990A-74BF16A9E112}"/>
+                <a16:creationId xmlns:a16="http://schemas.microsoft.com/office/drawing/2014/main" id="{305BD680-1103-4B17-AD54-F2507929BA78}"/>
               </a:ext>
             </a:extLst>
           </p:cNvPr>
@@ -3492,21 +3489,22 @@
             <p:ph idx="1"/>
           </p:nvPr>
         </p:nvSpPr>
-        <p:spPr>
-          <a:xfrm>
-            <a:off x="838200" y="1825625"/>
-            <a:ext cx="10515600" cy="1380713"/>
-          </a:xfrm>
-        </p:spPr>
-        <p:txBody>
-          <a:bodyPr>
-            <a:normAutofit fontScale="77500" lnSpcReduction="20000"/>
-          </a:bodyPr>
-          <a:lstStyle/>
-          <a:p>
-            <a:r>
-              <a:rPr lang="en-US" dirty="0"/>
-              <a:t>Take tab-delimited text files from </a:t>
+        <p:spPr/>
+        <p:txBody>
+          <a:bodyPr/>
+          <a:lstStyle/>
+          <a:p>
+            <a:r>
+              <a:rPr lang="en-US" dirty="0"/>
+              <a:t>Export </a:t>
+            </a:r>
+            <a:r>
+              <a:rPr lang="en-US" b="1" dirty="0"/>
+              <a:t>flat file </a:t>
+            </a:r>
+            <a:r>
+              <a:rPr lang="en-US" dirty="0"/>
+              <a:t>from </a:t>
             </a:r>
             <a:r>
               <a:rPr lang="en-US" dirty="0" err="1"/>
@@ -3514,32 +3512,29 @@
             </a:r>
             <a:r>
               <a:rPr lang="en-US" dirty="0"/>
-              <a:t> of </a:t>
-            </a:r>
-            <a:r>
-              <a:rPr lang="en-US" dirty="0" err="1"/>
-              <a:t>LogFC</a:t>
-            </a:r>
-            <a:r>
-              <a:rPr lang="en-US" dirty="0"/>
-              <a:t> and P values from the </a:t>
-            </a:r>
-            <a:r>
-              <a:rPr lang="en-US" dirty="0" err="1"/>
-              <a:t>DataExports</a:t>
-            </a:r>
-            <a:r>
-              <a:rPr lang="en-US" dirty="0"/>
-              <a:t> folder</a:t>
-            </a:r>
-            <a:endParaRPr lang="hu-HU" dirty="0"/>
-          </a:p>
-          <a:p>
-            <a:r>
-              <a:rPr lang="hu-HU" dirty="0"/>
-              <a:t>PTK and STK files have to contain the exact same supergroup name!</a:t>
-            </a:r>
-            <a:endParaRPr lang="en-US" dirty="0"/>
+              <a:t> after log2 transformation</a:t>
+            </a:r>
+          </a:p>
+          <a:p>
+            <a:pPr lvl="1"/>
+            <a:r>
+              <a:rPr lang="en-US" dirty="0"/>
+              <a:t>Array factors: Barcode, Array, and Test condition</a:t>
+            </a:r>
+          </a:p>
+          <a:p>
+            <a:pPr lvl="1"/>
+            <a:r>
+              <a:rPr lang="en-US" dirty="0"/>
+              <a:t>Spot factor: ID</a:t>
+            </a:r>
+          </a:p>
+          <a:p>
+            <a:pPr lvl="1"/>
+            <a:r>
+              <a:rPr lang="en-US" dirty="0"/>
+              <a:t>Quantitation type: S100-logTransformed</a:t>
+            </a:r>
           </a:p>
           <a:p>
             <a:r>
@@ -3548,14 +3543,23 @@
             </a:r>
             <a:endParaRPr lang="en-NL" dirty="0"/>
           </a:p>
-        </p:txBody>
-      </p:sp>
-      <p:sp>
-        <p:nvSpPr>
-          <p:cNvPr id="5" name="TextBox 4">
-            <a:extLst>
-              <a:ext uri="{FF2B5EF4-FFF2-40B4-BE49-F238E27FC236}">
-                <a16:creationId xmlns:a16="http://schemas.microsoft.com/office/drawing/2014/main" id="{2F1EB3F0-7C4D-4F3B-9B2F-7B762E4A212D}"/>
+          <a:p>
+            <a:endParaRPr lang="en-US" dirty="0">
+              <a:latin typeface="Courier New" panose="02070309020205020404" pitchFamily="49" charset="0"/>
+              <a:cs typeface="Courier New" panose="02070309020205020404" pitchFamily="49" charset="0"/>
+            </a:endParaRPr>
+          </a:p>
+          <a:p>
+            <a:endParaRPr lang="en-NL" dirty="0"/>
+          </a:p>
+        </p:txBody>
+      </p:sp>
+      <p:sp>
+        <p:nvSpPr>
+          <p:cNvPr id="4" name="TextBox 3">
+            <a:extLst>
+              <a:ext uri="{FF2B5EF4-FFF2-40B4-BE49-F238E27FC236}">
+                <a16:creationId xmlns:a16="http://schemas.microsoft.com/office/drawing/2014/main" id="{48ED3C35-A82F-4EE7-8E49-C97BA7693298}"/>
               </a:ext>
             </a:extLst>
           </p:cNvPr>
@@ -3564,8 +3568,8 @@
         </p:nvSpPr>
         <p:spPr>
           <a:xfrm>
-            <a:off x="4309941" y="3617209"/>
-            <a:ext cx="2908297" cy="369332"/>
+            <a:off x="4754089" y="4675528"/>
+            <a:ext cx="1235788" cy="369332"/>
           </a:xfrm>
           <a:prstGeom prst="rect">
             <a:avLst/>
@@ -3580,7 +3584,178 @@
           <a:p>
             <a:r>
               <a:rPr lang="en-US" dirty="0"/>
-              <a:t>TT_PTK_01_Group_LogFC.txt</a:t>
+              <a:t>QC_PTK.txt</a:t>
+            </a:r>
+            <a:endParaRPr lang="en-NL" dirty="0"/>
+          </a:p>
+        </p:txBody>
+      </p:sp>
+      <p:sp>
+        <p:nvSpPr>
+          <p:cNvPr id="5" name="Rectangle 4">
+            <a:extLst>
+              <a:ext uri="{FF2B5EF4-FFF2-40B4-BE49-F238E27FC236}">
+                <a16:creationId xmlns:a16="http://schemas.microsoft.com/office/drawing/2014/main" id="{16764EFF-35EF-4ED8-8B4F-1276D9AB12BE}"/>
+              </a:ext>
+            </a:extLst>
+          </p:cNvPr>
+          <p:cNvSpPr/>
+          <p:nvPr/>
+        </p:nvSpPr>
+        <p:spPr>
+          <a:xfrm>
+            <a:off x="2110839" y="5112328"/>
+            <a:ext cx="338447" cy="326572"/>
+          </a:xfrm>
+          <a:prstGeom prst="rect">
+            <a:avLst/>
+          </a:prstGeom>
+          <a:ln>
+            <a:solidFill>
+              <a:schemeClr val="accent1"/>
+            </a:solidFill>
+          </a:ln>
+        </p:spPr>
+        <p:style>
+          <a:lnRef idx="2">
+            <a:schemeClr val="accent1">
+              <a:shade val="50000"/>
+            </a:schemeClr>
+          </a:lnRef>
+          <a:fillRef idx="1">
+            <a:schemeClr val="accent1"/>
+          </a:fillRef>
+          <a:effectRef idx="0">
+            <a:schemeClr val="accent1"/>
+          </a:effectRef>
+          <a:fontRef idx="minor">
+            <a:schemeClr val="lt1"/>
+          </a:fontRef>
+        </p:style>
+        <p:txBody>
+          <a:bodyPr rtlCol="0" anchor="ctr"/>
+          <a:lstStyle/>
+          <a:p>
+            <a:pPr algn="ctr"/>
+            <a:endParaRPr lang="en-NL"/>
+          </a:p>
+        </p:txBody>
+      </p:sp>
+      <p:sp>
+        <p:nvSpPr>
+          <p:cNvPr id="6" name="TextBox 5">
+            <a:extLst>
+              <a:ext uri="{FF2B5EF4-FFF2-40B4-BE49-F238E27FC236}">
+                <a16:creationId xmlns:a16="http://schemas.microsoft.com/office/drawing/2014/main" id="{55A17AD9-295F-4C9A-A00B-D2FB0F337333}"/>
+              </a:ext>
+            </a:extLst>
+          </p:cNvPr>
+          <p:cNvSpPr txBox="1"/>
+          <p:nvPr/>
+        </p:nvSpPr>
+        <p:spPr>
+          <a:xfrm>
+            <a:off x="2449286" y="5112328"/>
+            <a:ext cx="2419252" cy="369332"/>
+          </a:xfrm>
+          <a:prstGeom prst="rect">
+            <a:avLst/>
+          </a:prstGeom>
+          <a:noFill/>
+        </p:spPr>
+        <p:txBody>
+          <a:bodyPr wrap="none" rtlCol="0">
+            <a:spAutoFit/>
+          </a:bodyPr>
+          <a:lstStyle/>
+          <a:p>
+            <a:r>
+              <a:rPr lang="en-US" dirty="0"/>
+              <a:t>File type. Should be QC.</a:t>
+            </a:r>
+            <a:endParaRPr lang="en-NL" dirty="0"/>
+          </a:p>
+        </p:txBody>
+      </p:sp>
+      <p:sp>
+        <p:nvSpPr>
+          <p:cNvPr id="7" name="Rectangle 6">
+            <a:extLst>
+              <a:ext uri="{FF2B5EF4-FFF2-40B4-BE49-F238E27FC236}">
+                <a16:creationId xmlns:a16="http://schemas.microsoft.com/office/drawing/2014/main" id="{0D6C873F-AED0-4FAF-8238-535E97558449}"/>
+              </a:ext>
+            </a:extLst>
+          </p:cNvPr>
+          <p:cNvSpPr/>
+          <p:nvPr/>
+        </p:nvSpPr>
+        <p:spPr>
+          <a:xfrm>
+            <a:off x="2107530" y="5481660"/>
+            <a:ext cx="338447" cy="326572"/>
+          </a:xfrm>
+          <a:prstGeom prst="rect">
+            <a:avLst/>
+          </a:prstGeom>
+          <a:solidFill>
+            <a:schemeClr val="accent2"/>
+          </a:solidFill>
+          <a:ln/>
+        </p:spPr>
+        <p:style>
+          <a:lnRef idx="2">
+            <a:schemeClr val="accent2"/>
+          </a:lnRef>
+          <a:fillRef idx="1">
+            <a:schemeClr val="lt1"/>
+          </a:fillRef>
+          <a:effectRef idx="0">
+            <a:schemeClr val="accent2"/>
+          </a:effectRef>
+          <a:fontRef idx="minor">
+            <a:schemeClr val="dk1"/>
+          </a:fontRef>
+        </p:style>
+        <p:txBody>
+          <a:bodyPr rtlCol="0" anchor="ctr"/>
+          <a:lstStyle/>
+          <a:p>
+            <a:pPr algn="ctr"/>
+            <a:endParaRPr lang="en-NL"/>
+          </a:p>
+        </p:txBody>
+      </p:sp>
+      <p:sp>
+        <p:nvSpPr>
+          <p:cNvPr id="8" name="TextBox 7">
+            <a:extLst>
+              <a:ext uri="{FF2B5EF4-FFF2-40B4-BE49-F238E27FC236}">
+                <a16:creationId xmlns:a16="http://schemas.microsoft.com/office/drawing/2014/main" id="{166696B0-C72A-4247-9A8B-40E4103F161D}"/>
+              </a:ext>
+            </a:extLst>
+          </p:cNvPr>
+          <p:cNvSpPr txBox="1"/>
+          <p:nvPr/>
+        </p:nvSpPr>
+        <p:spPr>
+          <a:xfrm>
+            <a:off x="2445977" y="5481660"/>
+            <a:ext cx="3135858" cy="369332"/>
+          </a:xfrm>
+          <a:prstGeom prst="rect">
+            <a:avLst/>
+          </a:prstGeom>
+          <a:noFill/>
+        </p:spPr>
+        <p:txBody>
+          <a:bodyPr wrap="none" rtlCol="0">
+            <a:spAutoFit/>
+          </a:bodyPr>
+          <a:lstStyle/>
+          <a:p>
+            <a:r>
+              <a:rPr lang="en-US" dirty="0"/>
+              <a:t>Assay type. Options: PTK or STK</a:t>
             </a:r>
             <a:endParaRPr lang="en-NL" dirty="0"/>
           </a:p>
@@ -3588,20 +3763,22 @@
       </p:sp>
       <p:cxnSp>
         <p:nvCxnSpPr>
-          <p:cNvPr id="18" name="Straight Connector 17">
-            <a:extLst>
-              <a:ext uri="{FF2B5EF4-FFF2-40B4-BE49-F238E27FC236}">
-                <a16:creationId xmlns:a16="http://schemas.microsoft.com/office/drawing/2014/main" id="{91A43A0D-837B-40CB-B668-DAADC9008E49}"/>
-              </a:ext>
-            </a:extLst>
-          </p:cNvPr>
-          <p:cNvCxnSpPr/>
+          <p:cNvPr id="13" name="Straight Connector 12">
+            <a:extLst>
+              <a:ext uri="{FF2B5EF4-FFF2-40B4-BE49-F238E27FC236}">
+                <a16:creationId xmlns:a16="http://schemas.microsoft.com/office/drawing/2014/main" id="{83EA0D79-7532-412F-BCCA-8BEA7BE9469C}"/>
+              </a:ext>
+            </a:extLst>
+          </p:cNvPr>
+          <p:cNvCxnSpPr>
+            <a:cxnSpLocks/>
+          </p:cNvCxnSpPr>
           <p:nvPr/>
         </p:nvCxnSpPr>
         <p:spPr>
           <a:xfrm>
-            <a:off x="4399006" y="3905186"/>
-            <a:ext cx="221673" cy="0"/>
+            <a:off x="4880758" y="4961517"/>
+            <a:ext cx="231570" cy="0"/>
           </a:xfrm>
           <a:prstGeom prst="line">
             <a:avLst/>
@@ -3625,20 +3802,22 @@
       </p:cxnSp>
       <p:cxnSp>
         <p:nvCxnSpPr>
-          <p:cNvPr id="21" name="Straight Connector 20">
-            <a:extLst>
-              <a:ext uri="{FF2B5EF4-FFF2-40B4-BE49-F238E27FC236}">
-                <a16:creationId xmlns:a16="http://schemas.microsoft.com/office/drawing/2014/main" id="{88DE3F3C-8A6F-455D-AECB-1195CBFC1C0A}"/>
-              </a:ext>
-            </a:extLst>
-          </p:cNvPr>
-          <p:cNvCxnSpPr/>
+          <p:cNvPr id="14" name="Straight Connector 13">
+            <a:extLst>
+              <a:ext uri="{FF2B5EF4-FFF2-40B4-BE49-F238E27FC236}">
+                <a16:creationId xmlns:a16="http://schemas.microsoft.com/office/drawing/2014/main" id="{87DED667-E6A8-45CF-A2A9-5B404ECA8AE2}"/>
+              </a:ext>
+            </a:extLst>
+          </p:cNvPr>
+          <p:cNvCxnSpPr>
+            <a:cxnSpLocks/>
+          </p:cNvCxnSpPr>
           <p:nvPr/>
         </p:nvCxnSpPr>
         <p:spPr>
           <a:xfrm>
-            <a:off x="4767141" y="3905186"/>
-            <a:ext cx="279070" cy="0"/>
+            <a:off x="5258790" y="4961517"/>
+            <a:ext cx="323045" cy="0"/>
           </a:xfrm>
           <a:prstGeom prst="line">
             <a:avLst/>
@@ -3660,582 +3839,12 @@
           </a:fontRef>
         </p:style>
       </p:cxnSp>
-      <p:cxnSp>
-        <p:nvCxnSpPr>
-          <p:cNvPr id="23" name="Straight Connector 22">
-            <a:extLst>
-              <a:ext uri="{FF2B5EF4-FFF2-40B4-BE49-F238E27FC236}">
-                <a16:creationId xmlns:a16="http://schemas.microsoft.com/office/drawing/2014/main" id="{E9790DB0-EA56-4A3D-AA44-5FC556B7BB9A}"/>
-              </a:ext>
-            </a:extLst>
-          </p:cNvPr>
-          <p:cNvCxnSpPr/>
-          <p:nvPr/>
-        </p:nvCxnSpPr>
-        <p:spPr>
-          <a:xfrm>
-            <a:off x="5220383" y="3905186"/>
-            <a:ext cx="178129" cy="0"/>
-          </a:xfrm>
-          <a:prstGeom prst="line">
-            <a:avLst/>
-          </a:prstGeom>
-          <a:ln w="38100"/>
-        </p:spPr>
-        <p:style>
-          <a:lnRef idx="1">
-            <a:schemeClr val="accent6"/>
-          </a:lnRef>
-          <a:fillRef idx="0">
-            <a:schemeClr val="accent6"/>
-          </a:fillRef>
-          <a:effectRef idx="0">
-            <a:schemeClr val="accent6"/>
-          </a:effectRef>
-          <a:fontRef idx="minor">
-            <a:schemeClr val="tx1"/>
-          </a:fontRef>
-        </p:style>
-      </p:cxnSp>
-      <p:cxnSp>
-        <p:nvCxnSpPr>
-          <p:cNvPr id="24" name="Straight Connector 23">
-            <a:extLst>
-              <a:ext uri="{FF2B5EF4-FFF2-40B4-BE49-F238E27FC236}">
-                <a16:creationId xmlns:a16="http://schemas.microsoft.com/office/drawing/2014/main" id="{82E82212-B246-4AB8-B5CD-24826FE634B4}"/>
-              </a:ext>
-            </a:extLst>
-          </p:cNvPr>
-          <p:cNvCxnSpPr>
-            <a:cxnSpLocks/>
-          </p:cNvCxnSpPr>
-          <p:nvPr/>
-        </p:nvCxnSpPr>
-        <p:spPr>
-          <a:xfrm>
-            <a:off x="5562788" y="3909144"/>
-            <a:ext cx="541450" cy="0"/>
-          </a:xfrm>
-          <a:prstGeom prst="line">
-            <a:avLst/>
-          </a:prstGeom>
-          <a:ln w="38100">
-            <a:solidFill>
-              <a:srgbClr val="FF0000"/>
-            </a:solidFill>
-          </a:ln>
-        </p:spPr>
-        <p:style>
-          <a:lnRef idx="1">
-            <a:schemeClr val="accent6"/>
-          </a:lnRef>
-          <a:fillRef idx="0">
-            <a:schemeClr val="accent6"/>
-          </a:fillRef>
-          <a:effectRef idx="0">
-            <a:schemeClr val="accent6"/>
-          </a:effectRef>
-          <a:fontRef idx="minor">
-            <a:schemeClr val="tx1"/>
-          </a:fontRef>
-        </p:style>
-      </p:cxnSp>
-      <p:cxnSp>
-        <p:nvCxnSpPr>
-          <p:cNvPr id="28" name="Straight Connector 27">
-            <a:extLst>
-              <a:ext uri="{FF2B5EF4-FFF2-40B4-BE49-F238E27FC236}">
-                <a16:creationId xmlns:a16="http://schemas.microsoft.com/office/drawing/2014/main" id="{6CF916A1-EB8B-40AB-80EA-FCCBAB3D2D7B}"/>
-              </a:ext>
-            </a:extLst>
-          </p:cNvPr>
-          <p:cNvCxnSpPr/>
-          <p:nvPr/>
-        </p:nvCxnSpPr>
-        <p:spPr>
-          <a:xfrm>
-            <a:off x="6254606" y="3905186"/>
-            <a:ext cx="843148" cy="0"/>
-          </a:xfrm>
-          <a:prstGeom prst="line">
-            <a:avLst/>
-          </a:prstGeom>
-          <a:ln w="38100"/>
-        </p:spPr>
-        <p:style>
-          <a:lnRef idx="1">
-            <a:schemeClr val="accent3"/>
-          </a:lnRef>
-          <a:fillRef idx="0">
-            <a:schemeClr val="accent3"/>
-          </a:fillRef>
-          <a:effectRef idx="0">
-            <a:schemeClr val="accent3"/>
-          </a:effectRef>
-          <a:fontRef idx="minor">
-            <a:schemeClr val="tx1"/>
-          </a:fontRef>
-        </p:style>
-      </p:cxnSp>
-      <p:sp>
-        <p:nvSpPr>
-          <p:cNvPr id="30" name="Rectangle 29">
-            <a:extLst>
-              <a:ext uri="{FF2B5EF4-FFF2-40B4-BE49-F238E27FC236}">
-                <a16:creationId xmlns:a16="http://schemas.microsoft.com/office/drawing/2014/main" id="{BB152CBD-3826-40B2-94F3-816B47FC697A}"/>
-              </a:ext>
-            </a:extLst>
-          </p:cNvPr>
-          <p:cNvSpPr/>
-          <p:nvPr/>
-        </p:nvSpPr>
-        <p:spPr>
-          <a:xfrm>
-            <a:off x="2098963" y="4346369"/>
-            <a:ext cx="338447" cy="326572"/>
-          </a:xfrm>
-          <a:prstGeom prst="rect">
-            <a:avLst/>
-          </a:prstGeom>
-          <a:ln>
-            <a:solidFill>
-              <a:schemeClr val="accent1"/>
-            </a:solidFill>
-          </a:ln>
-        </p:spPr>
-        <p:style>
-          <a:lnRef idx="2">
-            <a:schemeClr val="accent1">
-              <a:shade val="50000"/>
-            </a:schemeClr>
-          </a:lnRef>
-          <a:fillRef idx="1">
-            <a:schemeClr val="accent1"/>
-          </a:fillRef>
-          <a:effectRef idx="0">
-            <a:schemeClr val="accent1"/>
-          </a:effectRef>
-          <a:fontRef idx="minor">
-            <a:schemeClr val="lt1"/>
-          </a:fontRef>
-        </p:style>
-        <p:txBody>
-          <a:bodyPr rtlCol="0" anchor="ctr"/>
-          <a:lstStyle/>
-          <a:p>
-            <a:pPr algn="ctr"/>
-            <a:endParaRPr lang="en-NL"/>
-          </a:p>
-        </p:txBody>
-      </p:sp>
-      <p:sp>
-        <p:nvSpPr>
-          <p:cNvPr id="31" name="TextBox 30">
-            <a:extLst>
-              <a:ext uri="{FF2B5EF4-FFF2-40B4-BE49-F238E27FC236}">
-                <a16:creationId xmlns:a16="http://schemas.microsoft.com/office/drawing/2014/main" id="{E3BFE06C-0043-417F-8F95-1368D728335F}"/>
-              </a:ext>
-            </a:extLst>
-          </p:cNvPr>
-          <p:cNvSpPr txBox="1"/>
-          <p:nvPr/>
-        </p:nvSpPr>
-        <p:spPr>
-          <a:xfrm>
-            <a:off x="2437410" y="4346369"/>
-            <a:ext cx="3135410" cy="369332"/>
-          </a:xfrm>
-          <a:prstGeom prst="rect">
-            <a:avLst/>
-          </a:prstGeom>
-          <a:noFill/>
-        </p:spPr>
-        <p:txBody>
-          <a:bodyPr wrap="none" rtlCol="0">
-            <a:spAutoFit/>
-          </a:bodyPr>
-          <a:lstStyle/>
-          <a:p>
-            <a:r>
-              <a:rPr lang="en-US" dirty="0"/>
-              <a:t>Stats type. Options: </a:t>
-            </a:r>
-            <a:r>
-              <a:rPr lang="en-US" dirty="0" err="1"/>
-              <a:t>MTvC</a:t>
-            </a:r>
-            <a:r>
-              <a:rPr lang="en-US" dirty="0"/>
-              <a:t> or TT</a:t>
-            </a:r>
-            <a:endParaRPr lang="en-NL" dirty="0"/>
-          </a:p>
-        </p:txBody>
-      </p:sp>
-      <p:sp>
-        <p:nvSpPr>
-          <p:cNvPr id="32" name="Rectangle 31">
-            <a:extLst>
-              <a:ext uri="{FF2B5EF4-FFF2-40B4-BE49-F238E27FC236}">
-                <a16:creationId xmlns:a16="http://schemas.microsoft.com/office/drawing/2014/main" id="{E57E36FD-5BEA-40BA-849E-603DAB62A121}"/>
-              </a:ext>
-            </a:extLst>
-          </p:cNvPr>
-          <p:cNvSpPr/>
-          <p:nvPr/>
-        </p:nvSpPr>
-        <p:spPr>
-          <a:xfrm>
-            <a:off x="2095654" y="4715701"/>
-            <a:ext cx="338447" cy="326572"/>
-          </a:xfrm>
-          <a:prstGeom prst="rect">
-            <a:avLst/>
-          </a:prstGeom>
-          <a:solidFill>
-            <a:schemeClr val="accent2"/>
-          </a:solidFill>
-          <a:ln/>
-        </p:spPr>
-        <p:style>
-          <a:lnRef idx="2">
-            <a:schemeClr val="accent2"/>
-          </a:lnRef>
-          <a:fillRef idx="1">
-            <a:schemeClr val="lt1"/>
-          </a:fillRef>
-          <a:effectRef idx="0">
-            <a:schemeClr val="accent2"/>
-          </a:effectRef>
-          <a:fontRef idx="minor">
-            <a:schemeClr val="dk1"/>
-          </a:fontRef>
-        </p:style>
-        <p:txBody>
-          <a:bodyPr rtlCol="0" anchor="ctr"/>
-          <a:lstStyle/>
-          <a:p>
-            <a:pPr algn="ctr"/>
-            <a:endParaRPr lang="en-NL"/>
-          </a:p>
-        </p:txBody>
-      </p:sp>
-      <p:sp>
-        <p:nvSpPr>
-          <p:cNvPr id="33" name="TextBox 32">
-            <a:extLst>
-              <a:ext uri="{FF2B5EF4-FFF2-40B4-BE49-F238E27FC236}">
-                <a16:creationId xmlns:a16="http://schemas.microsoft.com/office/drawing/2014/main" id="{CF933DA8-7734-4D38-841F-BE4BB9CD8C02}"/>
-              </a:ext>
-            </a:extLst>
-          </p:cNvPr>
-          <p:cNvSpPr txBox="1"/>
-          <p:nvPr/>
-        </p:nvSpPr>
-        <p:spPr>
-          <a:xfrm>
-            <a:off x="2434101" y="4715701"/>
-            <a:ext cx="3135858" cy="369332"/>
-          </a:xfrm>
-          <a:prstGeom prst="rect">
-            <a:avLst/>
-          </a:prstGeom>
-          <a:noFill/>
-        </p:spPr>
-        <p:txBody>
-          <a:bodyPr wrap="none" rtlCol="0">
-            <a:spAutoFit/>
-          </a:bodyPr>
-          <a:lstStyle/>
-          <a:p>
-            <a:r>
-              <a:rPr lang="en-US" dirty="0"/>
-              <a:t>Assay type. Options: PTK or STK</a:t>
-            </a:r>
-            <a:endParaRPr lang="en-NL" dirty="0"/>
-          </a:p>
-        </p:txBody>
-      </p:sp>
-      <p:sp>
-        <p:nvSpPr>
-          <p:cNvPr id="34" name="Rectangle 33">
-            <a:extLst>
-              <a:ext uri="{FF2B5EF4-FFF2-40B4-BE49-F238E27FC236}">
-                <a16:creationId xmlns:a16="http://schemas.microsoft.com/office/drawing/2014/main" id="{19285AE9-17E2-42C5-B37F-5A1C6A2DABE4}"/>
-              </a:ext>
-            </a:extLst>
-          </p:cNvPr>
-          <p:cNvSpPr/>
-          <p:nvPr/>
-        </p:nvSpPr>
-        <p:spPr>
-          <a:xfrm>
-            <a:off x="2095654" y="5079072"/>
-            <a:ext cx="338447" cy="326572"/>
-          </a:xfrm>
-          <a:prstGeom prst="rect">
-            <a:avLst/>
-          </a:prstGeom>
-          <a:solidFill>
-            <a:schemeClr val="accent6"/>
-          </a:solidFill>
-          <a:ln>
-            <a:solidFill>
-              <a:schemeClr val="accent6"/>
-            </a:solidFill>
-          </a:ln>
-        </p:spPr>
-        <p:style>
-          <a:lnRef idx="2">
-            <a:schemeClr val="accent1">
-              <a:shade val="50000"/>
-            </a:schemeClr>
-          </a:lnRef>
-          <a:fillRef idx="1">
-            <a:schemeClr val="accent1"/>
-          </a:fillRef>
-          <a:effectRef idx="0">
-            <a:schemeClr val="accent1"/>
-          </a:effectRef>
-          <a:fontRef idx="minor">
-            <a:schemeClr val="lt1"/>
-          </a:fontRef>
-        </p:style>
-        <p:txBody>
-          <a:bodyPr rtlCol="0" anchor="ctr"/>
-          <a:lstStyle/>
-          <a:p>
-            <a:pPr algn="ctr"/>
-            <a:endParaRPr lang="en-NL"/>
-          </a:p>
-        </p:txBody>
-      </p:sp>
-      <p:sp>
-        <p:nvSpPr>
-          <p:cNvPr id="35" name="TextBox 34">
-            <a:extLst>
-              <a:ext uri="{FF2B5EF4-FFF2-40B4-BE49-F238E27FC236}">
-                <a16:creationId xmlns:a16="http://schemas.microsoft.com/office/drawing/2014/main" id="{DDDF34B4-6185-47F7-A166-0F066D3EC698}"/>
-              </a:ext>
-            </a:extLst>
-          </p:cNvPr>
-          <p:cNvSpPr txBox="1"/>
-          <p:nvPr/>
-        </p:nvSpPr>
-        <p:spPr>
-          <a:xfrm>
-            <a:off x="2434101" y="5079072"/>
-            <a:ext cx="4402487" cy="369332"/>
-          </a:xfrm>
-          <a:prstGeom prst="rect">
-            <a:avLst/>
-          </a:prstGeom>
-          <a:noFill/>
-        </p:spPr>
-        <p:txBody>
-          <a:bodyPr wrap="none" rtlCol="0">
-            <a:spAutoFit/>
-          </a:bodyPr>
-          <a:lstStyle/>
-          <a:p>
-            <a:r>
-              <a:rPr lang="en-US" dirty="0"/>
-              <a:t>Order, only for TT. Defines ordering in report.</a:t>
-            </a:r>
-            <a:endParaRPr lang="en-NL" dirty="0"/>
-          </a:p>
-        </p:txBody>
-      </p:sp>
-      <p:sp>
-        <p:nvSpPr>
-          <p:cNvPr id="36" name="Rectangle 35">
-            <a:extLst>
-              <a:ext uri="{FF2B5EF4-FFF2-40B4-BE49-F238E27FC236}">
-                <a16:creationId xmlns:a16="http://schemas.microsoft.com/office/drawing/2014/main" id="{5CEE573A-1780-406E-82DD-3BAF4DF5BD41}"/>
-              </a:ext>
-            </a:extLst>
-          </p:cNvPr>
-          <p:cNvSpPr/>
-          <p:nvPr/>
-        </p:nvSpPr>
-        <p:spPr>
-          <a:xfrm>
-            <a:off x="2095654" y="5444861"/>
-            <a:ext cx="338447" cy="326572"/>
-          </a:xfrm>
-          <a:prstGeom prst="rect">
-            <a:avLst/>
-          </a:prstGeom>
-          <a:solidFill>
-            <a:srgbClr val="FF0000"/>
-          </a:solidFill>
-          <a:ln>
-            <a:solidFill>
-              <a:srgbClr val="FF0000"/>
-            </a:solidFill>
-          </a:ln>
-        </p:spPr>
-        <p:style>
-          <a:lnRef idx="2">
-            <a:schemeClr val="accent1">
-              <a:shade val="50000"/>
-            </a:schemeClr>
-          </a:lnRef>
-          <a:fillRef idx="1">
-            <a:schemeClr val="accent1"/>
-          </a:fillRef>
-          <a:effectRef idx="0">
-            <a:schemeClr val="accent1"/>
-          </a:effectRef>
-          <a:fontRef idx="minor">
-            <a:schemeClr val="lt1"/>
-          </a:fontRef>
-        </p:style>
-        <p:txBody>
-          <a:bodyPr rtlCol="0" anchor="ctr"/>
-          <a:lstStyle/>
-          <a:p>
-            <a:pPr algn="ctr"/>
-            <a:endParaRPr lang="en-NL"/>
-          </a:p>
-        </p:txBody>
-      </p:sp>
-      <p:sp>
-        <p:nvSpPr>
-          <p:cNvPr id="37" name="TextBox 36">
-            <a:extLst>
-              <a:ext uri="{FF2B5EF4-FFF2-40B4-BE49-F238E27FC236}">
-                <a16:creationId xmlns:a16="http://schemas.microsoft.com/office/drawing/2014/main" id="{5050D63D-481F-4F77-B2C9-AD6FF9537F8C}"/>
-              </a:ext>
-            </a:extLst>
-          </p:cNvPr>
-          <p:cNvSpPr txBox="1"/>
-          <p:nvPr/>
-        </p:nvSpPr>
-        <p:spPr>
-          <a:xfrm>
-            <a:off x="2434101" y="5444861"/>
-            <a:ext cx="9403408" cy="369332"/>
-          </a:xfrm>
-          <a:prstGeom prst="rect">
-            <a:avLst/>
-          </a:prstGeom>
-          <a:noFill/>
-        </p:spPr>
-        <p:txBody>
-          <a:bodyPr wrap="none" rtlCol="0">
-            <a:spAutoFit/>
-          </a:bodyPr>
-          <a:lstStyle/>
-          <a:p>
-            <a:r>
-              <a:rPr lang="en-GB" dirty="0"/>
-              <a:t>Group, defines the name of the supergroup. Must be unique. Comparisons come from annotation.</a:t>
-            </a:r>
-            <a:endParaRPr lang="en-NL" dirty="0"/>
-          </a:p>
-        </p:txBody>
-      </p:sp>
-      <p:sp>
-        <p:nvSpPr>
-          <p:cNvPr id="38" name="Rectangle 37">
-            <a:extLst>
-              <a:ext uri="{FF2B5EF4-FFF2-40B4-BE49-F238E27FC236}">
-                <a16:creationId xmlns:a16="http://schemas.microsoft.com/office/drawing/2014/main" id="{FD09869C-CCF9-4BD0-9EFB-AC4BAC6E6087}"/>
-              </a:ext>
-            </a:extLst>
-          </p:cNvPr>
-          <p:cNvSpPr/>
-          <p:nvPr/>
-        </p:nvSpPr>
-        <p:spPr>
-          <a:xfrm>
-            <a:off x="2095654" y="5818312"/>
-            <a:ext cx="338447" cy="326572"/>
-          </a:xfrm>
-          <a:prstGeom prst="rect">
-            <a:avLst/>
-          </a:prstGeom>
-          <a:solidFill>
-            <a:schemeClr val="bg1">
-              <a:lumMod val="50000"/>
-            </a:schemeClr>
-          </a:solidFill>
-          <a:ln>
-            <a:solidFill>
-              <a:schemeClr val="bg1">
-                <a:lumMod val="50000"/>
-              </a:schemeClr>
-            </a:solidFill>
-          </a:ln>
-        </p:spPr>
-        <p:style>
-          <a:lnRef idx="2">
-            <a:schemeClr val="accent1">
-              <a:shade val="50000"/>
-            </a:schemeClr>
-          </a:lnRef>
-          <a:fillRef idx="1">
-            <a:schemeClr val="accent1"/>
-          </a:fillRef>
-          <a:effectRef idx="0">
-            <a:schemeClr val="accent1"/>
-          </a:effectRef>
-          <a:fontRef idx="minor">
-            <a:schemeClr val="lt1"/>
-          </a:fontRef>
-        </p:style>
-        <p:txBody>
-          <a:bodyPr rtlCol="0" anchor="ctr"/>
-          <a:lstStyle/>
-          <a:p>
-            <a:pPr algn="ctr"/>
-            <a:endParaRPr lang="en-NL"/>
-          </a:p>
-        </p:txBody>
-      </p:sp>
-      <p:sp>
-        <p:nvSpPr>
-          <p:cNvPr id="39" name="TextBox 38">
-            <a:extLst>
-              <a:ext uri="{FF2B5EF4-FFF2-40B4-BE49-F238E27FC236}">
-                <a16:creationId xmlns:a16="http://schemas.microsoft.com/office/drawing/2014/main" id="{F83FF990-A1DB-4DA1-AC6B-9E66A4074CE5}"/>
-              </a:ext>
-            </a:extLst>
-          </p:cNvPr>
-          <p:cNvSpPr txBox="1"/>
-          <p:nvPr/>
-        </p:nvSpPr>
-        <p:spPr>
-          <a:xfrm>
-            <a:off x="2434101" y="5818312"/>
-            <a:ext cx="3544240" cy="369332"/>
-          </a:xfrm>
-          <a:prstGeom prst="rect">
-            <a:avLst/>
-          </a:prstGeom>
-          <a:noFill/>
-        </p:spPr>
-        <p:txBody>
-          <a:bodyPr wrap="none" rtlCol="0">
-            <a:spAutoFit/>
-          </a:bodyPr>
-          <a:lstStyle/>
-          <a:p>
-            <a:r>
-              <a:rPr lang="en-US" dirty="0"/>
-              <a:t>File type. Options: LogFC.txt or p.txt</a:t>
-            </a:r>
-            <a:endParaRPr lang="en-NL" dirty="0"/>
-          </a:p>
-        </p:txBody>
-      </p:sp>
-      <p:sp>
-        <p:nvSpPr>
-          <p:cNvPr id="25" name="TextBox 24">
-            <a:extLst>
-              <a:ext uri="{FF2B5EF4-FFF2-40B4-BE49-F238E27FC236}">
-                <a16:creationId xmlns:a16="http://schemas.microsoft.com/office/drawing/2014/main" id="{7B8C79A9-C42B-40E6-AB47-0F7E38F5F9C4}"/>
+      <p:sp>
+        <p:nvSpPr>
+          <p:cNvPr id="9" name="TextBox 8">
+            <a:extLst>
+              <a:ext uri="{FF2B5EF4-FFF2-40B4-BE49-F238E27FC236}">
+                <a16:creationId xmlns:a16="http://schemas.microsoft.com/office/drawing/2014/main" id="{DFB0C0C5-1885-4E62-A7F6-A4E7244AD1AE}"/>
               </a:ext>
             </a:extLst>
           </p:cNvPr>
@@ -4280,7 +3889,7 @@
     </p:spTree>
     <p:extLst>
       <p:ext uri="{BB962C8B-B14F-4D97-AF65-F5344CB8AC3E}">
-        <p14:creationId xmlns:p14="http://schemas.microsoft.com/office/powerpoint/2010/main" val="518656110"/>
+        <p14:creationId xmlns:p14="http://schemas.microsoft.com/office/powerpoint/2010/main" val="2653828608"/>
       </p:ext>
     </p:extLst>
   </p:cSld>
@@ -4334,11 +3943,7 @@
             </a:r>
             <a:r>
               <a:rPr lang="en-US" dirty="0"/>
-              <a:t> Analysis multiple </a:t>
-            </a:r>
-            <a:r>
-              <a:rPr lang="en-US" dirty="0" err="1"/>
-              <a:t>MTvCs</a:t>
+              <a:t> Analysis (T-Test supergroup)</a:t>
             </a:r>
             <a:endParaRPr lang="en-NL" dirty="0"/>
           </a:p>
@@ -4368,27 +3973,9 @@
         </p:spPr>
         <p:txBody>
           <a:bodyPr>
-            <a:normAutofit fontScale="70000" lnSpcReduction="20000"/>
+            <a:normAutofit fontScale="77500" lnSpcReduction="20000"/>
           </a:bodyPr>
           <a:lstStyle/>
-          <a:p>
-            <a:r>
-              <a:rPr lang="en-US" dirty="0" err="1"/>
-              <a:t>MTvC</a:t>
-            </a:r>
-            <a:r>
-              <a:rPr lang="en-US" dirty="0"/>
-              <a:t> filenames need to be different if you want to include multiple </a:t>
-            </a:r>
-            <a:r>
-              <a:rPr lang="en-US" dirty="0" err="1"/>
-              <a:t>MTvC</a:t>
-            </a:r>
-            <a:r>
-              <a:rPr lang="en-US" dirty="0"/>
-              <a:t> files in one report</a:t>
-            </a:r>
-          </a:p>
           <a:p>
             <a:r>
               <a:rPr lang="en-US" dirty="0"/>
@@ -4418,6 +4005,14 @@
               <a:rPr lang="en-US" dirty="0"/>
               <a:t> folder</a:t>
             </a:r>
+            <a:endParaRPr lang="hu-HU" dirty="0"/>
+          </a:p>
+          <a:p>
+            <a:r>
+              <a:rPr lang="hu-HU" dirty="0"/>
+              <a:t>PTK and STK files have to contain the exact same supergroup name!</a:t>
+            </a:r>
+            <a:endParaRPr lang="en-US" dirty="0"/>
           </a:p>
           <a:p>
             <a:r>
@@ -4442,8 +4037,8 @@
         </p:nvSpPr>
         <p:spPr>
           <a:xfrm>
-            <a:off x="3899065" y="3466997"/>
-            <a:ext cx="2975430" cy="369332"/>
+            <a:off x="4309941" y="3617209"/>
+            <a:ext cx="2908297" cy="369332"/>
           </a:xfrm>
           <a:prstGeom prst="rect">
             <a:avLst/>
@@ -4458,7 +4053,7 @@
           <a:p>
             <a:r>
               <a:rPr lang="en-US" dirty="0"/>
-              <a:t>MTvC_PTK_01_10h_LogFC.txt</a:t>
+              <a:t>TT_PTK_01_Group_LogFC.txt</a:t>
             </a:r>
             <a:endParaRPr lang="en-NL" dirty="0"/>
           </a:p>
@@ -4473,15 +4068,13 @@
               </a:ext>
             </a:extLst>
           </p:cNvPr>
-          <p:cNvCxnSpPr>
-            <a:cxnSpLocks/>
-          </p:cNvCxnSpPr>
+          <p:cNvCxnSpPr/>
           <p:nvPr/>
         </p:nvCxnSpPr>
         <p:spPr>
           <a:xfrm>
-            <a:off x="3996047" y="3779684"/>
-            <a:ext cx="522515" cy="0"/>
+            <a:off x="4399006" y="3905186"/>
+            <a:ext cx="221673" cy="0"/>
           </a:xfrm>
           <a:prstGeom prst="line">
             <a:avLst/>
@@ -4517,7 +4110,7 @@
         </p:nvCxnSpPr>
         <p:spPr>
           <a:xfrm>
-            <a:off x="4665024" y="3779684"/>
+            <a:off x="4767141" y="3905186"/>
             <a:ext cx="279070" cy="0"/>
           </a:xfrm>
           <a:prstGeom prst="line">
@@ -4554,7 +4147,7 @@
         </p:nvCxnSpPr>
         <p:spPr>
           <a:xfrm>
-            <a:off x="5118266" y="3779684"/>
+            <a:off x="5220383" y="3905186"/>
             <a:ext cx="178129" cy="0"/>
           </a:xfrm>
           <a:prstGeom prst="line">
@@ -4593,8 +4186,8 @@
         </p:nvCxnSpPr>
         <p:spPr>
           <a:xfrm>
-            <a:off x="5460671" y="3783642"/>
-            <a:ext cx="304800" cy="0"/>
+            <a:off x="5562788" y="3909144"/>
+            <a:ext cx="541450" cy="0"/>
           </a:xfrm>
           <a:prstGeom prst="line">
             <a:avLst/>
@@ -4634,7 +4227,7 @@
         </p:nvCxnSpPr>
         <p:spPr>
           <a:xfrm>
-            <a:off x="5911933" y="3779684"/>
+            <a:off x="6254606" y="3905186"/>
             <a:ext cx="843148" cy="0"/>
           </a:xfrm>
           <a:prstGeom prst="line">
@@ -4723,7 +4316,7 @@
         <p:spPr>
           <a:xfrm>
             <a:off x="2437410" y="4346369"/>
-            <a:ext cx="2600071" cy="369332"/>
+            <a:ext cx="3135410" cy="369332"/>
           </a:xfrm>
           <a:prstGeom prst="rect">
             <a:avLst/>
@@ -4743,6 +4336,10 @@
             <a:r>
               <a:rPr lang="en-US" dirty="0" err="1"/>
               <a:t>MTvC</a:t>
+            </a:r>
+            <a:r>
+              <a:rPr lang="en-US" dirty="0"/>
+              <a:t> or TT</a:t>
             </a:r>
             <a:endParaRPr lang="en-NL" dirty="0"/>
           </a:p>
@@ -4901,7 +4498,7 @@
         <p:spPr>
           <a:xfrm>
             <a:off x="2434101" y="5079072"/>
-            <a:ext cx="4284058" cy="369332"/>
+            <a:ext cx="4402487" cy="369332"/>
           </a:xfrm>
           <a:prstGeom prst="rect">
             <a:avLst/>
@@ -4916,7 +4513,7 @@
           <a:p>
             <a:r>
               <a:rPr lang="en-US" dirty="0"/>
-              <a:t>Order, only for TT. Defines ordering in table.</a:t>
+              <a:t>Order, only for TT. Defines ordering in report.</a:t>
             </a:r>
             <a:endParaRPr lang="en-NL" dirty="0"/>
           </a:p>
@@ -4991,7 +4588,7 @@
         <p:spPr>
           <a:xfrm>
             <a:off x="2434101" y="5444861"/>
-            <a:ext cx="6273449" cy="369332"/>
+            <a:ext cx="9403408" cy="369332"/>
           </a:xfrm>
           <a:prstGeom prst="rect">
             <a:avLst/>
@@ -5005,16 +4602,8 @@
           <a:lstStyle/>
           <a:p>
             <a:r>
-              <a:rPr lang="en-US" dirty="0"/>
-              <a:t>Group name, indicates the type of </a:t>
-            </a:r>
-            <a:r>
-              <a:rPr lang="en-US" dirty="0" err="1"/>
-              <a:t>MTvC</a:t>
-            </a:r>
-            <a:r>
-              <a:rPr lang="en-US" dirty="0"/>
-              <a:t>. E.g., timepoint, cell line.</a:t>
+              <a:rPr lang="en-GB" dirty="0"/>
+              <a:t>Group, defines the name of the supergroup. Must be unique. Comparisons come from annotation.</a:t>
             </a:r>
             <a:endParaRPr lang="en-NL" dirty="0"/>
           </a:p>
@@ -5116,10 +4705,10 @@
       </p:sp>
       <p:sp>
         <p:nvSpPr>
-          <p:cNvPr id="20" name="TextBox 19">
-            <a:extLst>
-              <a:ext uri="{FF2B5EF4-FFF2-40B4-BE49-F238E27FC236}">
-                <a16:creationId xmlns:a16="http://schemas.microsoft.com/office/drawing/2014/main" id="{7CB5A71D-4B18-45DA-9878-8A9CE6E0371E}"/>
+          <p:cNvPr id="25" name="TextBox 24">
+            <a:extLst>
+              <a:ext uri="{FF2B5EF4-FFF2-40B4-BE49-F238E27FC236}">
+                <a16:creationId xmlns:a16="http://schemas.microsoft.com/office/drawing/2014/main" id="{7B8C79A9-C42B-40E6-AB47-0F7E38F5F9C4}"/>
               </a:ext>
             </a:extLst>
           </p:cNvPr>
@@ -5164,7 +4753,7 @@
     </p:spTree>
     <p:extLst>
       <p:ext uri="{BB962C8B-B14F-4D97-AF65-F5344CB8AC3E}">
-        <p14:creationId xmlns:p14="http://schemas.microsoft.com/office/powerpoint/2010/main" val="1538324943"/>
+        <p14:creationId xmlns:p14="http://schemas.microsoft.com/office/powerpoint/2010/main" val="518656110"/>
       </p:ext>
     </p:extLst>
   </p:cSld>
@@ -5213,8 +4802,16 @@
           <a:lstStyle/>
           <a:p>
             <a:r>
-              <a:rPr lang="en-US" dirty="0"/>
-              <a:t>Kinase Analysis</a:t>
+              <a:rPr lang="en-US" dirty="0" err="1"/>
+              <a:t>Phosphosite</a:t>
+            </a:r>
+            <a:r>
+              <a:rPr lang="en-US" dirty="0"/>
+              <a:t> Analysis multiple </a:t>
+            </a:r>
+            <a:r>
+              <a:rPr lang="en-US" dirty="0" err="1"/>
+              <a:t>MTvCs</a:t>
             </a:r>
             <a:endParaRPr lang="en-NL" dirty="0"/>
           </a:p>
@@ -5243,17 +4840,57 @@
           </a:xfrm>
         </p:spPr>
         <p:txBody>
-          <a:bodyPr/>
-          <a:lstStyle/>
-          <a:p>
-            <a:r>
-              <a:rPr lang="en-US" dirty="0"/>
-              <a:t>Export report summary from UKA</a:t>
-            </a:r>
-            <a:endParaRPr lang="en-US" dirty="0">
-              <a:latin typeface="Courier New" panose="02070309020205020404" pitchFamily="49" charset="0"/>
-              <a:cs typeface="Courier New" panose="02070309020205020404" pitchFamily="49" charset="0"/>
-            </a:endParaRPr>
+          <a:bodyPr>
+            <a:normAutofit fontScale="70000" lnSpcReduction="20000"/>
+          </a:bodyPr>
+          <a:lstStyle/>
+          <a:p>
+            <a:r>
+              <a:rPr lang="en-US" dirty="0" err="1"/>
+              <a:t>MTvC</a:t>
+            </a:r>
+            <a:r>
+              <a:rPr lang="en-US" dirty="0"/>
+              <a:t> filenames need to be different if you want to include multiple </a:t>
+            </a:r>
+            <a:r>
+              <a:rPr lang="en-US" dirty="0" err="1"/>
+              <a:t>MTvC</a:t>
+            </a:r>
+            <a:r>
+              <a:rPr lang="en-US" dirty="0"/>
+              <a:t> files in one report</a:t>
+            </a:r>
+          </a:p>
+          <a:p>
+            <a:r>
+              <a:rPr lang="en-US" dirty="0"/>
+              <a:t>Take tab-delimited text files from </a:t>
+            </a:r>
+            <a:r>
+              <a:rPr lang="en-US" dirty="0" err="1"/>
+              <a:t>BioNavigator</a:t>
+            </a:r>
+            <a:r>
+              <a:rPr lang="en-US" dirty="0"/>
+              <a:t> of </a:t>
+            </a:r>
+            <a:r>
+              <a:rPr lang="en-US" dirty="0" err="1"/>
+              <a:t>LogFC</a:t>
+            </a:r>
+            <a:r>
+              <a:rPr lang="en-US" dirty="0"/>
+              <a:t> and P values from the </a:t>
+            </a:r>
+            <a:r>
+              <a:rPr lang="en-US" dirty="0" err="1"/>
+              <a:t>DataExports</a:t>
+            </a:r>
+            <a:r>
+              <a:rPr lang="en-US" dirty="0"/>
+              <a:t> folder</a:t>
+            </a:r>
           </a:p>
           <a:p>
             <a:r>
@@ -5278,8 +4915,8 @@
         </p:nvSpPr>
         <p:spPr>
           <a:xfrm>
-            <a:off x="4231574" y="3551322"/>
-            <a:ext cx="2473947" cy="369332"/>
+            <a:off x="3899065" y="3466997"/>
+            <a:ext cx="2975430" cy="369332"/>
           </a:xfrm>
           <a:prstGeom prst="rect">
             <a:avLst/>
@@ -5294,7 +4931,7 @@
           <a:p>
             <a:r>
               <a:rPr lang="en-US" dirty="0"/>
-              <a:t>UKA_PTK_01_T1vsT2.txt</a:t>
+              <a:t>MTvC_PTK_01_10h_LogFC.txt</a:t>
             </a:r>
             <a:endParaRPr lang="en-NL" dirty="0"/>
           </a:p>
@@ -5316,8 +4953,8 @@
         </p:nvCxnSpPr>
         <p:spPr>
           <a:xfrm>
-            <a:off x="4334493" y="3839299"/>
-            <a:ext cx="380011" cy="0"/>
+            <a:off x="3996047" y="3779684"/>
+            <a:ext cx="522515" cy="0"/>
           </a:xfrm>
           <a:prstGeom prst="line">
             <a:avLst/>
@@ -5353,7 +4990,7 @@
         </p:nvCxnSpPr>
         <p:spPr>
           <a:xfrm>
-            <a:off x="4860966" y="3839299"/>
+            <a:off x="4665024" y="3779684"/>
             <a:ext cx="279070" cy="0"/>
           </a:xfrm>
           <a:prstGeom prst="line">
@@ -5390,7 +5027,7 @@
         </p:nvCxnSpPr>
         <p:spPr>
           <a:xfrm>
-            <a:off x="5314208" y="3839299"/>
+            <a:off x="5118266" y="3779684"/>
             <a:ext cx="178129" cy="0"/>
           </a:xfrm>
           <a:prstGeom prst="line">
@@ -5429,8 +5066,8 @@
         </p:nvCxnSpPr>
         <p:spPr>
           <a:xfrm>
-            <a:off x="5656613" y="3843257"/>
-            <a:ext cx="589808" cy="0"/>
+            <a:off x="5460671" y="3783642"/>
+            <a:ext cx="304800" cy="0"/>
           </a:xfrm>
           <a:prstGeom prst="line">
             <a:avLst/>
@@ -5450,6 +5087,43 @@
           </a:fillRef>
           <a:effectRef idx="0">
             <a:schemeClr val="accent6"/>
+          </a:effectRef>
+          <a:fontRef idx="minor">
+            <a:schemeClr val="tx1"/>
+          </a:fontRef>
+        </p:style>
+      </p:cxnSp>
+      <p:cxnSp>
+        <p:nvCxnSpPr>
+          <p:cNvPr id="28" name="Straight Connector 27">
+            <a:extLst>
+              <a:ext uri="{FF2B5EF4-FFF2-40B4-BE49-F238E27FC236}">
+                <a16:creationId xmlns:a16="http://schemas.microsoft.com/office/drawing/2014/main" id="{6CF916A1-EB8B-40AB-80EA-FCCBAB3D2D7B}"/>
+              </a:ext>
+            </a:extLst>
+          </p:cNvPr>
+          <p:cNvCxnSpPr/>
+          <p:nvPr/>
+        </p:nvCxnSpPr>
+        <p:spPr>
+          <a:xfrm>
+            <a:off x="5911933" y="3779684"/>
+            <a:ext cx="843148" cy="0"/>
+          </a:xfrm>
+          <a:prstGeom prst="line">
+            <a:avLst/>
+          </a:prstGeom>
+          <a:ln w="38100"/>
+        </p:spPr>
+        <p:style>
+          <a:lnRef idx="1">
+            <a:schemeClr val="accent3"/>
+          </a:lnRef>
+          <a:fillRef idx="0">
+            <a:schemeClr val="accent3"/>
+          </a:fillRef>
+          <a:effectRef idx="0">
+            <a:schemeClr val="accent3"/>
           </a:effectRef>
           <a:fontRef idx="minor">
             <a:schemeClr val="tx1"/>
@@ -5522,7 +5196,7 @@
         <p:spPr>
           <a:xfrm>
             <a:off x="2437410" y="4346369"/>
-            <a:ext cx="1558183" cy="369332"/>
+            <a:ext cx="2600071" cy="369332"/>
           </a:xfrm>
           <a:prstGeom prst="rect">
             <a:avLst/>
@@ -5537,11 +5211,11 @@
           <a:p>
             <a:r>
               <a:rPr lang="en-US" dirty="0"/>
-              <a:t>File type</a:t>
-            </a:r>
-            <a:r>
-              <a:rPr lang="hu-HU" dirty="0"/>
-              <a:t>: UKA</a:t>
+              <a:t>Stats type. Options: </a:t>
+            </a:r>
+            <a:r>
+              <a:rPr lang="en-US" dirty="0" err="1"/>
+              <a:t>MTvC</a:t>
             </a:r>
             <a:endParaRPr lang="en-NL" dirty="0"/>
           </a:p>
@@ -5700,7 +5374,7 @@
         <p:spPr>
           <a:xfrm>
             <a:off x="2434101" y="5079072"/>
-            <a:ext cx="3194592" cy="369332"/>
+            <a:ext cx="4284058" cy="369332"/>
           </a:xfrm>
           <a:prstGeom prst="rect">
             <a:avLst/>
@@ -5715,7 +5389,7 @@
           <a:p>
             <a:r>
               <a:rPr lang="en-US" dirty="0"/>
-              <a:t>Order. Defines ordering in table.</a:t>
+              <a:t>Order, only for TT. Defines ordering in table.</a:t>
             </a:r>
             <a:endParaRPr lang="en-NL" dirty="0"/>
           </a:p>
@@ -5790,6 +5464,805 @@
         <p:spPr>
           <a:xfrm>
             <a:off x="2434101" y="5444861"/>
+            <a:ext cx="6273449" cy="369332"/>
+          </a:xfrm>
+          <a:prstGeom prst="rect">
+            <a:avLst/>
+          </a:prstGeom>
+          <a:noFill/>
+        </p:spPr>
+        <p:txBody>
+          <a:bodyPr wrap="none" rtlCol="0">
+            <a:spAutoFit/>
+          </a:bodyPr>
+          <a:lstStyle/>
+          <a:p>
+            <a:r>
+              <a:rPr lang="en-US" dirty="0"/>
+              <a:t>Group name, indicates the type of </a:t>
+            </a:r>
+            <a:r>
+              <a:rPr lang="en-US" dirty="0" err="1"/>
+              <a:t>MTvC</a:t>
+            </a:r>
+            <a:r>
+              <a:rPr lang="en-US" dirty="0"/>
+              <a:t>. E.g., timepoint, cell line.</a:t>
+            </a:r>
+            <a:endParaRPr lang="en-NL" dirty="0"/>
+          </a:p>
+        </p:txBody>
+      </p:sp>
+      <p:sp>
+        <p:nvSpPr>
+          <p:cNvPr id="38" name="Rectangle 37">
+            <a:extLst>
+              <a:ext uri="{FF2B5EF4-FFF2-40B4-BE49-F238E27FC236}">
+                <a16:creationId xmlns:a16="http://schemas.microsoft.com/office/drawing/2014/main" id="{FD09869C-CCF9-4BD0-9EFB-AC4BAC6E6087}"/>
+              </a:ext>
+            </a:extLst>
+          </p:cNvPr>
+          <p:cNvSpPr/>
+          <p:nvPr/>
+        </p:nvSpPr>
+        <p:spPr>
+          <a:xfrm>
+            <a:off x="2095654" y="5818312"/>
+            <a:ext cx="338447" cy="326572"/>
+          </a:xfrm>
+          <a:prstGeom prst="rect">
+            <a:avLst/>
+          </a:prstGeom>
+          <a:solidFill>
+            <a:schemeClr val="bg1">
+              <a:lumMod val="50000"/>
+            </a:schemeClr>
+          </a:solidFill>
+          <a:ln>
+            <a:solidFill>
+              <a:schemeClr val="bg1">
+                <a:lumMod val="50000"/>
+              </a:schemeClr>
+            </a:solidFill>
+          </a:ln>
+        </p:spPr>
+        <p:style>
+          <a:lnRef idx="2">
+            <a:schemeClr val="accent1">
+              <a:shade val="50000"/>
+            </a:schemeClr>
+          </a:lnRef>
+          <a:fillRef idx="1">
+            <a:schemeClr val="accent1"/>
+          </a:fillRef>
+          <a:effectRef idx="0">
+            <a:schemeClr val="accent1"/>
+          </a:effectRef>
+          <a:fontRef idx="minor">
+            <a:schemeClr val="lt1"/>
+          </a:fontRef>
+        </p:style>
+        <p:txBody>
+          <a:bodyPr rtlCol="0" anchor="ctr"/>
+          <a:lstStyle/>
+          <a:p>
+            <a:pPr algn="ctr"/>
+            <a:endParaRPr lang="en-NL"/>
+          </a:p>
+        </p:txBody>
+      </p:sp>
+      <p:sp>
+        <p:nvSpPr>
+          <p:cNvPr id="39" name="TextBox 38">
+            <a:extLst>
+              <a:ext uri="{FF2B5EF4-FFF2-40B4-BE49-F238E27FC236}">
+                <a16:creationId xmlns:a16="http://schemas.microsoft.com/office/drawing/2014/main" id="{F83FF990-A1DB-4DA1-AC6B-9E66A4074CE5}"/>
+              </a:ext>
+            </a:extLst>
+          </p:cNvPr>
+          <p:cNvSpPr txBox="1"/>
+          <p:nvPr/>
+        </p:nvSpPr>
+        <p:spPr>
+          <a:xfrm>
+            <a:off x="2434101" y="5818312"/>
+            <a:ext cx="3544240" cy="369332"/>
+          </a:xfrm>
+          <a:prstGeom prst="rect">
+            <a:avLst/>
+          </a:prstGeom>
+          <a:noFill/>
+        </p:spPr>
+        <p:txBody>
+          <a:bodyPr wrap="none" rtlCol="0">
+            <a:spAutoFit/>
+          </a:bodyPr>
+          <a:lstStyle/>
+          <a:p>
+            <a:r>
+              <a:rPr lang="en-US" dirty="0"/>
+              <a:t>File type. Options: LogFC.txt or p.txt</a:t>
+            </a:r>
+            <a:endParaRPr lang="en-NL" dirty="0"/>
+          </a:p>
+        </p:txBody>
+      </p:sp>
+      <p:sp>
+        <p:nvSpPr>
+          <p:cNvPr id="20" name="TextBox 19">
+            <a:extLst>
+              <a:ext uri="{FF2B5EF4-FFF2-40B4-BE49-F238E27FC236}">
+                <a16:creationId xmlns:a16="http://schemas.microsoft.com/office/drawing/2014/main" id="{7CB5A71D-4B18-45DA-9878-8A9CE6E0371E}"/>
+              </a:ext>
+            </a:extLst>
+          </p:cNvPr>
+          <p:cNvSpPr txBox="1"/>
+          <p:nvPr/>
+        </p:nvSpPr>
+        <p:spPr>
+          <a:xfrm>
+            <a:off x="0" y="0"/>
+            <a:ext cx="800219" cy="6858000"/>
+          </a:xfrm>
+          <a:prstGeom prst="rect">
+            <a:avLst/>
+          </a:prstGeom>
+          <a:solidFill>
+            <a:srgbClr val="0070C0"/>
+          </a:solidFill>
+        </p:spPr>
+        <p:txBody>
+          <a:bodyPr vert="vert270" wrap="square" rtlCol="0">
+            <a:spAutoFit/>
+          </a:bodyPr>
+          <a:lstStyle/>
+          <a:p>
+            <a:pPr algn="ctr"/>
+            <a:r>
+              <a:rPr lang="en-GB" sz="4000" b="1" dirty="0" err="1">
+                <a:solidFill>
+                  <a:schemeClr val="bg1"/>
+                </a:solidFill>
+              </a:rPr>
+              <a:t>BioNavigator</a:t>
+            </a:r>
+            <a:endParaRPr lang="en-NL" sz="4000" b="1" dirty="0">
+              <a:solidFill>
+                <a:schemeClr val="bg1"/>
+              </a:solidFill>
+            </a:endParaRPr>
+          </a:p>
+        </p:txBody>
+      </p:sp>
+    </p:spTree>
+    <p:extLst>
+      <p:ext uri="{BB962C8B-B14F-4D97-AF65-F5344CB8AC3E}">
+        <p14:creationId xmlns:p14="http://schemas.microsoft.com/office/powerpoint/2010/main" val="1538324943"/>
+      </p:ext>
+    </p:extLst>
+  </p:cSld>
+  <p:clrMapOvr>
+    <a:masterClrMapping/>
+  </p:clrMapOvr>
+</p:sld>
+</file>
+
+<file path=ppt/slides/slide13.xml><?xml version="1.0" encoding="utf-8"?>
+<p:sld xmlns:a="http://schemas.openxmlformats.org/drawingml/2006/main" xmlns:r="http://schemas.openxmlformats.org/officeDocument/2006/relationships" xmlns:p="http://schemas.openxmlformats.org/presentationml/2006/main">
+  <p:cSld>
+    <p:spTree>
+      <p:nvGrpSpPr>
+        <p:cNvPr id="1" name=""/>
+        <p:cNvGrpSpPr/>
+        <p:nvPr/>
+      </p:nvGrpSpPr>
+      <p:grpSpPr>
+        <a:xfrm>
+          <a:off x="0" y="0"/>
+          <a:ext cx="0" cy="0"/>
+          <a:chOff x="0" y="0"/>
+          <a:chExt cx="0" cy="0"/>
+        </a:xfrm>
+      </p:grpSpPr>
+      <p:sp>
+        <p:nvSpPr>
+          <p:cNvPr id="2" name="Title 1">
+            <a:extLst>
+              <a:ext uri="{FF2B5EF4-FFF2-40B4-BE49-F238E27FC236}">
+                <a16:creationId xmlns:a16="http://schemas.microsoft.com/office/drawing/2014/main" id="{44F11F48-5FE9-46D6-8B09-3E631B3D42F8}"/>
+              </a:ext>
+            </a:extLst>
+          </p:cNvPr>
+          <p:cNvSpPr>
+            <a:spLocks noGrp="1"/>
+          </p:cNvSpPr>
+          <p:nvPr>
+            <p:ph type="title"/>
+          </p:nvPr>
+        </p:nvSpPr>
+        <p:spPr/>
+        <p:txBody>
+          <a:bodyPr/>
+          <a:lstStyle/>
+          <a:p>
+            <a:r>
+              <a:rPr lang="en-US" dirty="0"/>
+              <a:t>Kinase Analysis</a:t>
+            </a:r>
+            <a:endParaRPr lang="en-NL" dirty="0"/>
+          </a:p>
+        </p:txBody>
+      </p:sp>
+      <p:sp>
+        <p:nvSpPr>
+          <p:cNvPr id="3" name="Content Placeholder 2">
+            <a:extLst>
+              <a:ext uri="{FF2B5EF4-FFF2-40B4-BE49-F238E27FC236}">
+                <a16:creationId xmlns:a16="http://schemas.microsoft.com/office/drawing/2014/main" id="{DD9C2BF1-44B7-43DF-990A-74BF16A9E112}"/>
+              </a:ext>
+            </a:extLst>
+          </p:cNvPr>
+          <p:cNvSpPr>
+            <a:spLocks noGrp="1"/>
+          </p:cNvSpPr>
+          <p:nvPr>
+            <p:ph idx="1"/>
+          </p:nvPr>
+        </p:nvSpPr>
+        <p:spPr>
+          <a:xfrm>
+            <a:off x="838200" y="1825625"/>
+            <a:ext cx="10515600" cy="1380713"/>
+          </a:xfrm>
+        </p:spPr>
+        <p:txBody>
+          <a:bodyPr/>
+          <a:lstStyle/>
+          <a:p>
+            <a:r>
+              <a:rPr lang="en-US" dirty="0"/>
+              <a:t>Export report summary from UKA</a:t>
+            </a:r>
+            <a:endParaRPr lang="en-US" dirty="0">
+              <a:latin typeface="Courier New" panose="02070309020205020404" pitchFamily="49" charset="0"/>
+              <a:cs typeface="Courier New" panose="02070309020205020404" pitchFamily="49" charset="0"/>
+            </a:endParaRPr>
+          </a:p>
+          <a:p>
+            <a:r>
+              <a:rPr lang="en-US" dirty="0"/>
+              <a:t>Filename structure:</a:t>
+            </a:r>
+            <a:endParaRPr lang="en-NL" dirty="0"/>
+          </a:p>
+        </p:txBody>
+      </p:sp>
+      <p:sp>
+        <p:nvSpPr>
+          <p:cNvPr id="5" name="TextBox 4">
+            <a:extLst>
+              <a:ext uri="{FF2B5EF4-FFF2-40B4-BE49-F238E27FC236}">
+                <a16:creationId xmlns:a16="http://schemas.microsoft.com/office/drawing/2014/main" id="{2F1EB3F0-7C4D-4F3B-9B2F-7B762E4A212D}"/>
+              </a:ext>
+            </a:extLst>
+          </p:cNvPr>
+          <p:cNvSpPr txBox="1"/>
+          <p:nvPr/>
+        </p:nvSpPr>
+        <p:spPr>
+          <a:xfrm>
+            <a:off x="4231574" y="3551322"/>
+            <a:ext cx="2473947" cy="369332"/>
+          </a:xfrm>
+          <a:prstGeom prst="rect">
+            <a:avLst/>
+          </a:prstGeom>
+          <a:noFill/>
+        </p:spPr>
+        <p:txBody>
+          <a:bodyPr wrap="none" rtlCol="0">
+            <a:spAutoFit/>
+          </a:bodyPr>
+          <a:lstStyle/>
+          <a:p>
+            <a:r>
+              <a:rPr lang="en-US" dirty="0"/>
+              <a:t>UKA_PTK_01_T1vsT2.txt</a:t>
+            </a:r>
+            <a:endParaRPr lang="en-NL" dirty="0"/>
+          </a:p>
+        </p:txBody>
+      </p:sp>
+      <p:cxnSp>
+        <p:nvCxnSpPr>
+          <p:cNvPr id="18" name="Straight Connector 17">
+            <a:extLst>
+              <a:ext uri="{FF2B5EF4-FFF2-40B4-BE49-F238E27FC236}">
+                <a16:creationId xmlns:a16="http://schemas.microsoft.com/office/drawing/2014/main" id="{91A43A0D-837B-40CB-B668-DAADC9008E49}"/>
+              </a:ext>
+            </a:extLst>
+          </p:cNvPr>
+          <p:cNvCxnSpPr>
+            <a:cxnSpLocks/>
+          </p:cNvCxnSpPr>
+          <p:nvPr/>
+        </p:nvCxnSpPr>
+        <p:spPr>
+          <a:xfrm>
+            <a:off x="4334493" y="3839299"/>
+            <a:ext cx="380011" cy="0"/>
+          </a:xfrm>
+          <a:prstGeom prst="line">
+            <a:avLst/>
+          </a:prstGeom>
+          <a:ln w="38100"/>
+        </p:spPr>
+        <p:style>
+          <a:lnRef idx="1">
+            <a:schemeClr val="accent1"/>
+          </a:lnRef>
+          <a:fillRef idx="0">
+            <a:schemeClr val="accent1"/>
+          </a:fillRef>
+          <a:effectRef idx="0">
+            <a:schemeClr val="accent1"/>
+          </a:effectRef>
+          <a:fontRef idx="minor">
+            <a:schemeClr val="tx1"/>
+          </a:fontRef>
+        </p:style>
+      </p:cxnSp>
+      <p:cxnSp>
+        <p:nvCxnSpPr>
+          <p:cNvPr id="21" name="Straight Connector 20">
+            <a:extLst>
+              <a:ext uri="{FF2B5EF4-FFF2-40B4-BE49-F238E27FC236}">
+                <a16:creationId xmlns:a16="http://schemas.microsoft.com/office/drawing/2014/main" id="{88DE3F3C-8A6F-455D-AECB-1195CBFC1C0A}"/>
+              </a:ext>
+            </a:extLst>
+          </p:cNvPr>
+          <p:cNvCxnSpPr/>
+          <p:nvPr/>
+        </p:nvCxnSpPr>
+        <p:spPr>
+          <a:xfrm>
+            <a:off x="4860966" y="3839299"/>
+            <a:ext cx="279070" cy="0"/>
+          </a:xfrm>
+          <a:prstGeom prst="line">
+            <a:avLst/>
+          </a:prstGeom>
+          <a:ln w="38100"/>
+        </p:spPr>
+        <p:style>
+          <a:lnRef idx="1">
+            <a:schemeClr val="accent2"/>
+          </a:lnRef>
+          <a:fillRef idx="0">
+            <a:schemeClr val="accent2"/>
+          </a:fillRef>
+          <a:effectRef idx="0">
+            <a:schemeClr val="accent2"/>
+          </a:effectRef>
+          <a:fontRef idx="minor">
+            <a:schemeClr val="tx1"/>
+          </a:fontRef>
+        </p:style>
+      </p:cxnSp>
+      <p:cxnSp>
+        <p:nvCxnSpPr>
+          <p:cNvPr id="23" name="Straight Connector 22">
+            <a:extLst>
+              <a:ext uri="{FF2B5EF4-FFF2-40B4-BE49-F238E27FC236}">
+                <a16:creationId xmlns:a16="http://schemas.microsoft.com/office/drawing/2014/main" id="{E9790DB0-EA56-4A3D-AA44-5FC556B7BB9A}"/>
+              </a:ext>
+            </a:extLst>
+          </p:cNvPr>
+          <p:cNvCxnSpPr/>
+          <p:nvPr/>
+        </p:nvCxnSpPr>
+        <p:spPr>
+          <a:xfrm>
+            <a:off x="5314208" y="3839299"/>
+            <a:ext cx="178129" cy="0"/>
+          </a:xfrm>
+          <a:prstGeom prst="line">
+            <a:avLst/>
+          </a:prstGeom>
+          <a:ln w="38100"/>
+        </p:spPr>
+        <p:style>
+          <a:lnRef idx="1">
+            <a:schemeClr val="accent6"/>
+          </a:lnRef>
+          <a:fillRef idx="0">
+            <a:schemeClr val="accent6"/>
+          </a:fillRef>
+          <a:effectRef idx="0">
+            <a:schemeClr val="accent6"/>
+          </a:effectRef>
+          <a:fontRef idx="minor">
+            <a:schemeClr val="tx1"/>
+          </a:fontRef>
+        </p:style>
+      </p:cxnSp>
+      <p:cxnSp>
+        <p:nvCxnSpPr>
+          <p:cNvPr id="24" name="Straight Connector 23">
+            <a:extLst>
+              <a:ext uri="{FF2B5EF4-FFF2-40B4-BE49-F238E27FC236}">
+                <a16:creationId xmlns:a16="http://schemas.microsoft.com/office/drawing/2014/main" id="{82E82212-B246-4AB8-B5CD-24826FE634B4}"/>
+              </a:ext>
+            </a:extLst>
+          </p:cNvPr>
+          <p:cNvCxnSpPr>
+            <a:cxnSpLocks/>
+          </p:cNvCxnSpPr>
+          <p:nvPr/>
+        </p:nvCxnSpPr>
+        <p:spPr>
+          <a:xfrm>
+            <a:off x="5656613" y="3843257"/>
+            <a:ext cx="589808" cy="0"/>
+          </a:xfrm>
+          <a:prstGeom prst="line">
+            <a:avLst/>
+          </a:prstGeom>
+          <a:ln w="38100">
+            <a:solidFill>
+              <a:srgbClr val="FF0000"/>
+            </a:solidFill>
+          </a:ln>
+        </p:spPr>
+        <p:style>
+          <a:lnRef idx="1">
+            <a:schemeClr val="accent6"/>
+          </a:lnRef>
+          <a:fillRef idx="0">
+            <a:schemeClr val="accent6"/>
+          </a:fillRef>
+          <a:effectRef idx="0">
+            <a:schemeClr val="accent6"/>
+          </a:effectRef>
+          <a:fontRef idx="minor">
+            <a:schemeClr val="tx1"/>
+          </a:fontRef>
+        </p:style>
+      </p:cxnSp>
+      <p:sp>
+        <p:nvSpPr>
+          <p:cNvPr id="30" name="Rectangle 29">
+            <a:extLst>
+              <a:ext uri="{FF2B5EF4-FFF2-40B4-BE49-F238E27FC236}">
+                <a16:creationId xmlns:a16="http://schemas.microsoft.com/office/drawing/2014/main" id="{BB152CBD-3826-40B2-94F3-816B47FC697A}"/>
+              </a:ext>
+            </a:extLst>
+          </p:cNvPr>
+          <p:cNvSpPr/>
+          <p:nvPr/>
+        </p:nvSpPr>
+        <p:spPr>
+          <a:xfrm>
+            <a:off x="2098963" y="4346369"/>
+            <a:ext cx="338447" cy="326572"/>
+          </a:xfrm>
+          <a:prstGeom prst="rect">
+            <a:avLst/>
+          </a:prstGeom>
+          <a:ln>
+            <a:solidFill>
+              <a:schemeClr val="accent1"/>
+            </a:solidFill>
+          </a:ln>
+        </p:spPr>
+        <p:style>
+          <a:lnRef idx="2">
+            <a:schemeClr val="accent1">
+              <a:shade val="50000"/>
+            </a:schemeClr>
+          </a:lnRef>
+          <a:fillRef idx="1">
+            <a:schemeClr val="accent1"/>
+          </a:fillRef>
+          <a:effectRef idx="0">
+            <a:schemeClr val="accent1"/>
+          </a:effectRef>
+          <a:fontRef idx="minor">
+            <a:schemeClr val="lt1"/>
+          </a:fontRef>
+        </p:style>
+        <p:txBody>
+          <a:bodyPr rtlCol="0" anchor="ctr"/>
+          <a:lstStyle/>
+          <a:p>
+            <a:pPr algn="ctr"/>
+            <a:endParaRPr lang="en-NL"/>
+          </a:p>
+        </p:txBody>
+      </p:sp>
+      <p:sp>
+        <p:nvSpPr>
+          <p:cNvPr id="31" name="TextBox 30">
+            <a:extLst>
+              <a:ext uri="{FF2B5EF4-FFF2-40B4-BE49-F238E27FC236}">
+                <a16:creationId xmlns:a16="http://schemas.microsoft.com/office/drawing/2014/main" id="{E3BFE06C-0043-417F-8F95-1368D728335F}"/>
+              </a:ext>
+            </a:extLst>
+          </p:cNvPr>
+          <p:cNvSpPr txBox="1"/>
+          <p:nvPr/>
+        </p:nvSpPr>
+        <p:spPr>
+          <a:xfrm>
+            <a:off x="2437410" y="4346369"/>
+            <a:ext cx="1558183" cy="369332"/>
+          </a:xfrm>
+          <a:prstGeom prst="rect">
+            <a:avLst/>
+          </a:prstGeom>
+          <a:noFill/>
+        </p:spPr>
+        <p:txBody>
+          <a:bodyPr wrap="none" rtlCol="0">
+            <a:spAutoFit/>
+          </a:bodyPr>
+          <a:lstStyle/>
+          <a:p>
+            <a:r>
+              <a:rPr lang="en-US" dirty="0"/>
+              <a:t>File type</a:t>
+            </a:r>
+            <a:r>
+              <a:rPr lang="hu-HU" dirty="0"/>
+              <a:t>: UKA</a:t>
+            </a:r>
+            <a:endParaRPr lang="en-NL" dirty="0"/>
+          </a:p>
+        </p:txBody>
+      </p:sp>
+      <p:sp>
+        <p:nvSpPr>
+          <p:cNvPr id="32" name="Rectangle 31">
+            <a:extLst>
+              <a:ext uri="{FF2B5EF4-FFF2-40B4-BE49-F238E27FC236}">
+                <a16:creationId xmlns:a16="http://schemas.microsoft.com/office/drawing/2014/main" id="{E57E36FD-5BEA-40BA-849E-603DAB62A121}"/>
+              </a:ext>
+            </a:extLst>
+          </p:cNvPr>
+          <p:cNvSpPr/>
+          <p:nvPr/>
+        </p:nvSpPr>
+        <p:spPr>
+          <a:xfrm>
+            <a:off x="2095654" y="4715701"/>
+            <a:ext cx="338447" cy="326572"/>
+          </a:xfrm>
+          <a:prstGeom prst="rect">
+            <a:avLst/>
+          </a:prstGeom>
+          <a:solidFill>
+            <a:schemeClr val="accent2"/>
+          </a:solidFill>
+          <a:ln/>
+        </p:spPr>
+        <p:style>
+          <a:lnRef idx="2">
+            <a:schemeClr val="accent2"/>
+          </a:lnRef>
+          <a:fillRef idx="1">
+            <a:schemeClr val="lt1"/>
+          </a:fillRef>
+          <a:effectRef idx="0">
+            <a:schemeClr val="accent2"/>
+          </a:effectRef>
+          <a:fontRef idx="minor">
+            <a:schemeClr val="dk1"/>
+          </a:fontRef>
+        </p:style>
+        <p:txBody>
+          <a:bodyPr rtlCol="0" anchor="ctr"/>
+          <a:lstStyle/>
+          <a:p>
+            <a:pPr algn="ctr"/>
+            <a:endParaRPr lang="en-NL"/>
+          </a:p>
+        </p:txBody>
+      </p:sp>
+      <p:sp>
+        <p:nvSpPr>
+          <p:cNvPr id="33" name="TextBox 32">
+            <a:extLst>
+              <a:ext uri="{FF2B5EF4-FFF2-40B4-BE49-F238E27FC236}">
+                <a16:creationId xmlns:a16="http://schemas.microsoft.com/office/drawing/2014/main" id="{CF933DA8-7734-4D38-841F-BE4BB9CD8C02}"/>
+              </a:ext>
+            </a:extLst>
+          </p:cNvPr>
+          <p:cNvSpPr txBox="1"/>
+          <p:nvPr/>
+        </p:nvSpPr>
+        <p:spPr>
+          <a:xfrm>
+            <a:off x="2434101" y="4715701"/>
+            <a:ext cx="3135858" cy="369332"/>
+          </a:xfrm>
+          <a:prstGeom prst="rect">
+            <a:avLst/>
+          </a:prstGeom>
+          <a:noFill/>
+        </p:spPr>
+        <p:txBody>
+          <a:bodyPr wrap="none" rtlCol="0">
+            <a:spAutoFit/>
+          </a:bodyPr>
+          <a:lstStyle/>
+          <a:p>
+            <a:r>
+              <a:rPr lang="en-US" dirty="0"/>
+              <a:t>Assay type. Options: PTK or STK</a:t>
+            </a:r>
+            <a:endParaRPr lang="en-NL" dirty="0"/>
+          </a:p>
+        </p:txBody>
+      </p:sp>
+      <p:sp>
+        <p:nvSpPr>
+          <p:cNvPr id="34" name="Rectangle 33">
+            <a:extLst>
+              <a:ext uri="{FF2B5EF4-FFF2-40B4-BE49-F238E27FC236}">
+                <a16:creationId xmlns:a16="http://schemas.microsoft.com/office/drawing/2014/main" id="{19285AE9-17E2-42C5-B37F-5A1C6A2DABE4}"/>
+              </a:ext>
+            </a:extLst>
+          </p:cNvPr>
+          <p:cNvSpPr/>
+          <p:nvPr/>
+        </p:nvSpPr>
+        <p:spPr>
+          <a:xfrm>
+            <a:off x="2095654" y="5079072"/>
+            <a:ext cx="338447" cy="326572"/>
+          </a:xfrm>
+          <a:prstGeom prst="rect">
+            <a:avLst/>
+          </a:prstGeom>
+          <a:solidFill>
+            <a:schemeClr val="accent6"/>
+          </a:solidFill>
+          <a:ln>
+            <a:solidFill>
+              <a:schemeClr val="accent6"/>
+            </a:solidFill>
+          </a:ln>
+        </p:spPr>
+        <p:style>
+          <a:lnRef idx="2">
+            <a:schemeClr val="accent1">
+              <a:shade val="50000"/>
+            </a:schemeClr>
+          </a:lnRef>
+          <a:fillRef idx="1">
+            <a:schemeClr val="accent1"/>
+          </a:fillRef>
+          <a:effectRef idx="0">
+            <a:schemeClr val="accent1"/>
+          </a:effectRef>
+          <a:fontRef idx="minor">
+            <a:schemeClr val="lt1"/>
+          </a:fontRef>
+        </p:style>
+        <p:txBody>
+          <a:bodyPr rtlCol="0" anchor="ctr"/>
+          <a:lstStyle/>
+          <a:p>
+            <a:pPr algn="ctr"/>
+            <a:endParaRPr lang="en-NL"/>
+          </a:p>
+        </p:txBody>
+      </p:sp>
+      <p:sp>
+        <p:nvSpPr>
+          <p:cNvPr id="35" name="TextBox 34">
+            <a:extLst>
+              <a:ext uri="{FF2B5EF4-FFF2-40B4-BE49-F238E27FC236}">
+                <a16:creationId xmlns:a16="http://schemas.microsoft.com/office/drawing/2014/main" id="{DDDF34B4-6185-47F7-A166-0F066D3EC698}"/>
+              </a:ext>
+            </a:extLst>
+          </p:cNvPr>
+          <p:cNvSpPr txBox="1"/>
+          <p:nvPr/>
+        </p:nvSpPr>
+        <p:spPr>
+          <a:xfrm>
+            <a:off x="2434101" y="5079072"/>
+            <a:ext cx="3194592" cy="369332"/>
+          </a:xfrm>
+          <a:prstGeom prst="rect">
+            <a:avLst/>
+          </a:prstGeom>
+          <a:noFill/>
+        </p:spPr>
+        <p:txBody>
+          <a:bodyPr wrap="none" rtlCol="0">
+            <a:spAutoFit/>
+          </a:bodyPr>
+          <a:lstStyle/>
+          <a:p>
+            <a:r>
+              <a:rPr lang="en-US" dirty="0"/>
+              <a:t>Order. Defines ordering in table.</a:t>
+            </a:r>
+            <a:endParaRPr lang="en-NL" dirty="0"/>
+          </a:p>
+        </p:txBody>
+      </p:sp>
+      <p:sp>
+        <p:nvSpPr>
+          <p:cNvPr id="36" name="Rectangle 35">
+            <a:extLst>
+              <a:ext uri="{FF2B5EF4-FFF2-40B4-BE49-F238E27FC236}">
+                <a16:creationId xmlns:a16="http://schemas.microsoft.com/office/drawing/2014/main" id="{5CEE573A-1780-406E-82DD-3BAF4DF5BD41}"/>
+              </a:ext>
+            </a:extLst>
+          </p:cNvPr>
+          <p:cNvSpPr/>
+          <p:nvPr/>
+        </p:nvSpPr>
+        <p:spPr>
+          <a:xfrm>
+            <a:off x="2095654" y="5444861"/>
+            <a:ext cx="338447" cy="326572"/>
+          </a:xfrm>
+          <a:prstGeom prst="rect">
+            <a:avLst/>
+          </a:prstGeom>
+          <a:solidFill>
+            <a:srgbClr val="FF0000"/>
+          </a:solidFill>
+          <a:ln>
+            <a:solidFill>
+              <a:srgbClr val="FF0000"/>
+            </a:solidFill>
+          </a:ln>
+        </p:spPr>
+        <p:style>
+          <a:lnRef idx="2">
+            <a:schemeClr val="accent1">
+              <a:shade val="50000"/>
+            </a:schemeClr>
+          </a:lnRef>
+          <a:fillRef idx="1">
+            <a:schemeClr val="accent1"/>
+          </a:fillRef>
+          <a:effectRef idx="0">
+            <a:schemeClr val="accent1"/>
+          </a:effectRef>
+          <a:fontRef idx="minor">
+            <a:schemeClr val="lt1"/>
+          </a:fontRef>
+        </p:style>
+        <p:txBody>
+          <a:bodyPr rtlCol="0" anchor="ctr"/>
+          <a:lstStyle/>
+          <a:p>
+            <a:pPr algn="ctr"/>
+            <a:endParaRPr lang="en-NL"/>
+          </a:p>
+        </p:txBody>
+      </p:sp>
+      <p:sp>
+        <p:nvSpPr>
+          <p:cNvPr id="37" name="TextBox 36">
+            <a:extLst>
+              <a:ext uri="{FF2B5EF4-FFF2-40B4-BE49-F238E27FC236}">
+                <a16:creationId xmlns:a16="http://schemas.microsoft.com/office/drawing/2014/main" id="{5050D63D-481F-4F77-B2C9-AD6FF9537F8C}"/>
+              </a:ext>
+            </a:extLst>
+          </p:cNvPr>
+          <p:cNvSpPr txBox="1"/>
+          <p:nvPr/>
+        </p:nvSpPr>
+        <p:spPr>
+          <a:xfrm>
+            <a:off x="2434101" y="5444861"/>
             <a:ext cx="3635611" cy="369332"/>
           </a:xfrm>
           <a:prstGeom prst="rect">
@@ -5879,7 +6352,7 @@
 </p:sld>
 </file>
 
-<file path=ppt/slides/slide13.xml><?xml version="1.0" encoding="utf-8"?>
+<file path=ppt/slides/slide14.xml><?xml version="1.0" encoding="utf-8"?>
 <p:sld xmlns:a="http://schemas.openxmlformats.org/drawingml/2006/main" xmlns:r="http://schemas.openxmlformats.org/officeDocument/2006/relationships" xmlns:p="http://schemas.openxmlformats.org/presentationml/2006/main">
   <p:cSld>
     <p:spTree>
@@ -10029,7 +10502,7 @@
             </a:r>
             <a:r>
               <a:rPr lang="hu-HU" dirty="0"/>
-              <a:t> (UKA 2023)</a:t>
+              <a:t> (UKA all vs all comparison)</a:t>
             </a:r>
             <a:endParaRPr lang="en-NL" dirty="0"/>
           </a:p>
@@ -10037,10 +10510,869 @@
       </p:sp>
       <p:sp>
         <p:nvSpPr>
+          <p:cNvPr id="19" name="TextBox 18">
+            <a:extLst>
+              <a:ext uri="{FF2B5EF4-FFF2-40B4-BE49-F238E27FC236}">
+                <a16:creationId xmlns:a16="http://schemas.microsoft.com/office/drawing/2014/main" id="{1D1A1865-A85D-47C3-BEF2-9992B8E812D0}"/>
+              </a:ext>
+            </a:extLst>
+          </p:cNvPr>
+          <p:cNvSpPr txBox="1"/>
+          <p:nvPr/>
+        </p:nvSpPr>
+        <p:spPr>
+          <a:xfrm>
+            <a:off x="0" y="0"/>
+            <a:ext cx="800219" cy="6858000"/>
+          </a:xfrm>
+          <a:prstGeom prst="rect">
+            <a:avLst/>
+          </a:prstGeom>
+          <a:solidFill>
+            <a:srgbClr val="00B050"/>
+          </a:solidFill>
+        </p:spPr>
+        <p:txBody>
+          <a:bodyPr vert="vert270" wrap="square" rtlCol="0">
+            <a:spAutoFit/>
+          </a:bodyPr>
+          <a:lstStyle/>
+          <a:p>
+            <a:pPr algn="ctr"/>
+            <a:r>
+              <a:rPr lang="en-GB" sz="4000" b="1" dirty="0" err="1">
+                <a:solidFill>
+                  <a:schemeClr val="bg1"/>
+                </a:solidFill>
+              </a:rPr>
+              <a:t>Tercen</a:t>
+            </a:r>
+            <a:endParaRPr lang="en-NL" sz="4000" b="1" dirty="0">
+              <a:solidFill>
+                <a:schemeClr val="bg1"/>
+              </a:solidFill>
+            </a:endParaRPr>
+          </a:p>
+        </p:txBody>
+      </p:sp>
+      <p:sp>
+        <p:nvSpPr>
+          <p:cNvPr id="79" name="TextBox 78">
+            <a:extLst>
+              <a:ext uri="{FF2B5EF4-FFF2-40B4-BE49-F238E27FC236}">
+                <a16:creationId xmlns:a16="http://schemas.microsoft.com/office/drawing/2014/main" id="{F6A5C625-8F06-F1D3-257D-429ED96B1517}"/>
+              </a:ext>
+            </a:extLst>
+          </p:cNvPr>
+          <p:cNvSpPr txBox="1"/>
+          <p:nvPr/>
+        </p:nvSpPr>
+        <p:spPr>
+          <a:xfrm>
+            <a:off x="1302199" y="1998250"/>
+            <a:ext cx="3476378" cy="369332"/>
+          </a:xfrm>
+          <a:prstGeom prst="rect">
+            <a:avLst/>
+          </a:prstGeom>
+          <a:noFill/>
+        </p:spPr>
+        <p:txBody>
+          <a:bodyPr wrap="square" rtlCol="0">
+            <a:spAutoFit/>
+          </a:bodyPr>
+          <a:lstStyle/>
+          <a:p>
+            <a:r>
+              <a:rPr lang="hu-HU" dirty="0"/>
+              <a:t>UKA</a:t>
+            </a:r>
+            <a:r>
+              <a:rPr lang="en-US" dirty="0"/>
+              <a:t>_PTK_01_</a:t>
+            </a:r>
+            <a:r>
+              <a:rPr lang="hu-HU" dirty="0"/>
+              <a:t>Superg</a:t>
+            </a:r>
+            <a:r>
+              <a:rPr lang="en-US" dirty="0"/>
+              <a:t>roup.csv</a:t>
+            </a:r>
+            <a:endParaRPr lang="en-NL" dirty="0"/>
+          </a:p>
+        </p:txBody>
+      </p:sp>
+      <p:cxnSp>
+        <p:nvCxnSpPr>
+          <p:cNvPr id="80" name="Straight Connector 79">
+            <a:extLst>
+              <a:ext uri="{FF2B5EF4-FFF2-40B4-BE49-F238E27FC236}">
+                <a16:creationId xmlns:a16="http://schemas.microsoft.com/office/drawing/2014/main" id="{5B447E21-199E-AB29-7742-CDC22D73E742}"/>
+              </a:ext>
+            </a:extLst>
+          </p:cNvPr>
+          <p:cNvCxnSpPr>
+            <a:cxnSpLocks/>
+          </p:cNvCxnSpPr>
+          <p:nvPr/>
+        </p:nvCxnSpPr>
+        <p:spPr>
+          <a:xfrm>
+            <a:off x="1419719" y="2295679"/>
+            <a:ext cx="359784" cy="0"/>
+          </a:xfrm>
+          <a:prstGeom prst="line">
+            <a:avLst/>
+          </a:prstGeom>
+          <a:ln w="38100"/>
+        </p:spPr>
+        <p:style>
+          <a:lnRef idx="1">
+            <a:schemeClr val="accent1"/>
+          </a:lnRef>
+          <a:fillRef idx="0">
+            <a:schemeClr val="accent1"/>
+          </a:fillRef>
+          <a:effectRef idx="0">
+            <a:schemeClr val="accent1"/>
+          </a:effectRef>
+          <a:fontRef idx="minor">
+            <a:schemeClr val="tx1"/>
+          </a:fontRef>
+        </p:style>
+      </p:cxnSp>
+      <p:cxnSp>
+        <p:nvCxnSpPr>
+          <p:cNvPr id="81" name="Straight Connector 80">
+            <a:extLst>
+              <a:ext uri="{FF2B5EF4-FFF2-40B4-BE49-F238E27FC236}">
+                <a16:creationId xmlns:a16="http://schemas.microsoft.com/office/drawing/2014/main" id="{3B099E6C-9950-F836-1D4A-AC27982BF444}"/>
+              </a:ext>
+            </a:extLst>
+          </p:cNvPr>
+          <p:cNvCxnSpPr/>
+          <p:nvPr/>
+        </p:nvCxnSpPr>
+        <p:spPr>
+          <a:xfrm>
+            <a:off x="1925965" y="2295679"/>
+            <a:ext cx="279070" cy="0"/>
+          </a:xfrm>
+          <a:prstGeom prst="line">
+            <a:avLst/>
+          </a:prstGeom>
+          <a:ln w="38100"/>
+        </p:spPr>
+        <p:style>
+          <a:lnRef idx="1">
+            <a:schemeClr val="accent2"/>
+          </a:lnRef>
+          <a:fillRef idx="0">
+            <a:schemeClr val="accent2"/>
+          </a:fillRef>
+          <a:effectRef idx="0">
+            <a:schemeClr val="accent2"/>
+          </a:effectRef>
+          <a:fontRef idx="minor">
+            <a:schemeClr val="tx1"/>
+          </a:fontRef>
+        </p:style>
+      </p:cxnSp>
+      <p:cxnSp>
+        <p:nvCxnSpPr>
+          <p:cNvPr id="82" name="Straight Connector 81">
+            <a:extLst>
+              <a:ext uri="{FF2B5EF4-FFF2-40B4-BE49-F238E27FC236}">
+                <a16:creationId xmlns:a16="http://schemas.microsoft.com/office/drawing/2014/main" id="{E34EB538-7C0C-085A-6B44-6FF32E58D881}"/>
+              </a:ext>
+            </a:extLst>
+          </p:cNvPr>
+          <p:cNvCxnSpPr/>
+          <p:nvPr/>
+        </p:nvCxnSpPr>
+        <p:spPr>
+          <a:xfrm>
+            <a:off x="2379207" y="2295679"/>
+            <a:ext cx="178129" cy="0"/>
+          </a:xfrm>
+          <a:prstGeom prst="line">
+            <a:avLst/>
+          </a:prstGeom>
+          <a:ln w="38100"/>
+        </p:spPr>
+        <p:style>
+          <a:lnRef idx="1">
+            <a:schemeClr val="accent6"/>
+          </a:lnRef>
+          <a:fillRef idx="0">
+            <a:schemeClr val="accent6"/>
+          </a:fillRef>
+          <a:effectRef idx="0">
+            <a:schemeClr val="accent6"/>
+          </a:effectRef>
+          <a:fontRef idx="minor">
+            <a:schemeClr val="tx1"/>
+          </a:fontRef>
+        </p:style>
+      </p:cxnSp>
+      <p:cxnSp>
+        <p:nvCxnSpPr>
+          <p:cNvPr id="83" name="Straight Connector 82">
+            <a:extLst>
+              <a:ext uri="{FF2B5EF4-FFF2-40B4-BE49-F238E27FC236}">
+                <a16:creationId xmlns:a16="http://schemas.microsoft.com/office/drawing/2014/main" id="{025CFC0B-34EF-F1E2-295D-534CEC3916C4}"/>
+              </a:ext>
+            </a:extLst>
+          </p:cNvPr>
+          <p:cNvCxnSpPr>
+            <a:cxnSpLocks/>
+          </p:cNvCxnSpPr>
+          <p:nvPr/>
+        </p:nvCxnSpPr>
+        <p:spPr>
+          <a:xfrm flipV="1">
+            <a:off x="2721612" y="2295679"/>
+            <a:ext cx="1070140" cy="3958"/>
+          </a:xfrm>
+          <a:prstGeom prst="line">
+            <a:avLst/>
+          </a:prstGeom>
+          <a:ln w="38100">
+            <a:solidFill>
+              <a:srgbClr val="FF0000"/>
+            </a:solidFill>
+          </a:ln>
+        </p:spPr>
+        <p:style>
+          <a:lnRef idx="1">
+            <a:schemeClr val="accent6"/>
+          </a:lnRef>
+          <a:fillRef idx="0">
+            <a:schemeClr val="accent6"/>
+          </a:fillRef>
+          <a:effectRef idx="0">
+            <a:schemeClr val="accent6"/>
+          </a:effectRef>
+          <a:fontRef idx="minor">
+            <a:schemeClr val="tx1"/>
+          </a:fontRef>
+        </p:style>
+      </p:cxnSp>
+      <p:sp>
+        <p:nvSpPr>
+          <p:cNvPr id="84" name="Rectangle 83">
+            <a:extLst>
+              <a:ext uri="{FF2B5EF4-FFF2-40B4-BE49-F238E27FC236}">
+                <a16:creationId xmlns:a16="http://schemas.microsoft.com/office/drawing/2014/main" id="{AE7CC47E-68AA-2A19-4C91-E94D0992B2DA}"/>
+              </a:ext>
+            </a:extLst>
+          </p:cNvPr>
+          <p:cNvSpPr/>
+          <p:nvPr/>
+        </p:nvSpPr>
+        <p:spPr>
+          <a:xfrm>
+            <a:off x="1084581" y="2687341"/>
+            <a:ext cx="338447" cy="326572"/>
+          </a:xfrm>
+          <a:prstGeom prst="rect">
+            <a:avLst/>
+          </a:prstGeom>
+          <a:ln>
+            <a:solidFill>
+              <a:schemeClr val="accent1"/>
+            </a:solidFill>
+          </a:ln>
+        </p:spPr>
+        <p:style>
+          <a:lnRef idx="2">
+            <a:schemeClr val="accent1">
+              <a:shade val="50000"/>
+            </a:schemeClr>
+          </a:lnRef>
+          <a:fillRef idx="1">
+            <a:schemeClr val="accent1"/>
+          </a:fillRef>
+          <a:effectRef idx="0">
+            <a:schemeClr val="accent1"/>
+          </a:effectRef>
+          <a:fontRef idx="minor">
+            <a:schemeClr val="lt1"/>
+          </a:fontRef>
+        </p:style>
+        <p:txBody>
+          <a:bodyPr rtlCol="0" anchor="ctr"/>
+          <a:lstStyle/>
+          <a:p>
+            <a:pPr algn="ctr"/>
+            <a:endParaRPr lang="en-NL"/>
+          </a:p>
+        </p:txBody>
+      </p:sp>
+      <p:sp>
+        <p:nvSpPr>
+          <p:cNvPr id="85" name="TextBox 84">
+            <a:extLst>
+              <a:ext uri="{FF2B5EF4-FFF2-40B4-BE49-F238E27FC236}">
+                <a16:creationId xmlns:a16="http://schemas.microsoft.com/office/drawing/2014/main" id="{E56D2341-49B2-E9F8-6AEB-FE8A2D4DADD8}"/>
+              </a:ext>
+            </a:extLst>
+          </p:cNvPr>
+          <p:cNvSpPr txBox="1"/>
+          <p:nvPr/>
+        </p:nvSpPr>
+        <p:spPr>
+          <a:xfrm>
+            <a:off x="1423028" y="2687341"/>
+            <a:ext cx="1627240" cy="369332"/>
+          </a:xfrm>
+          <a:prstGeom prst="rect">
+            <a:avLst/>
+          </a:prstGeom>
+          <a:noFill/>
+        </p:spPr>
+        <p:txBody>
+          <a:bodyPr wrap="none" rtlCol="0">
+            <a:spAutoFit/>
+          </a:bodyPr>
+          <a:lstStyle/>
+          <a:p>
+            <a:r>
+              <a:rPr lang="en-US" dirty="0"/>
+              <a:t>Stats type</a:t>
+            </a:r>
+            <a:r>
+              <a:rPr lang="hu-HU" dirty="0"/>
+              <a:t>: UKA</a:t>
+            </a:r>
+            <a:endParaRPr lang="en-NL" dirty="0"/>
+          </a:p>
+        </p:txBody>
+      </p:sp>
+      <p:sp>
+        <p:nvSpPr>
+          <p:cNvPr id="86" name="Rectangle 85">
+            <a:extLst>
+              <a:ext uri="{FF2B5EF4-FFF2-40B4-BE49-F238E27FC236}">
+                <a16:creationId xmlns:a16="http://schemas.microsoft.com/office/drawing/2014/main" id="{BFC128F7-08B8-FD92-A4DA-54BC219D5D52}"/>
+              </a:ext>
+            </a:extLst>
+          </p:cNvPr>
+          <p:cNvSpPr/>
+          <p:nvPr/>
+        </p:nvSpPr>
+        <p:spPr>
+          <a:xfrm>
+            <a:off x="1081272" y="3056673"/>
+            <a:ext cx="338447" cy="326572"/>
+          </a:xfrm>
+          <a:prstGeom prst="rect">
+            <a:avLst/>
+          </a:prstGeom>
+          <a:solidFill>
+            <a:schemeClr val="accent2"/>
+          </a:solidFill>
+          <a:ln/>
+        </p:spPr>
+        <p:style>
+          <a:lnRef idx="2">
+            <a:schemeClr val="accent2"/>
+          </a:lnRef>
+          <a:fillRef idx="1">
+            <a:schemeClr val="lt1"/>
+          </a:fillRef>
+          <a:effectRef idx="0">
+            <a:schemeClr val="accent2"/>
+          </a:effectRef>
+          <a:fontRef idx="minor">
+            <a:schemeClr val="dk1"/>
+          </a:fontRef>
+        </p:style>
+        <p:txBody>
+          <a:bodyPr rtlCol="0" anchor="ctr"/>
+          <a:lstStyle/>
+          <a:p>
+            <a:pPr algn="ctr"/>
+            <a:endParaRPr lang="en-NL"/>
+          </a:p>
+        </p:txBody>
+      </p:sp>
+      <p:sp>
+        <p:nvSpPr>
+          <p:cNvPr id="87" name="TextBox 86">
+            <a:extLst>
+              <a:ext uri="{FF2B5EF4-FFF2-40B4-BE49-F238E27FC236}">
+                <a16:creationId xmlns:a16="http://schemas.microsoft.com/office/drawing/2014/main" id="{6904B307-481E-639C-045E-439C4EABCC0A}"/>
+              </a:ext>
+            </a:extLst>
+          </p:cNvPr>
+          <p:cNvSpPr txBox="1"/>
+          <p:nvPr/>
+        </p:nvSpPr>
+        <p:spPr>
+          <a:xfrm>
+            <a:off x="1419719" y="3056673"/>
+            <a:ext cx="3135858" cy="369332"/>
+          </a:xfrm>
+          <a:prstGeom prst="rect">
+            <a:avLst/>
+          </a:prstGeom>
+          <a:noFill/>
+        </p:spPr>
+        <p:txBody>
+          <a:bodyPr wrap="none" rtlCol="0">
+            <a:spAutoFit/>
+          </a:bodyPr>
+          <a:lstStyle/>
+          <a:p>
+            <a:r>
+              <a:rPr lang="en-US" dirty="0"/>
+              <a:t>Assay type. Options: PTK or STK</a:t>
+            </a:r>
+            <a:endParaRPr lang="en-NL" dirty="0"/>
+          </a:p>
+        </p:txBody>
+      </p:sp>
+      <p:sp>
+        <p:nvSpPr>
+          <p:cNvPr id="88" name="Rectangle 87">
+            <a:extLst>
+              <a:ext uri="{FF2B5EF4-FFF2-40B4-BE49-F238E27FC236}">
+                <a16:creationId xmlns:a16="http://schemas.microsoft.com/office/drawing/2014/main" id="{7125D313-208B-2EDA-5090-6077B9906BA5}"/>
+              </a:ext>
+            </a:extLst>
+          </p:cNvPr>
+          <p:cNvSpPr/>
+          <p:nvPr/>
+        </p:nvSpPr>
+        <p:spPr>
+          <a:xfrm>
+            <a:off x="1081272" y="3420044"/>
+            <a:ext cx="338447" cy="326572"/>
+          </a:xfrm>
+          <a:prstGeom prst="rect">
+            <a:avLst/>
+          </a:prstGeom>
+          <a:solidFill>
+            <a:schemeClr val="accent6"/>
+          </a:solidFill>
+          <a:ln>
+            <a:solidFill>
+              <a:schemeClr val="accent6"/>
+            </a:solidFill>
+          </a:ln>
+        </p:spPr>
+        <p:style>
+          <a:lnRef idx="2">
+            <a:schemeClr val="accent1">
+              <a:shade val="50000"/>
+            </a:schemeClr>
+          </a:lnRef>
+          <a:fillRef idx="1">
+            <a:schemeClr val="accent1"/>
+          </a:fillRef>
+          <a:effectRef idx="0">
+            <a:schemeClr val="accent1"/>
+          </a:effectRef>
+          <a:fontRef idx="minor">
+            <a:schemeClr val="lt1"/>
+          </a:fontRef>
+        </p:style>
+        <p:txBody>
+          <a:bodyPr rtlCol="0" anchor="ctr"/>
+          <a:lstStyle/>
+          <a:p>
+            <a:pPr algn="ctr"/>
+            <a:endParaRPr lang="en-NL"/>
+          </a:p>
+        </p:txBody>
+      </p:sp>
+      <p:sp>
+        <p:nvSpPr>
+          <p:cNvPr id="89" name="TextBox 88">
+            <a:extLst>
+              <a:ext uri="{FF2B5EF4-FFF2-40B4-BE49-F238E27FC236}">
+                <a16:creationId xmlns:a16="http://schemas.microsoft.com/office/drawing/2014/main" id="{75C6B5DF-6258-C871-7BD8-2C4AA589E028}"/>
+              </a:ext>
+            </a:extLst>
+          </p:cNvPr>
+          <p:cNvSpPr txBox="1"/>
+          <p:nvPr/>
+        </p:nvSpPr>
+        <p:spPr>
+          <a:xfrm>
+            <a:off x="1419719" y="3420044"/>
+            <a:ext cx="3292183" cy="369332"/>
+          </a:xfrm>
+          <a:prstGeom prst="rect">
+            <a:avLst/>
+          </a:prstGeom>
+          <a:noFill/>
+        </p:spPr>
+        <p:txBody>
+          <a:bodyPr wrap="none" rtlCol="0">
+            <a:spAutoFit/>
+          </a:bodyPr>
+          <a:lstStyle/>
+          <a:p>
+            <a:r>
+              <a:rPr lang="en-US" dirty="0"/>
+              <a:t>Order</a:t>
+            </a:r>
+            <a:r>
+              <a:rPr lang="hu-HU" dirty="0"/>
+              <a:t>, d</a:t>
+            </a:r>
+            <a:r>
+              <a:rPr lang="en-US" dirty="0" err="1"/>
+              <a:t>efines</a:t>
+            </a:r>
+            <a:r>
+              <a:rPr lang="en-US" dirty="0"/>
+              <a:t> ordering in report.</a:t>
+            </a:r>
+            <a:endParaRPr lang="en-NL" dirty="0"/>
+          </a:p>
+        </p:txBody>
+      </p:sp>
+      <p:sp>
+        <p:nvSpPr>
+          <p:cNvPr id="90" name="Rectangle 89">
+            <a:extLst>
+              <a:ext uri="{FF2B5EF4-FFF2-40B4-BE49-F238E27FC236}">
+                <a16:creationId xmlns:a16="http://schemas.microsoft.com/office/drawing/2014/main" id="{6E3D6CFE-5F79-8EBB-8830-75D06BCFF061}"/>
+              </a:ext>
+            </a:extLst>
+          </p:cNvPr>
+          <p:cNvSpPr/>
+          <p:nvPr/>
+        </p:nvSpPr>
+        <p:spPr>
+          <a:xfrm>
+            <a:off x="1081272" y="3785833"/>
+            <a:ext cx="338447" cy="326572"/>
+          </a:xfrm>
+          <a:prstGeom prst="rect">
+            <a:avLst/>
+          </a:prstGeom>
+          <a:solidFill>
+            <a:srgbClr val="FF0000"/>
+          </a:solidFill>
+          <a:ln>
+            <a:solidFill>
+              <a:srgbClr val="FF0000"/>
+            </a:solidFill>
+          </a:ln>
+        </p:spPr>
+        <p:style>
+          <a:lnRef idx="2">
+            <a:schemeClr val="accent1">
+              <a:shade val="50000"/>
+            </a:schemeClr>
+          </a:lnRef>
+          <a:fillRef idx="1">
+            <a:schemeClr val="accent1"/>
+          </a:fillRef>
+          <a:effectRef idx="0">
+            <a:schemeClr val="accent1"/>
+          </a:effectRef>
+          <a:fontRef idx="minor">
+            <a:schemeClr val="lt1"/>
+          </a:fontRef>
+        </p:style>
+        <p:txBody>
+          <a:bodyPr rtlCol="0" anchor="ctr"/>
+          <a:lstStyle/>
+          <a:p>
+            <a:pPr algn="ctr"/>
+            <a:endParaRPr lang="en-NL"/>
+          </a:p>
+        </p:txBody>
+      </p:sp>
+      <p:sp>
+        <p:nvSpPr>
+          <p:cNvPr id="91" name="TextBox 90">
+            <a:extLst>
+              <a:ext uri="{FF2B5EF4-FFF2-40B4-BE49-F238E27FC236}">
+                <a16:creationId xmlns:a16="http://schemas.microsoft.com/office/drawing/2014/main" id="{584DFA6C-0B69-A384-5DDC-DAD3DFB9C2CB}"/>
+              </a:ext>
+            </a:extLst>
+          </p:cNvPr>
+          <p:cNvSpPr txBox="1"/>
+          <p:nvPr/>
+        </p:nvSpPr>
+        <p:spPr>
+          <a:xfrm>
+            <a:off x="1419719" y="3785833"/>
+            <a:ext cx="5070913" cy="1477328"/>
+          </a:xfrm>
+          <a:prstGeom prst="rect">
+            <a:avLst/>
+          </a:prstGeom>
+          <a:noFill/>
+        </p:spPr>
+        <p:txBody>
+          <a:bodyPr wrap="square" rtlCol="0">
+            <a:spAutoFit/>
+          </a:bodyPr>
+          <a:lstStyle/>
+          <a:p>
+            <a:r>
+              <a:rPr lang="hu-HU" dirty="0"/>
+              <a:t>Supergro</a:t>
+            </a:r>
+            <a:r>
+              <a:rPr lang="en-GB" dirty="0"/>
+              <a:t>up</a:t>
+            </a:r>
+            <a:r>
+              <a:rPr lang="hu-HU" dirty="0"/>
+              <a:t>: </a:t>
+            </a:r>
+            <a:r>
+              <a:rPr lang="en-GB" dirty="0"/>
+              <a:t>the name of the supergroup</a:t>
+            </a:r>
+            <a:r>
+              <a:rPr lang="hu-HU" dirty="0"/>
+              <a:t> </a:t>
+            </a:r>
+            <a:r>
+              <a:rPr lang="hu-HU" b="1" dirty="0"/>
+              <a:t>factor</a:t>
+            </a:r>
+            <a:r>
+              <a:rPr lang="en-GB" dirty="0"/>
+              <a:t>.</a:t>
+            </a:r>
+            <a:r>
+              <a:rPr lang="hu-HU" dirty="0"/>
+              <a:t> </a:t>
+            </a:r>
+          </a:p>
+          <a:p>
+            <a:r>
+              <a:rPr lang="hu-HU" dirty="0"/>
+              <a:t>This is NOT displayed in Table 2.</a:t>
+            </a:r>
+          </a:p>
+          <a:p>
+            <a:r>
+              <a:rPr lang="en-GB" dirty="0"/>
+              <a:t>Must be unique.</a:t>
+            </a:r>
+            <a:r>
+              <a:rPr lang="hu-HU" dirty="0"/>
+              <a:t> E.g. Supergroup or Test condition. </a:t>
+            </a:r>
+          </a:p>
+          <a:p>
+            <a:r>
+              <a:rPr lang="hu-HU" dirty="0"/>
+              <a:t>Both supergroup names and comparisons come from the file (from Sgroup_contrast column).</a:t>
+            </a:r>
+            <a:r>
+              <a:rPr lang="en-GB" dirty="0"/>
+              <a:t> </a:t>
+            </a:r>
+            <a:endParaRPr lang="en-NL" dirty="0"/>
+          </a:p>
+        </p:txBody>
+      </p:sp>
+      <p:sp>
+        <p:nvSpPr>
+          <p:cNvPr id="93" name="TextBox 92">
+            <a:extLst>
+              <a:ext uri="{FF2B5EF4-FFF2-40B4-BE49-F238E27FC236}">
+                <a16:creationId xmlns:a16="http://schemas.microsoft.com/office/drawing/2014/main" id="{495B70AD-FAEA-93C6-920B-C2327041E1CD}"/>
+              </a:ext>
+            </a:extLst>
+          </p:cNvPr>
+          <p:cNvSpPr txBox="1"/>
+          <p:nvPr/>
+        </p:nvSpPr>
+        <p:spPr>
+          <a:xfrm>
+            <a:off x="8231797" y="2074088"/>
+            <a:ext cx="2878931" cy="369332"/>
+          </a:xfrm>
+          <a:prstGeom prst="rect">
+            <a:avLst/>
+          </a:prstGeom>
+          <a:noFill/>
+        </p:spPr>
+        <p:txBody>
+          <a:bodyPr wrap="square">
+            <a:spAutoFit/>
+          </a:bodyPr>
+          <a:lstStyle/>
+          <a:p>
+            <a:r>
+              <a:rPr lang="hu-HU" b="1" dirty="0"/>
+              <a:t>Output:</a:t>
+            </a:r>
+            <a:endParaRPr lang="en-NL" b="1" dirty="0"/>
+          </a:p>
+        </p:txBody>
+      </p:sp>
+      <p:sp>
+        <p:nvSpPr>
+          <p:cNvPr id="94" name="Rectangle 93">
+            <a:extLst>
+              <a:ext uri="{FF2B5EF4-FFF2-40B4-BE49-F238E27FC236}">
+                <a16:creationId xmlns:a16="http://schemas.microsoft.com/office/drawing/2014/main" id="{A99A0281-2A93-BC76-734C-C1F3C6D08705}"/>
+              </a:ext>
+            </a:extLst>
+          </p:cNvPr>
+          <p:cNvSpPr/>
+          <p:nvPr/>
+        </p:nvSpPr>
+        <p:spPr>
+          <a:xfrm>
+            <a:off x="6490633" y="1998250"/>
+            <a:ext cx="5555870" cy="3216275"/>
+          </a:xfrm>
+          <a:prstGeom prst="rect">
+            <a:avLst/>
+          </a:prstGeom>
+          <a:noFill/>
+          <a:ln>
+            <a:solidFill>
+              <a:srgbClr val="002060"/>
+            </a:solidFill>
+          </a:ln>
+        </p:spPr>
+        <p:style>
+          <a:lnRef idx="2">
+            <a:schemeClr val="accent1">
+              <a:shade val="15000"/>
+            </a:schemeClr>
+          </a:lnRef>
+          <a:fillRef idx="1">
+            <a:schemeClr val="accent1"/>
+          </a:fillRef>
+          <a:effectRef idx="0">
+            <a:schemeClr val="accent1"/>
+          </a:effectRef>
+          <a:fontRef idx="minor">
+            <a:schemeClr val="lt1"/>
+          </a:fontRef>
+        </p:style>
+        <p:txBody>
+          <a:bodyPr rtlCol="0" anchor="ctr"/>
+          <a:lstStyle/>
+          <a:p>
+            <a:pPr algn="ctr"/>
+            <a:endParaRPr lang="en-NL"/>
+          </a:p>
+        </p:txBody>
+      </p:sp>
+      <p:pic>
+        <p:nvPicPr>
+          <p:cNvPr id="98" name="Picture 97">
+            <a:extLst>
+              <a:ext uri="{FF2B5EF4-FFF2-40B4-BE49-F238E27FC236}">
+                <a16:creationId xmlns:a16="http://schemas.microsoft.com/office/drawing/2014/main" id="{A9E86820-6094-B2A7-F5C8-032A2D840EBC}"/>
+              </a:ext>
+            </a:extLst>
+          </p:cNvPr>
+          <p:cNvPicPr>
+            <a:picLocks noChangeAspect="1"/>
+          </p:cNvPicPr>
+          <p:nvPr/>
+        </p:nvPicPr>
+        <p:blipFill>
+          <a:blip r:embed="rId2"/>
+          <a:stretch>
+            <a:fillRect/>
+          </a:stretch>
+        </p:blipFill>
+        <p:spPr>
+          <a:xfrm>
+            <a:off x="6651168" y="2449111"/>
+            <a:ext cx="5264660" cy="2625310"/>
+          </a:xfrm>
+          <a:prstGeom prst="rect">
+            <a:avLst/>
+          </a:prstGeom>
+        </p:spPr>
+      </p:pic>
+    </p:spTree>
+    <p:extLst>
+      <p:ext uri="{BB962C8B-B14F-4D97-AF65-F5344CB8AC3E}">
+        <p14:creationId xmlns:p14="http://schemas.microsoft.com/office/powerpoint/2010/main" val="3859596613"/>
+      </p:ext>
+    </p:extLst>
+  </p:cSld>
+  <p:clrMapOvr>
+    <a:masterClrMapping/>
+  </p:clrMapOvr>
+</p:sld>
+</file>
+
+<file path=ppt/slides/slide7.xml><?xml version="1.0" encoding="utf-8"?>
+<p:sld xmlns:a="http://schemas.openxmlformats.org/drawingml/2006/main" xmlns:r="http://schemas.openxmlformats.org/officeDocument/2006/relationships" xmlns:p="http://schemas.openxmlformats.org/presentationml/2006/main">
+  <p:cSld>
+    <p:spTree>
+      <p:nvGrpSpPr>
+        <p:cNvPr id="1" name="">
+          <a:extLst>
+            <a:ext uri="{FF2B5EF4-FFF2-40B4-BE49-F238E27FC236}">
+              <a16:creationId xmlns:a16="http://schemas.microsoft.com/office/drawing/2014/main" id="{53A9DCF6-1C35-286A-656B-B264F856DBDC}"/>
+            </a:ext>
+          </a:extLst>
+        </p:cNvPr>
+        <p:cNvGrpSpPr/>
+        <p:nvPr/>
+      </p:nvGrpSpPr>
+      <p:grpSpPr>
+        <a:xfrm>
+          <a:off x="0" y="0"/>
+          <a:ext cx="0" cy="0"/>
+          <a:chOff x="0" y="0"/>
+          <a:chExt cx="0" cy="0"/>
+        </a:xfrm>
+      </p:grpSpPr>
+      <p:sp>
+        <p:nvSpPr>
+          <p:cNvPr id="2" name="Title 1">
+            <a:extLst>
+              <a:ext uri="{FF2B5EF4-FFF2-40B4-BE49-F238E27FC236}">
+                <a16:creationId xmlns:a16="http://schemas.microsoft.com/office/drawing/2014/main" id="{68FC4271-83C4-B355-EE25-409570360E9E}"/>
+              </a:ext>
+            </a:extLst>
+          </p:cNvPr>
+          <p:cNvSpPr>
+            <a:spLocks noGrp="1"/>
+          </p:cNvSpPr>
+          <p:nvPr>
+            <p:ph type="title"/>
+          </p:nvPr>
+        </p:nvSpPr>
+        <p:spPr/>
+        <p:txBody>
+          <a:bodyPr/>
+          <a:lstStyle/>
+          <a:p>
+            <a:r>
+              <a:rPr lang="en-US" dirty="0"/>
+              <a:t>Kinase Analysis</a:t>
+            </a:r>
+            <a:r>
+              <a:rPr lang="hu-HU" dirty="0"/>
+              <a:t> (UKA_MTvC, UKA_TGC app)</a:t>
+            </a:r>
+            <a:endParaRPr lang="en-NL" dirty="0"/>
+          </a:p>
+        </p:txBody>
+      </p:sp>
+      <p:sp>
+        <p:nvSpPr>
           <p:cNvPr id="3" name="Content Placeholder 2">
             <a:extLst>
               <a:ext uri="{FF2B5EF4-FFF2-40B4-BE49-F238E27FC236}">
-                <a16:creationId xmlns:a16="http://schemas.microsoft.com/office/drawing/2014/main" id="{DD9C2BF1-44B7-43DF-990A-74BF16A9E112}"/>
+                <a16:creationId xmlns:a16="http://schemas.microsoft.com/office/drawing/2014/main" id="{941E32FB-4535-3DE6-81C2-E71BAFCFFD1E}"/>
               </a:ext>
             </a:extLst>
           </p:cNvPr>
@@ -10085,7 +11417,7 @@
           <p:cNvPr id="5" name="TextBox 4">
             <a:extLst>
               <a:ext uri="{FF2B5EF4-FFF2-40B4-BE49-F238E27FC236}">
-                <a16:creationId xmlns:a16="http://schemas.microsoft.com/office/drawing/2014/main" id="{2F1EB3F0-7C4D-4F3B-9B2F-7B762E4A212D}"/>
+                <a16:creationId xmlns:a16="http://schemas.microsoft.com/office/drawing/2014/main" id="{A06ECC6C-93EA-898B-F609-F461609AB782}"/>
               </a:ext>
             </a:extLst>
           </p:cNvPr>
@@ -10137,7 +11469,7 @@
           <p:cNvPr id="18" name="Straight Connector 17">
             <a:extLst>
               <a:ext uri="{FF2B5EF4-FFF2-40B4-BE49-F238E27FC236}">
-                <a16:creationId xmlns:a16="http://schemas.microsoft.com/office/drawing/2014/main" id="{91A43A0D-837B-40CB-B668-DAADC9008E49}"/>
+                <a16:creationId xmlns:a16="http://schemas.microsoft.com/office/drawing/2014/main" id="{F4642E46-BF4E-01EE-A40C-3407F8E7DA63}"/>
               </a:ext>
             </a:extLst>
           </p:cNvPr>
@@ -10176,7 +11508,7 @@
           <p:cNvPr id="21" name="Straight Connector 20">
             <a:extLst>
               <a:ext uri="{FF2B5EF4-FFF2-40B4-BE49-F238E27FC236}">
-                <a16:creationId xmlns:a16="http://schemas.microsoft.com/office/drawing/2014/main" id="{88DE3F3C-8A6F-455D-AECB-1195CBFC1C0A}"/>
+                <a16:creationId xmlns:a16="http://schemas.microsoft.com/office/drawing/2014/main" id="{B7C79A87-4A8F-0D57-5DD3-69489C78BA64}"/>
               </a:ext>
             </a:extLst>
           </p:cNvPr>
@@ -10215,7 +11547,7 @@
           <p:cNvPr id="23" name="Straight Connector 22">
             <a:extLst>
               <a:ext uri="{FF2B5EF4-FFF2-40B4-BE49-F238E27FC236}">
-                <a16:creationId xmlns:a16="http://schemas.microsoft.com/office/drawing/2014/main" id="{E9790DB0-EA56-4A3D-AA44-5FC556B7BB9A}"/>
+                <a16:creationId xmlns:a16="http://schemas.microsoft.com/office/drawing/2014/main" id="{46212517-452D-DCA4-2C66-447968038EC6}"/>
               </a:ext>
             </a:extLst>
           </p:cNvPr>
@@ -10254,7 +11586,7 @@
           <p:cNvPr id="24" name="Straight Connector 23">
             <a:extLst>
               <a:ext uri="{FF2B5EF4-FFF2-40B4-BE49-F238E27FC236}">
-                <a16:creationId xmlns:a16="http://schemas.microsoft.com/office/drawing/2014/main" id="{82E82212-B246-4AB8-B5CD-24826FE634B4}"/>
+                <a16:creationId xmlns:a16="http://schemas.microsoft.com/office/drawing/2014/main" id="{87DDA779-107B-6923-FCC3-1597DA389D15}"/>
               </a:ext>
             </a:extLst>
           </p:cNvPr>
@@ -10297,7 +11629,7 @@
           <p:cNvPr id="30" name="Rectangle 29">
             <a:extLst>
               <a:ext uri="{FF2B5EF4-FFF2-40B4-BE49-F238E27FC236}">
-                <a16:creationId xmlns:a16="http://schemas.microsoft.com/office/drawing/2014/main" id="{BB152CBD-3826-40B2-94F3-816B47FC697A}"/>
+                <a16:creationId xmlns:a16="http://schemas.microsoft.com/office/drawing/2014/main" id="{BA399BEF-026F-A174-81BE-315295715793}"/>
               </a:ext>
             </a:extLst>
           </p:cNvPr>
@@ -10348,7 +11680,7 @@
           <p:cNvPr id="31" name="TextBox 30">
             <a:extLst>
               <a:ext uri="{FF2B5EF4-FFF2-40B4-BE49-F238E27FC236}">
-                <a16:creationId xmlns:a16="http://schemas.microsoft.com/office/drawing/2014/main" id="{E3BFE06C-0043-417F-8F95-1368D728335F}"/>
+                <a16:creationId xmlns:a16="http://schemas.microsoft.com/office/drawing/2014/main" id="{A990ECCF-FDFC-18A4-915C-E63F89F3F21E}"/>
               </a:ext>
             </a:extLst>
           </p:cNvPr>
@@ -10388,7 +11720,7 @@
           <p:cNvPr id="32" name="Rectangle 31">
             <a:extLst>
               <a:ext uri="{FF2B5EF4-FFF2-40B4-BE49-F238E27FC236}">
-                <a16:creationId xmlns:a16="http://schemas.microsoft.com/office/drawing/2014/main" id="{E57E36FD-5BEA-40BA-849E-603DAB62A121}"/>
+                <a16:creationId xmlns:a16="http://schemas.microsoft.com/office/drawing/2014/main" id="{CA18404D-8A51-145D-2C5B-0E4FBD63305A}"/>
               </a:ext>
             </a:extLst>
           </p:cNvPr>
@@ -10436,7 +11768,7 @@
           <p:cNvPr id="33" name="TextBox 32">
             <a:extLst>
               <a:ext uri="{FF2B5EF4-FFF2-40B4-BE49-F238E27FC236}">
-                <a16:creationId xmlns:a16="http://schemas.microsoft.com/office/drawing/2014/main" id="{CF933DA8-7734-4D38-841F-BE4BB9CD8C02}"/>
+                <a16:creationId xmlns:a16="http://schemas.microsoft.com/office/drawing/2014/main" id="{F2A25DD4-8F35-655D-7E61-47190143089D}"/>
               </a:ext>
             </a:extLst>
           </p:cNvPr>
@@ -10484,7 +11816,7 @@
           <p:cNvPr id="34" name="Rectangle 33">
             <a:extLst>
               <a:ext uri="{FF2B5EF4-FFF2-40B4-BE49-F238E27FC236}">
-                <a16:creationId xmlns:a16="http://schemas.microsoft.com/office/drawing/2014/main" id="{19285AE9-17E2-42C5-B37F-5A1C6A2DABE4}"/>
+                <a16:creationId xmlns:a16="http://schemas.microsoft.com/office/drawing/2014/main" id="{F8FA1802-FD6F-EE21-F7BD-A8668FC601BD}"/>
               </a:ext>
             </a:extLst>
           </p:cNvPr>
@@ -10538,7 +11870,7 @@
           <p:cNvPr id="35" name="TextBox 34">
             <a:extLst>
               <a:ext uri="{FF2B5EF4-FFF2-40B4-BE49-F238E27FC236}">
-                <a16:creationId xmlns:a16="http://schemas.microsoft.com/office/drawing/2014/main" id="{DDDF34B4-6185-47F7-A166-0F066D3EC698}"/>
+                <a16:creationId xmlns:a16="http://schemas.microsoft.com/office/drawing/2014/main" id="{15AA60BD-2136-75EE-0C74-5CB79FBB673B}"/>
               </a:ext>
             </a:extLst>
           </p:cNvPr>
@@ -10574,7 +11906,7 @@
           <p:cNvPr id="36" name="Rectangle 35">
             <a:extLst>
               <a:ext uri="{FF2B5EF4-FFF2-40B4-BE49-F238E27FC236}">
-                <a16:creationId xmlns:a16="http://schemas.microsoft.com/office/drawing/2014/main" id="{5CEE573A-1780-406E-82DD-3BAF4DF5BD41}"/>
+                <a16:creationId xmlns:a16="http://schemas.microsoft.com/office/drawing/2014/main" id="{0533CB02-EAAB-EA34-1407-373194014233}"/>
               </a:ext>
             </a:extLst>
           </p:cNvPr>
@@ -10628,7 +11960,7 @@
           <p:cNvPr id="37" name="TextBox 36">
             <a:extLst>
               <a:ext uri="{FF2B5EF4-FFF2-40B4-BE49-F238E27FC236}">
-                <a16:creationId xmlns:a16="http://schemas.microsoft.com/office/drawing/2014/main" id="{5050D63D-481F-4F77-B2C9-AD6FF9537F8C}"/>
+                <a16:creationId xmlns:a16="http://schemas.microsoft.com/office/drawing/2014/main" id="{330ABFF3-58D5-69A3-CC52-061E5F28B3A8}"/>
               </a:ext>
             </a:extLst>
           </p:cNvPr>
@@ -10672,7 +12004,7 @@
           <p:cNvPr id="19" name="TextBox 18">
             <a:extLst>
               <a:ext uri="{FF2B5EF4-FFF2-40B4-BE49-F238E27FC236}">
-                <a16:creationId xmlns:a16="http://schemas.microsoft.com/office/drawing/2014/main" id="{1D1A1865-A85D-47C3-BEF2-9992B8E812D0}"/>
+                <a16:creationId xmlns:a16="http://schemas.microsoft.com/office/drawing/2014/main" id="{D29BCFD0-7853-5E16-CFFF-3A0B4BD0A875}"/>
               </a:ext>
             </a:extLst>
           </p:cNvPr>
@@ -10719,7 +12051,7 @@
           <p:cNvPr id="13" name="Straight Connector 12">
             <a:extLst>
               <a:ext uri="{FF2B5EF4-FFF2-40B4-BE49-F238E27FC236}">
-                <a16:creationId xmlns:a16="http://schemas.microsoft.com/office/drawing/2014/main" id="{D95BD96F-A661-735B-8595-BD00180A6AAC}"/>
+                <a16:creationId xmlns:a16="http://schemas.microsoft.com/office/drawing/2014/main" id="{83CE0F1F-A862-3C65-2FFB-F4DF1E490944}"/>
               </a:ext>
             </a:extLst>
           </p:cNvPr>
@@ -10762,7 +12094,7 @@
           <p:cNvPr id="16" name="Rectangle 15">
             <a:extLst>
               <a:ext uri="{FF2B5EF4-FFF2-40B4-BE49-F238E27FC236}">
-                <a16:creationId xmlns:a16="http://schemas.microsoft.com/office/drawing/2014/main" id="{40090164-D319-7A29-99D4-F86A47D359AB}"/>
+                <a16:creationId xmlns:a16="http://schemas.microsoft.com/office/drawing/2014/main" id="{736DFC8E-BE90-078F-DE39-C01B0467B367}"/>
               </a:ext>
             </a:extLst>
           </p:cNvPr>
@@ -10816,7 +12148,7 @@
           <p:cNvPr id="17" name="TextBox 16">
             <a:extLst>
               <a:ext uri="{FF2B5EF4-FFF2-40B4-BE49-F238E27FC236}">
-                <a16:creationId xmlns:a16="http://schemas.microsoft.com/office/drawing/2014/main" id="{C74285C0-AE65-B55A-D6D9-E0BD7E70784A}"/>
+                <a16:creationId xmlns:a16="http://schemas.microsoft.com/office/drawing/2014/main" id="{5846E36D-D12B-F726-60CC-B5686815B344}"/>
               </a:ext>
             </a:extLst>
           </p:cNvPr>
@@ -10852,7 +12184,7 @@
           <p:cNvPr id="22" name="Straight Arrow Connector 21">
             <a:extLst>
               <a:ext uri="{FF2B5EF4-FFF2-40B4-BE49-F238E27FC236}">
-                <a16:creationId xmlns:a16="http://schemas.microsoft.com/office/drawing/2014/main" id="{1F181CFE-45A5-5609-94FE-E34CD218F3F7}"/>
+                <a16:creationId xmlns:a16="http://schemas.microsoft.com/office/drawing/2014/main" id="{C66C3DAB-3DFD-BC10-262F-0E647A6D94CE}"/>
               </a:ext>
             </a:extLst>
           </p:cNvPr>
@@ -10894,7 +12226,7 @@
           <p:cNvPr id="25" name="TextBox 24">
             <a:extLst>
               <a:ext uri="{FF2B5EF4-FFF2-40B4-BE49-F238E27FC236}">
-                <a16:creationId xmlns:a16="http://schemas.microsoft.com/office/drawing/2014/main" id="{1BAFB8DF-0F08-A17A-3081-8CC847EFE472}"/>
+                <a16:creationId xmlns:a16="http://schemas.microsoft.com/office/drawing/2014/main" id="{F87DD107-8B19-D793-1827-E5B9F8E00FC9}"/>
               </a:ext>
             </a:extLst>
           </p:cNvPr>
@@ -10977,7 +12309,7 @@
           <p:cNvPr id="26" name="TextBox 25">
             <a:extLst>
               <a:ext uri="{FF2B5EF4-FFF2-40B4-BE49-F238E27FC236}">
-                <a16:creationId xmlns:a16="http://schemas.microsoft.com/office/drawing/2014/main" id="{CA08AB1B-AFD6-4850-5EE8-6776E97087FD}"/>
+                <a16:creationId xmlns:a16="http://schemas.microsoft.com/office/drawing/2014/main" id="{51BD043B-9443-6FB8-942D-B0740E86E691}"/>
               </a:ext>
             </a:extLst>
           </p:cNvPr>
@@ -11029,7 +12361,7 @@
           <p:cNvPr id="27" name="Straight Connector 26">
             <a:extLst>
               <a:ext uri="{FF2B5EF4-FFF2-40B4-BE49-F238E27FC236}">
-                <a16:creationId xmlns:a16="http://schemas.microsoft.com/office/drawing/2014/main" id="{C330B02D-BC7B-2FD2-87CE-44DDFA74EB8B}"/>
+                <a16:creationId xmlns:a16="http://schemas.microsoft.com/office/drawing/2014/main" id="{21AECDB9-CF17-3DDA-75C6-E3934B147B6A}"/>
               </a:ext>
             </a:extLst>
           </p:cNvPr>
@@ -11068,7 +12400,7 @@
           <p:cNvPr id="28" name="Straight Connector 27">
             <a:extLst>
               <a:ext uri="{FF2B5EF4-FFF2-40B4-BE49-F238E27FC236}">
-                <a16:creationId xmlns:a16="http://schemas.microsoft.com/office/drawing/2014/main" id="{A60895ED-ABBC-7871-15FA-B53B1621EDDD}"/>
+                <a16:creationId xmlns:a16="http://schemas.microsoft.com/office/drawing/2014/main" id="{86A6E6D5-19DE-C856-D3A7-AF4D05282856}"/>
               </a:ext>
             </a:extLst>
           </p:cNvPr>
@@ -11107,7 +12439,7 @@
           <p:cNvPr id="29" name="Straight Connector 28">
             <a:extLst>
               <a:ext uri="{FF2B5EF4-FFF2-40B4-BE49-F238E27FC236}">
-                <a16:creationId xmlns:a16="http://schemas.microsoft.com/office/drawing/2014/main" id="{96678F81-A502-54AF-F9B3-E011875CE0BE}"/>
+                <a16:creationId xmlns:a16="http://schemas.microsoft.com/office/drawing/2014/main" id="{2692F169-E6A0-C750-ECE9-C729893D9DE1}"/>
               </a:ext>
             </a:extLst>
           </p:cNvPr>
@@ -11146,7 +12478,7 @@
           <p:cNvPr id="38" name="Straight Connector 37">
             <a:extLst>
               <a:ext uri="{FF2B5EF4-FFF2-40B4-BE49-F238E27FC236}">
-                <a16:creationId xmlns:a16="http://schemas.microsoft.com/office/drawing/2014/main" id="{9533F203-742B-1EFA-3A99-BE786636D6F7}"/>
+                <a16:creationId xmlns:a16="http://schemas.microsoft.com/office/drawing/2014/main" id="{43E376C7-A323-7B49-3E9F-B4F8C8786B4D}"/>
               </a:ext>
             </a:extLst>
           </p:cNvPr>
@@ -11189,7 +12521,7 @@
           <p:cNvPr id="40" name="Straight Arrow Connector 39">
             <a:extLst>
               <a:ext uri="{FF2B5EF4-FFF2-40B4-BE49-F238E27FC236}">
-                <a16:creationId xmlns:a16="http://schemas.microsoft.com/office/drawing/2014/main" id="{4CFBB447-B69B-6A87-99CA-3AB633292D12}"/>
+                <a16:creationId xmlns:a16="http://schemas.microsoft.com/office/drawing/2014/main" id="{06FD6D76-A006-1CB8-5412-D061DF51CC56}"/>
               </a:ext>
             </a:extLst>
           </p:cNvPr>
@@ -11233,7 +12565,7 @@
           <p:cNvPr id="41" name="TextBox 40">
             <a:extLst>
               <a:ext uri="{FF2B5EF4-FFF2-40B4-BE49-F238E27FC236}">
-                <a16:creationId xmlns:a16="http://schemas.microsoft.com/office/drawing/2014/main" id="{5F41557C-1489-5613-D522-14BE953BE228}"/>
+                <a16:creationId xmlns:a16="http://schemas.microsoft.com/office/drawing/2014/main" id="{A56D26EB-37A5-7B9A-542A-D3718AE6734A}"/>
               </a:ext>
             </a:extLst>
           </p:cNvPr>
@@ -11316,7 +12648,7 @@
           <p:cNvPr id="42" name="Content Placeholder 2">
             <a:extLst>
               <a:ext uri="{FF2B5EF4-FFF2-40B4-BE49-F238E27FC236}">
-                <a16:creationId xmlns:a16="http://schemas.microsoft.com/office/drawing/2014/main" id="{99800858-2E02-A5E7-987E-9C3B057972B1}"/>
+                <a16:creationId xmlns:a16="http://schemas.microsoft.com/office/drawing/2014/main" id="{45F0921F-B962-5856-81EE-C854B0CC90F6}"/>
               </a:ext>
             </a:extLst>
           </p:cNvPr>
@@ -11528,7 +12860,7 @@
           <p:cNvPr id="44" name="TextBox 43">
             <a:extLst>
               <a:ext uri="{FF2B5EF4-FFF2-40B4-BE49-F238E27FC236}">
-                <a16:creationId xmlns:a16="http://schemas.microsoft.com/office/drawing/2014/main" id="{AF5CDD23-1C1A-916B-E7A5-4B4AED08F4AC}"/>
+                <a16:creationId xmlns:a16="http://schemas.microsoft.com/office/drawing/2014/main" id="{6940C74E-1AC0-B8CC-51CD-41F8D3DF2A18}"/>
               </a:ext>
             </a:extLst>
           </p:cNvPr>
@@ -11580,7 +12912,7 @@
           <p:cNvPr id="45" name="Straight Connector 44">
             <a:extLst>
               <a:ext uri="{FF2B5EF4-FFF2-40B4-BE49-F238E27FC236}">
-                <a16:creationId xmlns:a16="http://schemas.microsoft.com/office/drawing/2014/main" id="{6B3BF156-F340-878D-AA61-B7D48FFADE36}"/>
+                <a16:creationId xmlns:a16="http://schemas.microsoft.com/office/drawing/2014/main" id="{DECAD055-1AE5-89EE-3AD7-5A17D41E687E}"/>
               </a:ext>
             </a:extLst>
           </p:cNvPr>
@@ -11619,7 +12951,7 @@
           <p:cNvPr id="46" name="Straight Connector 45">
             <a:extLst>
               <a:ext uri="{FF2B5EF4-FFF2-40B4-BE49-F238E27FC236}">
-                <a16:creationId xmlns:a16="http://schemas.microsoft.com/office/drawing/2014/main" id="{D1F4E8A7-C0C2-2F98-52BF-447F26CAE809}"/>
+                <a16:creationId xmlns:a16="http://schemas.microsoft.com/office/drawing/2014/main" id="{8267C8D0-5EB6-6494-1D85-959845DC52BC}"/>
               </a:ext>
             </a:extLst>
           </p:cNvPr>
@@ -11658,7 +12990,7 @@
           <p:cNvPr id="47" name="Straight Connector 46">
             <a:extLst>
               <a:ext uri="{FF2B5EF4-FFF2-40B4-BE49-F238E27FC236}">
-                <a16:creationId xmlns:a16="http://schemas.microsoft.com/office/drawing/2014/main" id="{B8D7E191-42B3-55D4-6C10-2DA03A5213CA}"/>
+                <a16:creationId xmlns:a16="http://schemas.microsoft.com/office/drawing/2014/main" id="{9FE23CAB-2C4E-CA83-40A7-BB20C19A4F66}"/>
               </a:ext>
             </a:extLst>
           </p:cNvPr>
@@ -11697,7 +13029,7 @@
           <p:cNvPr id="48" name="Straight Connector 47">
             <a:extLst>
               <a:ext uri="{FF2B5EF4-FFF2-40B4-BE49-F238E27FC236}">
-                <a16:creationId xmlns:a16="http://schemas.microsoft.com/office/drawing/2014/main" id="{C09B6319-5199-10D8-8702-B7436F95B5D5}"/>
+                <a16:creationId xmlns:a16="http://schemas.microsoft.com/office/drawing/2014/main" id="{B20207FB-D3CD-8131-8383-C65E824ACB56}"/>
               </a:ext>
             </a:extLst>
           </p:cNvPr>
@@ -11740,7 +13072,7 @@
           <p:cNvPr id="50" name="TextBox 49">
             <a:extLst>
               <a:ext uri="{FF2B5EF4-FFF2-40B4-BE49-F238E27FC236}">
-                <a16:creationId xmlns:a16="http://schemas.microsoft.com/office/drawing/2014/main" id="{43297699-B910-187B-F458-D4EEE1163DCA}"/>
+                <a16:creationId xmlns:a16="http://schemas.microsoft.com/office/drawing/2014/main" id="{2811C83C-D721-06C7-BC7D-D73876F22FB2}"/>
               </a:ext>
             </a:extLst>
           </p:cNvPr>
@@ -11823,7 +13155,7 @@
           <p:cNvPr id="54" name="Rectangle 53">
             <a:extLst>
               <a:ext uri="{FF2B5EF4-FFF2-40B4-BE49-F238E27FC236}">
-                <a16:creationId xmlns:a16="http://schemas.microsoft.com/office/drawing/2014/main" id="{850884DD-C4A5-9587-3559-B9DD0DC2A8E8}"/>
+                <a16:creationId xmlns:a16="http://schemas.microsoft.com/office/drawing/2014/main" id="{6BDDBD7E-CAF6-7885-C45E-7445F07E7878}"/>
               </a:ext>
             </a:extLst>
           </p:cNvPr>
@@ -11875,7 +13207,7 @@
           <p:cNvPr id="56" name="Rectangle 55">
             <a:extLst>
               <a:ext uri="{FF2B5EF4-FFF2-40B4-BE49-F238E27FC236}">
-                <a16:creationId xmlns:a16="http://schemas.microsoft.com/office/drawing/2014/main" id="{749DE097-FC5A-14BD-52B7-BA124356CA88}"/>
+                <a16:creationId xmlns:a16="http://schemas.microsoft.com/office/drawing/2014/main" id="{B28EFD11-F1E5-7D5B-4611-AA9D638EDD08}"/>
               </a:ext>
             </a:extLst>
           </p:cNvPr>
@@ -11927,7 +13259,7 @@
           <p:cNvPr id="57" name="Straight Connector 56">
             <a:extLst>
               <a:ext uri="{FF2B5EF4-FFF2-40B4-BE49-F238E27FC236}">
-                <a16:creationId xmlns:a16="http://schemas.microsoft.com/office/drawing/2014/main" id="{4969D5F9-7D7B-BBD3-A648-547A7843242A}"/>
+                <a16:creationId xmlns:a16="http://schemas.microsoft.com/office/drawing/2014/main" id="{65DD3A64-8904-7A4B-EDC3-87F34930296B}"/>
               </a:ext>
             </a:extLst>
           </p:cNvPr>
@@ -11973,7 +13305,7 @@
           <p:cNvPr id="58" name="Rectangle 57">
             <a:extLst>
               <a:ext uri="{FF2B5EF4-FFF2-40B4-BE49-F238E27FC236}">
-                <a16:creationId xmlns:a16="http://schemas.microsoft.com/office/drawing/2014/main" id="{475ED092-A1DE-5822-9288-194F872AAAB9}"/>
+                <a16:creationId xmlns:a16="http://schemas.microsoft.com/office/drawing/2014/main" id="{F1AFE17E-54C0-CC09-8FED-47EE0D4C5895}"/>
               </a:ext>
             </a:extLst>
           </p:cNvPr>
@@ -12033,7 +13365,7 @@
           <p:cNvPr id="59" name="TextBox 58">
             <a:extLst>
               <a:ext uri="{FF2B5EF4-FFF2-40B4-BE49-F238E27FC236}">
-                <a16:creationId xmlns:a16="http://schemas.microsoft.com/office/drawing/2014/main" id="{907505AA-0940-F447-E7CA-B42EDDCA34B1}"/>
+                <a16:creationId xmlns:a16="http://schemas.microsoft.com/office/drawing/2014/main" id="{77462A83-8F1D-53C4-13AE-296D2C8255A8}"/>
               </a:ext>
             </a:extLst>
           </p:cNvPr>
@@ -12069,7 +13401,7 @@
           <p:cNvPr id="60" name="Straight Connector 59">
             <a:extLst>
               <a:ext uri="{FF2B5EF4-FFF2-40B4-BE49-F238E27FC236}">
-                <a16:creationId xmlns:a16="http://schemas.microsoft.com/office/drawing/2014/main" id="{C2977AFC-D0A2-0E21-F01D-727589F9FB97}"/>
+                <a16:creationId xmlns:a16="http://schemas.microsoft.com/office/drawing/2014/main" id="{2B31617A-02B4-BF84-062A-A3F3E0A10CE6}"/>
               </a:ext>
             </a:extLst>
           </p:cNvPr>
@@ -12115,7 +13447,7 @@
           <p:cNvPr id="62" name="Straight Connector 61">
             <a:extLst>
               <a:ext uri="{FF2B5EF4-FFF2-40B4-BE49-F238E27FC236}">
-                <a16:creationId xmlns:a16="http://schemas.microsoft.com/office/drawing/2014/main" id="{58E8BE2B-928B-3F5E-1634-E56B02125C46}"/>
+                <a16:creationId xmlns:a16="http://schemas.microsoft.com/office/drawing/2014/main" id="{DACA771C-4DA4-5AE3-54A4-73A4901E001A}"/>
               </a:ext>
             </a:extLst>
           </p:cNvPr>
@@ -12161,7 +13493,7 @@
           <p:cNvPr id="63" name="Rectangle 62">
             <a:extLst>
               <a:ext uri="{FF2B5EF4-FFF2-40B4-BE49-F238E27FC236}">
-                <a16:creationId xmlns:a16="http://schemas.microsoft.com/office/drawing/2014/main" id="{118D881D-158C-E2F6-CC8A-06905459B90E}"/>
+                <a16:creationId xmlns:a16="http://schemas.microsoft.com/office/drawing/2014/main" id="{8855F9B2-5833-621C-6361-1C13FDE99E01}"/>
               </a:ext>
             </a:extLst>
           </p:cNvPr>
@@ -12213,7 +13545,7 @@
           <p:cNvPr id="4" name="Straight Connector 3">
             <a:extLst>
               <a:ext uri="{FF2B5EF4-FFF2-40B4-BE49-F238E27FC236}">
-                <a16:creationId xmlns:a16="http://schemas.microsoft.com/office/drawing/2014/main" id="{E12E5BDB-EFF3-E842-79D5-5A4739588E71}"/>
+                <a16:creationId xmlns:a16="http://schemas.microsoft.com/office/drawing/2014/main" id="{74AD5660-7AFE-4225-FEDC-38A50D3C89AF}"/>
               </a:ext>
             </a:extLst>
           </p:cNvPr>
@@ -12256,7 +13588,7 @@
           <p:cNvPr id="6" name="Straight Connector 5">
             <a:extLst>
               <a:ext uri="{FF2B5EF4-FFF2-40B4-BE49-F238E27FC236}">
-                <a16:creationId xmlns:a16="http://schemas.microsoft.com/office/drawing/2014/main" id="{EF8113F8-1E2C-5DE0-CF7F-8239DF384ED4}"/>
+                <a16:creationId xmlns:a16="http://schemas.microsoft.com/office/drawing/2014/main" id="{66E3688C-14FA-9FF9-B2AB-525539A4DB17}"/>
               </a:ext>
             </a:extLst>
           </p:cNvPr>
@@ -12299,7 +13631,7 @@
           <p:cNvPr id="7" name="Straight Connector 6">
             <a:extLst>
               <a:ext uri="{FF2B5EF4-FFF2-40B4-BE49-F238E27FC236}">
-                <a16:creationId xmlns:a16="http://schemas.microsoft.com/office/drawing/2014/main" id="{B60240C6-529D-BA6A-358D-6601DCC4CD9B}"/>
+                <a16:creationId xmlns:a16="http://schemas.microsoft.com/office/drawing/2014/main" id="{6F9417F8-803C-AB9F-6F2E-CC64EE2679DB}"/>
               </a:ext>
             </a:extLst>
           </p:cNvPr>
@@ -12342,7 +13674,7 @@
           <p:cNvPr id="8" name="Straight Connector 7">
             <a:extLst>
               <a:ext uri="{FF2B5EF4-FFF2-40B4-BE49-F238E27FC236}">
-                <a16:creationId xmlns:a16="http://schemas.microsoft.com/office/drawing/2014/main" id="{2A27901C-37A3-D78C-5B9E-A5CA6F5CFF3A}"/>
+                <a16:creationId xmlns:a16="http://schemas.microsoft.com/office/drawing/2014/main" id="{611B240A-8540-5024-08AB-DD3D083EDE62}"/>
               </a:ext>
             </a:extLst>
           </p:cNvPr>
@@ -12385,7 +13717,7 @@
           <p:cNvPr id="9" name="TextBox 8">
             <a:extLst>
               <a:ext uri="{FF2B5EF4-FFF2-40B4-BE49-F238E27FC236}">
-                <a16:creationId xmlns:a16="http://schemas.microsoft.com/office/drawing/2014/main" id="{B7473454-0EA8-476E-D26B-F70157C8CFBF}"/>
+                <a16:creationId xmlns:a16="http://schemas.microsoft.com/office/drawing/2014/main" id="{34F9DA81-1BFA-DC7E-E963-90231E228B48}"/>
               </a:ext>
             </a:extLst>
           </p:cNvPr>
@@ -12421,7 +13753,7 @@
           <p:cNvPr id="11" name="Rectangle 10">
             <a:extLst>
               <a:ext uri="{FF2B5EF4-FFF2-40B4-BE49-F238E27FC236}">
-                <a16:creationId xmlns:a16="http://schemas.microsoft.com/office/drawing/2014/main" id="{F853255A-C97F-ABBF-49BF-2B4CFFA5A658}"/>
+                <a16:creationId xmlns:a16="http://schemas.microsoft.com/office/drawing/2014/main" id="{FD87AE08-E95B-46BE-55AE-A315865DFE6D}"/>
               </a:ext>
             </a:extLst>
           </p:cNvPr>
@@ -12473,7 +13805,7 @@
           <p:cNvPr id="12" name="TextBox 11">
             <a:extLst>
               <a:ext uri="{FF2B5EF4-FFF2-40B4-BE49-F238E27FC236}">
-                <a16:creationId xmlns:a16="http://schemas.microsoft.com/office/drawing/2014/main" id="{389D234F-A7D8-3EED-FE1C-DBC96B924C48}"/>
+                <a16:creationId xmlns:a16="http://schemas.microsoft.com/office/drawing/2014/main" id="{4780E6BE-CD86-0E22-F99C-CC33D5AB6751}"/>
               </a:ext>
             </a:extLst>
           </p:cNvPr>
@@ -12509,7 +13841,7 @@
           <p:cNvPr id="14" name="Straight Connector 13">
             <a:extLst>
               <a:ext uri="{FF2B5EF4-FFF2-40B4-BE49-F238E27FC236}">
-                <a16:creationId xmlns:a16="http://schemas.microsoft.com/office/drawing/2014/main" id="{9288F992-4FC3-057E-2493-29811296745B}"/>
+                <a16:creationId xmlns:a16="http://schemas.microsoft.com/office/drawing/2014/main" id="{D8ECC0E4-3498-E0FB-EB14-97B0BC569071}"/>
               </a:ext>
             </a:extLst>
           </p:cNvPr>
@@ -12552,7 +13884,7 @@
           <p:cNvPr id="20" name="Rectangle 19">
             <a:extLst>
               <a:ext uri="{FF2B5EF4-FFF2-40B4-BE49-F238E27FC236}">
-                <a16:creationId xmlns:a16="http://schemas.microsoft.com/office/drawing/2014/main" id="{0D8567FB-F63D-BF4C-583A-D9C088D713A8}"/>
+                <a16:creationId xmlns:a16="http://schemas.microsoft.com/office/drawing/2014/main" id="{21E11283-2DA3-95FB-5CCC-95016D3835E7}"/>
               </a:ext>
             </a:extLst>
           </p:cNvPr>
@@ -12604,7 +13936,7 @@
           <p:cNvPr id="39" name="Rectangle 38">
             <a:extLst>
               <a:ext uri="{FF2B5EF4-FFF2-40B4-BE49-F238E27FC236}">
-                <a16:creationId xmlns:a16="http://schemas.microsoft.com/office/drawing/2014/main" id="{12580CBE-D153-6750-AB17-0B3A4D4353F9}"/>
+                <a16:creationId xmlns:a16="http://schemas.microsoft.com/office/drawing/2014/main" id="{447FB7B2-CBD6-4E6D-C6CF-5142B5310193}"/>
               </a:ext>
             </a:extLst>
           </p:cNvPr>
@@ -12656,7 +13988,7 @@
           <p:cNvPr id="43" name="Straight Arrow Connector 42">
             <a:extLst>
               <a:ext uri="{FF2B5EF4-FFF2-40B4-BE49-F238E27FC236}">
-                <a16:creationId xmlns:a16="http://schemas.microsoft.com/office/drawing/2014/main" id="{E0186BA7-8072-1CA6-8114-096BD471811A}"/>
+                <a16:creationId xmlns:a16="http://schemas.microsoft.com/office/drawing/2014/main" id="{0BD01690-FAF2-AAA9-E9FD-50598B4760DE}"/>
               </a:ext>
             </a:extLst>
           </p:cNvPr>
@@ -12700,7 +14032,7 @@
           <p:cNvPr id="49" name="Straight Connector 48">
             <a:extLst>
               <a:ext uri="{FF2B5EF4-FFF2-40B4-BE49-F238E27FC236}">
-                <a16:creationId xmlns:a16="http://schemas.microsoft.com/office/drawing/2014/main" id="{AB3CF358-8496-27A1-4A55-6EFC31CFCF22}"/>
+                <a16:creationId xmlns:a16="http://schemas.microsoft.com/office/drawing/2014/main" id="{A31727B7-4D06-8773-1E28-AC7A173B8815}"/>
               </a:ext>
             </a:extLst>
           </p:cNvPr>
@@ -12743,7 +14075,7 @@
           <p:cNvPr id="51" name="Straight Connector 50">
             <a:extLst>
               <a:ext uri="{FF2B5EF4-FFF2-40B4-BE49-F238E27FC236}">
-                <a16:creationId xmlns:a16="http://schemas.microsoft.com/office/drawing/2014/main" id="{218C1223-2269-F6B7-12A0-1841AD0323EA}"/>
+                <a16:creationId xmlns:a16="http://schemas.microsoft.com/office/drawing/2014/main" id="{5D7285A3-33B0-5DFE-E3A0-CED4E8C65FB8}"/>
               </a:ext>
             </a:extLst>
           </p:cNvPr>
@@ -12786,7 +14118,7 @@
           <p:cNvPr id="52" name="Straight Connector 51">
             <a:extLst>
               <a:ext uri="{FF2B5EF4-FFF2-40B4-BE49-F238E27FC236}">
-                <a16:creationId xmlns:a16="http://schemas.microsoft.com/office/drawing/2014/main" id="{E09FD1A9-04DD-01D5-C287-EF8DC3021CA7}"/>
+                <a16:creationId xmlns:a16="http://schemas.microsoft.com/office/drawing/2014/main" id="{4F151F4E-7382-F306-49F8-660E5F4EF22C}"/>
               </a:ext>
             </a:extLst>
           </p:cNvPr>
@@ -12827,7 +14159,7 @@
     </p:spTree>
     <p:extLst>
       <p:ext uri="{BB962C8B-B14F-4D97-AF65-F5344CB8AC3E}">
-        <p14:creationId xmlns:p14="http://schemas.microsoft.com/office/powerpoint/2010/main" val="3859596613"/>
+        <p14:creationId xmlns:p14="http://schemas.microsoft.com/office/powerpoint/2010/main" val="565926670"/>
       </p:ext>
     </p:extLst>
   </p:cSld>
@@ -12837,7 +14169,7 @@
 </p:sld>
 </file>
 
-<file path=ppt/slides/slide7.xml><?xml version="1.0" encoding="utf-8"?>
+<file path=ppt/slides/slide8.xml><?xml version="1.0" encoding="utf-8"?>
 <p:sld xmlns:a="http://schemas.openxmlformats.org/drawingml/2006/main" xmlns:r="http://schemas.openxmlformats.org/officeDocument/2006/relationships" xmlns:p="http://schemas.openxmlformats.org/presentationml/2006/main">
   <p:cSld>
     <p:spTree>
@@ -12881,7 +14213,7 @@
             </a:r>
             <a:r>
               <a:rPr lang="hu-HU" dirty="0"/>
-              <a:t> (UKA 2022)</a:t>
+              <a:t> (UKA 2022 shiny app)</a:t>
             </a:r>
             <a:endParaRPr lang="en-NL" dirty="0"/>
           </a:p>
@@ -13546,7 +14878,7 @@
 </p:sld>
 </file>
 
-<file path=ppt/slides/slide8.xml><?xml version="1.0" encoding="utf-8"?>
+<file path=ppt/slides/slide9.xml><?xml version="1.0" encoding="utf-8"?>
 <p:sld xmlns:a="http://schemas.openxmlformats.org/drawingml/2006/main" xmlns:r="http://schemas.openxmlformats.org/officeDocument/2006/relationships" xmlns:p="http://schemas.openxmlformats.org/presentationml/2006/main">
   <p:cSld>
     <p:spTree>
@@ -14305,478 +15637,6 @@
     <p:extLst>
       <p:ext uri="{BB962C8B-B14F-4D97-AF65-F5344CB8AC3E}">
         <p14:creationId xmlns:p14="http://schemas.microsoft.com/office/powerpoint/2010/main" val="64861202"/>
-      </p:ext>
-    </p:extLst>
-  </p:cSld>
-  <p:clrMapOvr>
-    <a:masterClrMapping/>
-  </p:clrMapOvr>
-</p:sld>
-</file>
-
-<file path=ppt/slides/slide9.xml><?xml version="1.0" encoding="utf-8"?>
-<p:sld xmlns:a="http://schemas.openxmlformats.org/drawingml/2006/main" xmlns:r="http://schemas.openxmlformats.org/officeDocument/2006/relationships" xmlns:p="http://schemas.openxmlformats.org/presentationml/2006/main">
-  <p:cSld>
-    <p:spTree>
-      <p:nvGrpSpPr>
-        <p:cNvPr id="1" name=""/>
-        <p:cNvGrpSpPr/>
-        <p:nvPr/>
-      </p:nvGrpSpPr>
-      <p:grpSpPr>
-        <a:xfrm>
-          <a:off x="0" y="0"/>
-          <a:ext cx="0" cy="0"/>
-          <a:chOff x="0" y="0"/>
-          <a:chExt cx="0" cy="0"/>
-        </a:xfrm>
-      </p:grpSpPr>
-      <p:sp>
-        <p:nvSpPr>
-          <p:cNvPr id="2" name="Title 1">
-            <a:extLst>
-              <a:ext uri="{FF2B5EF4-FFF2-40B4-BE49-F238E27FC236}">
-                <a16:creationId xmlns:a16="http://schemas.microsoft.com/office/drawing/2014/main" id="{7F548463-7A81-4569-8B14-B1962306B7A6}"/>
-              </a:ext>
-            </a:extLst>
-          </p:cNvPr>
-          <p:cNvSpPr>
-            <a:spLocks noGrp="1"/>
-          </p:cNvSpPr>
-          <p:nvPr>
-            <p:ph type="title"/>
-          </p:nvPr>
-        </p:nvSpPr>
-        <p:spPr/>
-        <p:txBody>
-          <a:bodyPr/>
-          <a:lstStyle/>
-          <a:p>
-            <a:r>
-              <a:rPr lang="en-US" dirty="0"/>
-              <a:t>QC</a:t>
-            </a:r>
-            <a:endParaRPr lang="en-NL" dirty="0"/>
-          </a:p>
-        </p:txBody>
-      </p:sp>
-      <p:sp>
-        <p:nvSpPr>
-          <p:cNvPr id="3" name="Content Placeholder 2">
-            <a:extLst>
-              <a:ext uri="{FF2B5EF4-FFF2-40B4-BE49-F238E27FC236}">
-                <a16:creationId xmlns:a16="http://schemas.microsoft.com/office/drawing/2014/main" id="{305BD680-1103-4B17-AD54-F2507929BA78}"/>
-              </a:ext>
-            </a:extLst>
-          </p:cNvPr>
-          <p:cNvSpPr>
-            <a:spLocks noGrp="1"/>
-          </p:cNvSpPr>
-          <p:nvPr>
-            <p:ph idx="1"/>
-          </p:nvPr>
-        </p:nvSpPr>
-        <p:spPr/>
-        <p:txBody>
-          <a:bodyPr/>
-          <a:lstStyle/>
-          <a:p>
-            <a:r>
-              <a:rPr lang="en-US" dirty="0"/>
-              <a:t>Export </a:t>
-            </a:r>
-            <a:r>
-              <a:rPr lang="en-US" b="1" dirty="0"/>
-              <a:t>flat file </a:t>
-            </a:r>
-            <a:r>
-              <a:rPr lang="en-US" dirty="0"/>
-              <a:t>from </a:t>
-            </a:r>
-            <a:r>
-              <a:rPr lang="en-US" dirty="0" err="1"/>
-              <a:t>BioNavigator</a:t>
-            </a:r>
-            <a:r>
-              <a:rPr lang="en-US" dirty="0"/>
-              <a:t> after log2 transformation</a:t>
-            </a:r>
-          </a:p>
-          <a:p>
-            <a:pPr lvl="1"/>
-            <a:r>
-              <a:rPr lang="en-US" dirty="0"/>
-              <a:t>Array factors: Barcode, Array, and Test condition</a:t>
-            </a:r>
-          </a:p>
-          <a:p>
-            <a:pPr lvl="1"/>
-            <a:r>
-              <a:rPr lang="en-US" dirty="0"/>
-              <a:t>Spot factor: ID</a:t>
-            </a:r>
-          </a:p>
-          <a:p>
-            <a:pPr lvl="1"/>
-            <a:r>
-              <a:rPr lang="en-US" dirty="0"/>
-              <a:t>Quantitation type: S100-logTransformed</a:t>
-            </a:r>
-          </a:p>
-          <a:p>
-            <a:r>
-              <a:rPr lang="en-US" dirty="0"/>
-              <a:t>Filename structure:</a:t>
-            </a:r>
-            <a:endParaRPr lang="en-NL" dirty="0"/>
-          </a:p>
-          <a:p>
-            <a:endParaRPr lang="en-US" dirty="0">
-              <a:latin typeface="Courier New" panose="02070309020205020404" pitchFamily="49" charset="0"/>
-              <a:cs typeface="Courier New" panose="02070309020205020404" pitchFamily="49" charset="0"/>
-            </a:endParaRPr>
-          </a:p>
-          <a:p>
-            <a:endParaRPr lang="en-NL" dirty="0"/>
-          </a:p>
-        </p:txBody>
-      </p:sp>
-      <p:sp>
-        <p:nvSpPr>
-          <p:cNvPr id="4" name="TextBox 3">
-            <a:extLst>
-              <a:ext uri="{FF2B5EF4-FFF2-40B4-BE49-F238E27FC236}">
-                <a16:creationId xmlns:a16="http://schemas.microsoft.com/office/drawing/2014/main" id="{48ED3C35-A82F-4EE7-8E49-C97BA7693298}"/>
-              </a:ext>
-            </a:extLst>
-          </p:cNvPr>
-          <p:cNvSpPr txBox="1"/>
-          <p:nvPr/>
-        </p:nvSpPr>
-        <p:spPr>
-          <a:xfrm>
-            <a:off x="4754089" y="4675528"/>
-            <a:ext cx="1235788" cy="369332"/>
-          </a:xfrm>
-          <a:prstGeom prst="rect">
-            <a:avLst/>
-          </a:prstGeom>
-          <a:noFill/>
-        </p:spPr>
-        <p:txBody>
-          <a:bodyPr wrap="none" rtlCol="0">
-            <a:spAutoFit/>
-          </a:bodyPr>
-          <a:lstStyle/>
-          <a:p>
-            <a:r>
-              <a:rPr lang="en-US" dirty="0"/>
-              <a:t>QC_PTK.txt</a:t>
-            </a:r>
-            <a:endParaRPr lang="en-NL" dirty="0"/>
-          </a:p>
-        </p:txBody>
-      </p:sp>
-      <p:sp>
-        <p:nvSpPr>
-          <p:cNvPr id="5" name="Rectangle 4">
-            <a:extLst>
-              <a:ext uri="{FF2B5EF4-FFF2-40B4-BE49-F238E27FC236}">
-                <a16:creationId xmlns:a16="http://schemas.microsoft.com/office/drawing/2014/main" id="{16764EFF-35EF-4ED8-8B4F-1276D9AB12BE}"/>
-              </a:ext>
-            </a:extLst>
-          </p:cNvPr>
-          <p:cNvSpPr/>
-          <p:nvPr/>
-        </p:nvSpPr>
-        <p:spPr>
-          <a:xfrm>
-            <a:off x="2110839" y="5112328"/>
-            <a:ext cx="338447" cy="326572"/>
-          </a:xfrm>
-          <a:prstGeom prst="rect">
-            <a:avLst/>
-          </a:prstGeom>
-          <a:ln>
-            <a:solidFill>
-              <a:schemeClr val="accent1"/>
-            </a:solidFill>
-          </a:ln>
-        </p:spPr>
-        <p:style>
-          <a:lnRef idx="2">
-            <a:schemeClr val="accent1">
-              <a:shade val="50000"/>
-            </a:schemeClr>
-          </a:lnRef>
-          <a:fillRef idx="1">
-            <a:schemeClr val="accent1"/>
-          </a:fillRef>
-          <a:effectRef idx="0">
-            <a:schemeClr val="accent1"/>
-          </a:effectRef>
-          <a:fontRef idx="minor">
-            <a:schemeClr val="lt1"/>
-          </a:fontRef>
-        </p:style>
-        <p:txBody>
-          <a:bodyPr rtlCol="0" anchor="ctr"/>
-          <a:lstStyle/>
-          <a:p>
-            <a:pPr algn="ctr"/>
-            <a:endParaRPr lang="en-NL"/>
-          </a:p>
-        </p:txBody>
-      </p:sp>
-      <p:sp>
-        <p:nvSpPr>
-          <p:cNvPr id="6" name="TextBox 5">
-            <a:extLst>
-              <a:ext uri="{FF2B5EF4-FFF2-40B4-BE49-F238E27FC236}">
-                <a16:creationId xmlns:a16="http://schemas.microsoft.com/office/drawing/2014/main" id="{55A17AD9-295F-4C9A-A00B-D2FB0F337333}"/>
-              </a:ext>
-            </a:extLst>
-          </p:cNvPr>
-          <p:cNvSpPr txBox="1"/>
-          <p:nvPr/>
-        </p:nvSpPr>
-        <p:spPr>
-          <a:xfrm>
-            <a:off x="2449286" y="5112328"/>
-            <a:ext cx="2419252" cy="369332"/>
-          </a:xfrm>
-          <a:prstGeom prst="rect">
-            <a:avLst/>
-          </a:prstGeom>
-          <a:noFill/>
-        </p:spPr>
-        <p:txBody>
-          <a:bodyPr wrap="none" rtlCol="0">
-            <a:spAutoFit/>
-          </a:bodyPr>
-          <a:lstStyle/>
-          <a:p>
-            <a:r>
-              <a:rPr lang="en-US" dirty="0"/>
-              <a:t>File type. Should be QC.</a:t>
-            </a:r>
-            <a:endParaRPr lang="en-NL" dirty="0"/>
-          </a:p>
-        </p:txBody>
-      </p:sp>
-      <p:sp>
-        <p:nvSpPr>
-          <p:cNvPr id="7" name="Rectangle 6">
-            <a:extLst>
-              <a:ext uri="{FF2B5EF4-FFF2-40B4-BE49-F238E27FC236}">
-                <a16:creationId xmlns:a16="http://schemas.microsoft.com/office/drawing/2014/main" id="{0D6C873F-AED0-4FAF-8238-535E97558449}"/>
-              </a:ext>
-            </a:extLst>
-          </p:cNvPr>
-          <p:cNvSpPr/>
-          <p:nvPr/>
-        </p:nvSpPr>
-        <p:spPr>
-          <a:xfrm>
-            <a:off x="2107530" y="5481660"/>
-            <a:ext cx="338447" cy="326572"/>
-          </a:xfrm>
-          <a:prstGeom prst="rect">
-            <a:avLst/>
-          </a:prstGeom>
-          <a:solidFill>
-            <a:schemeClr val="accent2"/>
-          </a:solidFill>
-          <a:ln/>
-        </p:spPr>
-        <p:style>
-          <a:lnRef idx="2">
-            <a:schemeClr val="accent2"/>
-          </a:lnRef>
-          <a:fillRef idx="1">
-            <a:schemeClr val="lt1"/>
-          </a:fillRef>
-          <a:effectRef idx="0">
-            <a:schemeClr val="accent2"/>
-          </a:effectRef>
-          <a:fontRef idx="minor">
-            <a:schemeClr val="dk1"/>
-          </a:fontRef>
-        </p:style>
-        <p:txBody>
-          <a:bodyPr rtlCol="0" anchor="ctr"/>
-          <a:lstStyle/>
-          <a:p>
-            <a:pPr algn="ctr"/>
-            <a:endParaRPr lang="en-NL"/>
-          </a:p>
-        </p:txBody>
-      </p:sp>
-      <p:sp>
-        <p:nvSpPr>
-          <p:cNvPr id="8" name="TextBox 7">
-            <a:extLst>
-              <a:ext uri="{FF2B5EF4-FFF2-40B4-BE49-F238E27FC236}">
-                <a16:creationId xmlns:a16="http://schemas.microsoft.com/office/drawing/2014/main" id="{166696B0-C72A-4247-9A8B-40E4103F161D}"/>
-              </a:ext>
-            </a:extLst>
-          </p:cNvPr>
-          <p:cNvSpPr txBox="1"/>
-          <p:nvPr/>
-        </p:nvSpPr>
-        <p:spPr>
-          <a:xfrm>
-            <a:off x="2445977" y="5481660"/>
-            <a:ext cx="3135858" cy="369332"/>
-          </a:xfrm>
-          <a:prstGeom prst="rect">
-            <a:avLst/>
-          </a:prstGeom>
-          <a:noFill/>
-        </p:spPr>
-        <p:txBody>
-          <a:bodyPr wrap="none" rtlCol="0">
-            <a:spAutoFit/>
-          </a:bodyPr>
-          <a:lstStyle/>
-          <a:p>
-            <a:r>
-              <a:rPr lang="en-US" dirty="0"/>
-              <a:t>Assay type. Options: PTK or STK</a:t>
-            </a:r>
-            <a:endParaRPr lang="en-NL" dirty="0"/>
-          </a:p>
-        </p:txBody>
-      </p:sp>
-      <p:cxnSp>
-        <p:nvCxnSpPr>
-          <p:cNvPr id="13" name="Straight Connector 12">
-            <a:extLst>
-              <a:ext uri="{FF2B5EF4-FFF2-40B4-BE49-F238E27FC236}">
-                <a16:creationId xmlns:a16="http://schemas.microsoft.com/office/drawing/2014/main" id="{83EA0D79-7532-412F-BCCA-8BEA7BE9469C}"/>
-              </a:ext>
-            </a:extLst>
-          </p:cNvPr>
-          <p:cNvCxnSpPr>
-            <a:cxnSpLocks/>
-          </p:cNvCxnSpPr>
-          <p:nvPr/>
-        </p:nvCxnSpPr>
-        <p:spPr>
-          <a:xfrm>
-            <a:off x="4880758" y="4961517"/>
-            <a:ext cx="231570" cy="0"/>
-          </a:xfrm>
-          <a:prstGeom prst="line">
-            <a:avLst/>
-          </a:prstGeom>
-          <a:ln w="38100"/>
-        </p:spPr>
-        <p:style>
-          <a:lnRef idx="1">
-            <a:schemeClr val="accent1"/>
-          </a:lnRef>
-          <a:fillRef idx="0">
-            <a:schemeClr val="accent1"/>
-          </a:fillRef>
-          <a:effectRef idx="0">
-            <a:schemeClr val="accent1"/>
-          </a:effectRef>
-          <a:fontRef idx="minor">
-            <a:schemeClr val="tx1"/>
-          </a:fontRef>
-        </p:style>
-      </p:cxnSp>
-      <p:cxnSp>
-        <p:nvCxnSpPr>
-          <p:cNvPr id="14" name="Straight Connector 13">
-            <a:extLst>
-              <a:ext uri="{FF2B5EF4-FFF2-40B4-BE49-F238E27FC236}">
-                <a16:creationId xmlns:a16="http://schemas.microsoft.com/office/drawing/2014/main" id="{87DED667-E6A8-45CF-A2A9-5B404ECA8AE2}"/>
-              </a:ext>
-            </a:extLst>
-          </p:cNvPr>
-          <p:cNvCxnSpPr>
-            <a:cxnSpLocks/>
-          </p:cNvCxnSpPr>
-          <p:nvPr/>
-        </p:nvCxnSpPr>
-        <p:spPr>
-          <a:xfrm>
-            <a:off x="5258790" y="4961517"/>
-            <a:ext cx="323045" cy="0"/>
-          </a:xfrm>
-          <a:prstGeom prst="line">
-            <a:avLst/>
-          </a:prstGeom>
-          <a:ln w="38100"/>
-        </p:spPr>
-        <p:style>
-          <a:lnRef idx="1">
-            <a:schemeClr val="accent2"/>
-          </a:lnRef>
-          <a:fillRef idx="0">
-            <a:schemeClr val="accent2"/>
-          </a:fillRef>
-          <a:effectRef idx="0">
-            <a:schemeClr val="accent2"/>
-          </a:effectRef>
-          <a:fontRef idx="minor">
-            <a:schemeClr val="tx1"/>
-          </a:fontRef>
-        </p:style>
-      </p:cxnSp>
-      <p:sp>
-        <p:nvSpPr>
-          <p:cNvPr id="9" name="TextBox 8">
-            <a:extLst>
-              <a:ext uri="{FF2B5EF4-FFF2-40B4-BE49-F238E27FC236}">
-                <a16:creationId xmlns:a16="http://schemas.microsoft.com/office/drawing/2014/main" id="{DFB0C0C5-1885-4E62-A7F6-A4E7244AD1AE}"/>
-              </a:ext>
-            </a:extLst>
-          </p:cNvPr>
-          <p:cNvSpPr txBox="1"/>
-          <p:nvPr/>
-        </p:nvSpPr>
-        <p:spPr>
-          <a:xfrm>
-            <a:off x="0" y="0"/>
-            <a:ext cx="800219" cy="6858000"/>
-          </a:xfrm>
-          <a:prstGeom prst="rect">
-            <a:avLst/>
-          </a:prstGeom>
-          <a:solidFill>
-            <a:srgbClr val="0070C0"/>
-          </a:solidFill>
-        </p:spPr>
-        <p:txBody>
-          <a:bodyPr vert="vert270" wrap="square" rtlCol="0">
-            <a:spAutoFit/>
-          </a:bodyPr>
-          <a:lstStyle/>
-          <a:p>
-            <a:pPr algn="ctr"/>
-            <a:r>
-              <a:rPr lang="en-GB" sz="4000" b="1" dirty="0" err="1">
-                <a:solidFill>
-                  <a:schemeClr val="bg1"/>
-                </a:solidFill>
-              </a:rPr>
-              <a:t>BioNavigator</a:t>
-            </a:r>
-            <a:endParaRPr lang="en-NL" sz="4000" b="1" dirty="0">
-              <a:solidFill>
-                <a:schemeClr val="bg1"/>
-              </a:solidFill>
-            </a:endParaRPr>
-          </a:p>
-        </p:txBody>
-      </p:sp>
-    </p:spTree>
-    <p:extLst>
-      <p:ext uri="{BB962C8B-B14F-4D97-AF65-F5344CB8AC3E}">
-        <p14:creationId xmlns:p14="http://schemas.microsoft.com/office/powerpoint/2010/main" val="2653828608"/>
       </p:ext>
     </p:extLst>
   </p:cSld>

</xml_diff>